<commit_message>
ppt added with conclusion
</commit_message>
<xml_diff>
--- a/4-final_report.pptx
+++ b/4-final_report.pptx
@@ -15,6 +15,7 @@
     <p:sldId id="263" r:id="rId9"/>
     <p:sldId id="264" r:id="rId10"/>
     <p:sldId id="265" r:id="rId11"/>
+    <p:sldId id="266" r:id="rId12"/>
   </p:sldIdLst>
   <p:sldSz cx="12192000" cy="6858000"/>
   <p:notesSz cx="6858000" cy="9144000"/>
@@ -113,6 +114,11 @@
       </a:defRPr>
     </a:lvl9pPr>
   </p:defaultTextStyle>
+  <p:extLst>
+    <p:ext uri="{EFAFB233-063F-42B5-8137-9DF3F51BA10A}">
+      <p15:sldGuideLst xmlns:p15="http://schemas.microsoft.com/office/powerpoint/2012/main"/>
+    </p:ext>
+  </p:extLst>
 </p:presentation>
 </file>
 
@@ -431,7 +437,7 @@
             <a:fld id="{73C3BD54-29B9-3D42-B178-776ED395AA85}" type="datetimeFigureOut">
               <a:rPr lang="en-US" smtClean="0"/>
               <a:pPr/>
-              <a:t>4/22/23</a:t>
+              <a:t>4/23/23</a:t>
             </a:fld>
             <a:endParaRPr lang="en-US" sz="1400"/>
           </a:p>
@@ -681,7 +687,7 @@
           <a:p>
             <a:fld id="{73C3BD54-29B9-3D42-B178-776ED395AA85}" type="datetimeFigureOut">
               <a:rPr lang="en-US" smtClean="0"/>
-              <a:t>4/22/23</a:t>
+              <a:t>4/23/23</a:t>
             </a:fld>
             <a:endParaRPr lang="en-US"/>
           </a:p>
@@ -995,7 +1001,7 @@
           <a:p>
             <a:fld id="{73C3BD54-29B9-3D42-B178-776ED395AA85}" type="datetimeFigureOut">
               <a:rPr lang="en-US" smtClean="0"/>
-              <a:t>4/22/23</a:t>
+              <a:t>4/23/23</a:t>
             </a:fld>
             <a:endParaRPr lang="en-US"/>
           </a:p>
@@ -1509,7 +1515,7 @@
           <a:p>
             <a:fld id="{73C3BD54-29B9-3D42-B178-776ED395AA85}" type="datetimeFigureOut">
               <a:rPr lang="en-US" smtClean="0"/>
-              <a:t>4/22/23</a:t>
+              <a:t>4/23/23</a:t>
             </a:fld>
             <a:endParaRPr lang="en-US"/>
           </a:p>
@@ -1940,7 +1946,7 @@
           <a:p>
             <a:fld id="{73C3BD54-29B9-3D42-B178-776ED395AA85}" type="datetimeFigureOut">
               <a:rPr lang="en-US" smtClean="0"/>
-              <a:t>4/22/23</a:t>
+              <a:t>4/23/23</a:t>
             </a:fld>
             <a:endParaRPr lang="en-US"/>
           </a:p>
@@ -2205,7 +2211,7 @@
           <a:p>
             <a:fld id="{73C3BD54-29B9-3D42-B178-776ED395AA85}" type="datetimeFigureOut">
               <a:rPr lang="en-US" smtClean="0"/>
-              <a:t>4/22/23</a:t>
+              <a:t>4/23/23</a:t>
             </a:fld>
             <a:endParaRPr lang="en-US"/>
           </a:p>
@@ -2779,7 +2785,7 @@
           <a:p>
             <a:fld id="{73C3BD54-29B9-3D42-B178-776ED395AA85}" type="datetimeFigureOut">
               <a:rPr lang="en-US" smtClean="0"/>
-              <a:t>4/22/23</a:t>
+              <a:t>4/23/23</a:t>
             </a:fld>
             <a:endParaRPr lang="en-US"/>
           </a:p>
@@ -3082,7 +3088,7 @@
           <a:p>
             <a:fld id="{73C3BD54-29B9-3D42-B178-776ED395AA85}" type="datetimeFigureOut">
               <a:rPr lang="en-US" smtClean="0"/>
-              <a:t>4/22/23</a:t>
+              <a:t>4/23/23</a:t>
             </a:fld>
             <a:endParaRPr lang="en-US"/>
           </a:p>
@@ -3357,7 +3363,7 @@
           <a:p>
             <a:fld id="{73C3BD54-29B9-3D42-B178-776ED395AA85}" type="datetimeFigureOut">
               <a:rPr lang="en-US" smtClean="0"/>
-              <a:t>4/22/23</a:t>
+              <a:t>4/23/23</a:t>
             </a:fld>
             <a:endParaRPr lang="en-US"/>
           </a:p>
@@ -3828,7 +3834,7 @@
           <a:p>
             <a:fld id="{73C3BD54-29B9-3D42-B178-776ED395AA85}" type="datetimeFigureOut">
               <a:rPr lang="en-US" smtClean="0"/>
-              <a:t>4/22/23</a:t>
+              <a:t>4/23/23</a:t>
             </a:fld>
             <a:endParaRPr lang="en-US"/>
           </a:p>
@@ -4279,7 +4285,7 @@
           <a:p>
             <a:fld id="{73C3BD54-29B9-3D42-B178-776ED395AA85}" type="datetimeFigureOut">
               <a:rPr lang="en-US" smtClean="0"/>
-              <a:t>4/22/23</a:t>
+              <a:t>4/23/23</a:t>
             </a:fld>
             <a:endParaRPr lang="en-US"/>
           </a:p>
@@ -4678,7 +4684,7 @@
             <a:fld id="{73C3BD54-29B9-3D42-B178-776ED395AA85}" type="datetimeFigureOut">
               <a:rPr lang="en-US" smtClean="0"/>
               <a:pPr/>
-              <a:t>4/22/23</a:t>
+              <a:t>4/23/23</a:t>
             </a:fld>
             <a:endParaRPr lang="en-US" dirty="0"/>
           </a:p>
@@ -5535,6 +5541,132 @@
     <p:extLst>
       <p:ext uri="{BB962C8B-B14F-4D97-AF65-F5344CB8AC3E}">
         <p14:creationId xmlns:p14="http://schemas.microsoft.com/office/powerpoint/2010/main" val="2762595328"/>
+      </p:ext>
+    </p:extLst>
+  </p:cSld>
+  <p:clrMapOvr>
+    <a:masterClrMapping/>
+  </p:clrMapOvr>
+</p:sld>
+</file>
+
+<file path=ppt/slides/slide11.xml><?xml version="1.0" encoding="utf-8"?>
+<p:sld xmlns:a="http://schemas.openxmlformats.org/drawingml/2006/main" xmlns:r="http://schemas.openxmlformats.org/officeDocument/2006/relationships" xmlns:p="http://schemas.openxmlformats.org/presentationml/2006/main" showMasterSp="0">
+  <p:cSld>
+    <p:spTree>
+      <p:nvGrpSpPr>
+        <p:cNvPr id="1" name=""/>
+        <p:cNvGrpSpPr/>
+        <p:nvPr/>
+      </p:nvGrpSpPr>
+      <p:grpSpPr>
+        <a:xfrm>
+          <a:off x="0" y="0"/>
+          <a:ext cx="0" cy="0"/>
+          <a:chOff x="0" y="0"/>
+          <a:chExt cx="0" cy="0"/>
+        </a:xfrm>
+      </p:grpSpPr>
+      <p:sp>
+        <p:nvSpPr>
+          <p:cNvPr id="2" name="Title 1">
+            <a:extLst>
+              <a:ext uri="{FF2B5EF4-FFF2-40B4-BE49-F238E27FC236}">
+                <a16:creationId xmlns:a16="http://schemas.microsoft.com/office/drawing/2014/main" id="{8E1AB827-4E97-BC36-3BAA-5158B9D7AD90}"/>
+              </a:ext>
+            </a:extLst>
+          </p:cNvPr>
+          <p:cNvSpPr>
+            <a:spLocks noGrp="1"/>
+          </p:cNvSpPr>
+          <p:nvPr>
+            <p:ph type="title"/>
+          </p:nvPr>
+        </p:nvSpPr>
+        <p:spPr>
+          <a:xfrm>
+            <a:off x="416867" y="389175"/>
+            <a:ext cx="11643327" cy="1446550"/>
+          </a:xfrm>
+        </p:spPr>
+        <p:txBody>
+          <a:bodyPr/>
+          <a:lstStyle/>
+          <a:p>
+            <a:r>
+              <a:rPr lang="en-US" dirty="0"/>
+              <a:t>Conclusion</a:t>
+            </a:r>
+          </a:p>
+        </p:txBody>
+      </p:sp>
+      <p:sp>
+        <p:nvSpPr>
+          <p:cNvPr id="3" name="Content Placeholder 2">
+            <a:extLst>
+              <a:ext uri="{FF2B5EF4-FFF2-40B4-BE49-F238E27FC236}">
+                <a16:creationId xmlns:a16="http://schemas.microsoft.com/office/drawing/2014/main" id="{C07EF299-48C9-FBD0-E7EE-B7E76C90540A}"/>
+              </a:ext>
+            </a:extLst>
+          </p:cNvPr>
+          <p:cNvSpPr>
+            <a:spLocks noGrp="1"/>
+          </p:cNvSpPr>
+          <p:nvPr>
+            <p:ph idx="1"/>
+          </p:nvPr>
+        </p:nvSpPr>
+        <p:spPr>
+          <a:xfrm>
+            <a:off x="515722" y="1653670"/>
+            <a:ext cx="11433261" cy="3188586"/>
+          </a:xfrm>
+        </p:spPr>
+        <p:txBody>
+          <a:bodyPr/>
+          <a:lstStyle/>
+          <a:p>
+            <a:pPr marL="0" indent="0">
+              <a:buNone/>
+            </a:pPr>
+            <a:r>
+              <a:rPr lang="en-US" dirty="0"/>
+              <a:t>Even state of art models like Bert is also not able to capture the context and with more labelled data these issues can be solved by fine tuning the models:</a:t>
+            </a:r>
+          </a:p>
+          <a:p>
+            <a:pPr marL="0" indent="0">
+              <a:buNone/>
+            </a:pPr>
+            <a:r>
+              <a:rPr lang="en-US" dirty="0"/>
+              <a:t>Sent1: “boy came to college”</a:t>
+            </a:r>
+          </a:p>
+          <a:p>
+            <a:pPr marL="0" indent="0">
+              <a:buNone/>
+            </a:pPr>
+            <a:r>
+              <a:rPr lang="en-US" dirty="0"/>
+              <a:t>Sent2: “boy came from college”</a:t>
+            </a:r>
+          </a:p>
+          <a:p>
+            <a:pPr marL="0" indent="0">
+              <a:buNone/>
+            </a:pPr>
+            <a:r>
+              <a:rPr lang="en-US" dirty="0"/>
+              <a:t>STS Score: 4.77</a:t>
+            </a:r>
+          </a:p>
+        </p:txBody>
+      </p:sp>
+    </p:spTree>
+    <p:extLst>
+      <p:ext uri="{BB962C8B-B14F-4D97-AF65-F5344CB8AC3E}">
+        <p14:creationId xmlns:p14="http://schemas.microsoft.com/office/powerpoint/2010/main" val="4124206001"/>
       </p:ext>
     </p:extLst>
   </p:cSld>

</xml_diff>

<commit_message>
readme and cross lingual experimentation added
</commit_message>
<xml_diff>
--- a/4-final_report.pptx
+++ b/4-final_report.pptx
@@ -10,12 +10,15 @@
     <p:sldId id="258" r:id="rId4"/>
     <p:sldId id="260" r:id="rId5"/>
     <p:sldId id="259" r:id="rId6"/>
-    <p:sldId id="261" r:id="rId7"/>
-    <p:sldId id="262" r:id="rId8"/>
-    <p:sldId id="263" r:id="rId9"/>
-    <p:sldId id="264" r:id="rId10"/>
-    <p:sldId id="265" r:id="rId11"/>
-    <p:sldId id="266" r:id="rId12"/>
+    <p:sldId id="267" r:id="rId7"/>
+    <p:sldId id="261" r:id="rId8"/>
+    <p:sldId id="262" r:id="rId9"/>
+    <p:sldId id="268" r:id="rId10"/>
+    <p:sldId id="263" r:id="rId11"/>
+    <p:sldId id="269" r:id="rId12"/>
+    <p:sldId id="264" r:id="rId13"/>
+    <p:sldId id="265" r:id="rId14"/>
+    <p:sldId id="266" r:id="rId15"/>
   </p:sldIdLst>
   <p:sldSz cx="12192000" cy="6858000"/>
   <p:notesSz cx="6858000" cy="9144000"/>
@@ -437,7 +440,7 @@
             <a:fld id="{73C3BD54-29B9-3D42-B178-776ED395AA85}" type="datetimeFigureOut">
               <a:rPr lang="en-US" smtClean="0"/>
               <a:pPr/>
-              <a:t>4/23/23</a:t>
+              <a:t>5/3/23</a:t>
             </a:fld>
             <a:endParaRPr lang="en-US" sz="1400"/>
           </a:p>
@@ -687,7 +690,7 @@
           <a:p>
             <a:fld id="{73C3BD54-29B9-3D42-B178-776ED395AA85}" type="datetimeFigureOut">
               <a:rPr lang="en-US" smtClean="0"/>
-              <a:t>4/23/23</a:t>
+              <a:t>5/3/23</a:t>
             </a:fld>
             <a:endParaRPr lang="en-US"/>
           </a:p>
@@ -1001,7 +1004,7 @@
           <a:p>
             <a:fld id="{73C3BD54-29B9-3D42-B178-776ED395AA85}" type="datetimeFigureOut">
               <a:rPr lang="en-US" smtClean="0"/>
-              <a:t>4/23/23</a:t>
+              <a:t>5/3/23</a:t>
             </a:fld>
             <a:endParaRPr lang="en-US"/>
           </a:p>
@@ -1515,7 +1518,7 @@
           <a:p>
             <a:fld id="{73C3BD54-29B9-3D42-B178-776ED395AA85}" type="datetimeFigureOut">
               <a:rPr lang="en-US" smtClean="0"/>
-              <a:t>4/23/23</a:t>
+              <a:t>5/3/23</a:t>
             </a:fld>
             <a:endParaRPr lang="en-US"/>
           </a:p>
@@ -1946,7 +1949,7 @@
           <a:p>
             <a:fld id="{73C3BD54-29B9-3D42-B178-776ED395AA85}" type="datetimeFigureOut">
               <a:rPr lang="en-US" smtClean="0"/>
-              <a:t>4/23/23</a:t>
+              <a:t>5/3/23</a:t>
             </a:fld>
             <a:endParaRPr lang="en-US"/>
           </a:p>
@@ -2211,7 +2214,7 @@
           <a:p>
             <a:fld id="{73C3BD54-29B9-3D42-B178-776ED395AA85}" type="datetimeFigureOut">
               <a:rPr lang="en-US" smtClean="0"/>
-              <a:t>4/23/23</a:t>
+              <a:t>5/3/23</a:t>
             </a:fld>
             <a:endParaRPr lang="en-US"/>
           </a:p>
@@ -2785,7 +2788,7 @@
           <a:p>
             <a:fld id="{73C3BD54-29B9-3D42-B178-776ED395AA85}" type="datetimeFigureOut">
               <a:rPr lang="en-US" smtClean="0"/>
-              <a:t>4/23/23</a:t>
+              <a:t>5/3/23</a:t>
             </a:fld>
             <a:endParaRPr lang="en-US"/>
           </a:p>
@@ -3088,7 +3091,7 @@
           <a:p>
             <a:fld id="{73C3BD54-29B9-3D42-B178-776ED395AA85}" type="datetimeFigureOut">
               <a:rPr lang="en-US" smtClean="0"/>
-              <a:t>4/23/23</a:t>
+              <a:t>5/3/23</a:t>
             </a:fld>
             <a:endParaRPr lang="en-US"/>
           </a:p>
@@ -3363,7 +3366,7 @@
           <a:p>
             <a:fld id="{73C3BD54-29B9-3D42-B178-776ED395AA85}" type="datetimeFigureOut">
               <a:rPr lang="en-US" smtClean="0"/>
-              <a:t>4/23/23</a:t>
+              <a:t>5/3/23</a:t>
             </a:fld>
             <a:endParaRPr lang="en-US"/>
           </a:p>
@@ -3834,7 +3837,7 @@
           <a:p>
             <a:fld id="{73C3BD54-29B9-3D42-B178-776ED395AA85}" type="datetimeFigureOut">
               <a:rPr lang="en-US" smtClean="0"/>
-              <a:t>4/23/23</a:t>
+              <a:t>5/3/23</a:t>
             </a:fld>
             <a:endParaRPr lang="en-US"/>
           </a:p>
@@ -4285,7 +4288,7 @@
           <a:p>
             <a:fld id="{73C3BD54-29B9-3D42-B178-776ED395AA85}" type="datetimeFigureOut">
               <a:rPr lang="en-US" smtClean="0"/>
-              <a:t>4/23/23</a:t>
+              <a:t>5/3/23</a:t>
             </a:fld>
             <a:endParaRPr lang="en-US"/>
           </a:p>
@@ -4684,7 +4687,7 @@
             <a:fld id="{73C3BD54-29B9-3D42-B178-776ED395AA85}" type="datetimeFigureOut">
               <a:rPr lang="en-US" smtClean="0"/>
               <a:pPr/>
-              <a:t>4/23/23</a:t>
+              <a:t>5/3/23</a:t>
             </a:fld>
             <a:endParaRPr lang="en-US" dirty="0"/>
           </a:p>
@@ -5191,14 +5194,14 @@
               </a:lnSpc>
             </a:pPr>
             <a:r>
-              <a:rPr lang="en-US" sz="6200"/>
+              <a:rPr lang="en-US" sz="6200" dirty="0"/>
               <a:t>Semantic Textual Similarity</a:t>
             </a:r>
             <a:br>
-              <a:rPr lang="en-US" sz="6200"/>
+              <a:rPr lang="en-US" sz="6200" dirty="0"/>
             </a:br>
             <a:r>
-              <a:rPr lang="en-US" sz="6200"/>
+              <a:rPr lang="en-US" sz="6200" dirty="0"/>
               <a:t>(STS)</a:t>
             </a:r>
           </a:p>
@@ -5222,8 +5225,8 @@
         </p:nvSpPr>
         <p:spPr>
           <a:xfrm>
-            <a:off x="5631151" y="4466845"/>
-            <a:ext cx="5588778" cy="882904"/>
+            <a:off x="5809826" y="4466845"/>
+            <a:ext cx="6192987" cy="1682538"/>
           </a:xfrm>
         </p:spPr>
         <p:txBody>
@@ -5233,9 +5236,60 @@
           <a:lstStyle/>
           <a:p>
             <a:r>
-              <a:rPr lang="en-US"/>
+              <a:rPr lang="en-US" dirty="0"/>
               <a:t>Team 4</a:t>
             </a:r>
+          </a:p>
+          <a:p>
+            <a:pPr rtl="0">
+              <a:spcBef>
+                <a:spcPts val="0"/>
+              </a:spcBef>
+              <a:spcAft>
+                <a:spcPts val="0"/>
+              </a:spcAft>
+            </a:pPr>
+            <a:r>
+              <a:rPr lang="en-US" dirty="0"/>
+              <a:t>Satya Swaroop </a:t>
+            </a:r>
+            <a:r>
+              <a:rPr lang="en-US" dirty="0" err="1"/>
+              <a:t>Gudipudi</a:t>
+            </a:r>
+            <a:r>
+              <a:rPr lang="en-US" dirty="0"/>
+              <a:t>, </a:t>
+            </a:r>
+            <a:br>
+              <a:rPr lang="en-US" dirty="0"/>
+            </a:br>
+            <a:r>
+              <a:rPr lang="en-IN" dirty="0" err="1"/>
+              <a:t>Harinie</a:t>
+            </a:r>
+            <a:r>
+              <a:rPr lang="en-IN" dirty="0"/>
+              <a:t> </a:t>
+            </a:r>
+            <a:r>
+              <a:rPr lang="en-IN" dirty="0" err="1"/>
+              <a:t>Sivaramasethu</a:t>
+            </a:r>
+            <a:r>
+              <a:rPr lang="en-IN" dirty="0"/>
+              <a:t>,</a:t>
+            </a:r>
+            <a:br>
+              <a:rPr lang="en-IN" dirty="0"/>
+            </a:br>
+            <a:r>
+              <a:rPr lang="en-IN" dirty="0"/>
+              <a:t>Aditya Raghuvanshi</a:t>
+            </a:r>
+          </a:p>
+          <a:p>
+            <a:endParaRPr lang="en-US" dirty="0"/>
           </a:p>
         </p:txBody>
       </p:sp>
@@ -5431,7 +5485,7 @@
           <p:cNvPr id="2" name="Title 1">
             <a:extLst>
               <a:ext uri="{FF2B5EF4-FFF2-40B4-BE49-F238E27FC236}">
-                <a16:creationId xmlns:a16="http://schemas.microsoft.com/office/drawing/2014/main" id="{4D689CBE-5B2F-19BB-7BF6-B8629BABDAED}"/>
+                <a16:creationId xmlns:a16="http://schemas.microsoft.com/office/drawing/2014/main" id="{98CB23D4-9B76-90AF-6EAD-4A11A6909925}"/>
               </a:ext>
             </a:extLst>
           </p:cNvPr>
@@ -5444,8 +5498,8 @@
         </p:nvSpPr>
         <p:spPr>
           <a:xfrm>
-            <a:off x="466295" y="389175"/>
-            <a:ext cx="8267296" cy="1446550"/>
+            <a:off x="318013" y="376818"/>
+            <a:ext cx="11420906" cy="908285"/>
           </a:xfrm>
         </p:spPr>
         <p:txBody>
@@ -5454,85 +5508,183 @@
           <a:p>
             <a:r>
               <a:rPr lang="en-US" dirty="0"/>
-              <a:t>Extensibility</a:t>
-            </a:r>
-          </a:p>
-        </p:txBody>
-      </p:sp>
-      <p:sp>
-        <p:nvSpPr>
-          <p:cNvPr id="3" name="Content Placeholder 2">
-            <a:extLst>
-              <a:ext uri="{FF2B5EF4-FFF2-40B4-BE49-F238E27FC236}">
-                <a16:creationId xmlns:a16="http://schemas.microsoft.com/office/drawing/2014/main" id="{A81BD03E-2FF5-7B14-621E-D6D207B2615A}"/>
-              </a:ext>
-            </a:extLst>
-          </p:cNvPr>
-          <p:cNvSpPr>
-            <a:spLocks noGrp="1"/>
-          </p:cNvSpPr>
-          <p:nvPr>
-            <p:ph idx="1"/>
-          </p:nvPr>
-        </p:nvSpPr>
-        <p:spPr>
-          <a:xfrm>
-            <a:off x="466294" y="1493033"/>
-            <a:ext cx="11420905" cy="3188586"/>
-          </a:xfrm>
-        </p:spPr>
-        <p:txBody>
-          <a:bodyPr>
-            <a:normAutofit fontScale="92500"/>
+              <a:t>Train vs Validation Losses</a:t>
+            </a:r>
+          </a:p>
+        </p:txBody>
+      </p:sp>
+      <p:pic>
+        <p:nvPicPr>
+          <p:cNvPr id="1026" name="Picture 2">
+            <a:extLst>
+              <a:ext uri="{FF2B5EF4-FFF2-40B4-BE49-F238E27FC236}">
+                <a16:creationId xmlns:a16="http://schemas.microsoft.com/office/drawing/2014/main" id="{1CC13B02-438B-9B56-F004-810DA5E17483}"/>
+              </a:ext>
+            </a:extLst>
+          </p:cNvPr>
+          <p:cNvPicPr>
+            <a:picLocks noChangeAspect="1" noChangeArrowheads="1"/>
+          </p:cNvPicPr>
+          <p:nvPr/>
+        </p:nvPicPr>
+        <p:blipFill>
+          <a:blip r:embed="rId2">
+            <a:extLst>
+              <a:ext uri="{28A0092B-C50C-407E-A947-70E740481C1C}">
+                <a14:useLocalDpi xmlns:a14="http://schemas.microsoft.com/office/drawing/2010/main" val="0"/>
+              </a:ext>
+            </a:extLst>
+          </a:blip>
+          <a:srcRect/>
+          <a:stretch>
+            <a:fillRect/>
+          </a:stretch>
+        </p:blipFill>
+        <p:spPr bwMode="auto">
+          <a:xfrm>
+            <a:off x="614575" y="1856571"/>
+            <a:ext cx="4264969" cy="3374889"/>
+          </a:xfrm>
+          <a:prstGeom prst="rect">
+            <a:avLst/>
+          </a:prstGeom>
+          <a:noFill/>
+          <a:extLst>
+            <a:ext uri="{909E8E84-426E-40DD-AFC4-6F175D3DCCD1}">
+              <a14:hiddenFill xmlns:a14="http://schemas.microsoft.com/office/drawing/2010/main">
+                <a:solidFill>
+                  <a:srgbClr val="FFFFFF"/>
+                </a:solidFill>
+              </a14:hiddenFill>
+            </a:ext>
+          </a:extLst>
+        </p:spPr>
+      </p:pic>
+      <p:pic>
+        <p:nvPicPr>
+          <p:cNvPr id="1028" name="Picture 4">
+            <a:extLst>
+              <a:ext uri="{FF2B5EF4-FFF2-40B4-BE49-F238E27FC236}">
+                <a16:creationId xmlns:a16="http://schemas.microsoft.com/office/drawing/2014/main" id="{F9080B4B-CA69-4C3B-8B4D-1317A8E0C79A}"/>
+              </a:ext>
+            </a:extLst>
+          </p:cNvPr>
+          <p:cNvPicPr>
+            <a:picLocks noChangeAspect="1" noChangeArrowheads="1"/>
+          </p:cNvPicPr>
+          <p:nvPr/>
+        </p:nvPicPr>
+        <p:blipFill>
+          <a:blip r:embed="rId3">
+            <a:extLst>
+              <a:ext uri="{28A0092B-C50C-407E-A947-70E740481C1C}">
+                <a14:useLocalDpi xmlns:a14="http://schemas.microsoft.com/office/drawing/2010/main" val="0"/>
+              </a:ext>
+            </a:extLst>
+          </a:blip>
+          <a:srcRect/>
+          <a:stretch>
+            <a:fillRect/>
+          </a:stretch>
+        </p:blipFill>
+        <p:spPr bwMode="auto">
+          <a:xfrm>
+            <a:off x="7111657" y="3287991"/>
+            <a:ext cx="4264969" cy="3452955"/>
+          </a:xfrm>
+          <a:prstGeom prst="rect">
+            <a:avLst/>
+          </a:prstGeom>
+          <a:noFill/>
+          <a:extLst>
+            <a:ext uri="{909E8E84-426E-40DD-AFC4-6F175D3DCCD1}">
+              <a14:hiddenFill xmlns:a14="http://schemas.microsoft.com/office/drawing/2010/main">
+                <a:solidFill>
+                  <a:srgbClr val="FFFFFF"/>
+                </a:solidFill>
+              </a14:hiddenFill>
+            </a:ext>
+          </a:extLst>
+        </p:spPr>
+      </p:pic>
+      <p:pic>
+        <p:nvPicPr>
+          <p:cNvPr id="1030" name="Picture 6">
+            <a:extLst>
+              <a:ext uri="{FF2B5EF4-FFF2-40B4-BE49-F238E27FC236}">
+                <a16:creationId xmlns:a16="http://schemas.microsoft.com/office/drawing/2014/main" id="{4324233F-7DC1-A6C4-788D-35A949FE3488}"/>
+              </a:ext>
+            </a:extLst>
+          </p:cNvPr>
+          <p:cNvPicPr>
+            <a:picLocks noChangeAspect="1" noChangeArrowheads="1"/>
+          </p:cNvPicPr>
+          <p:nvPr/>
+        </p:nvPicPr>
+        <p:blipFill>
+          <a:blip r:embed="rId4">
+            <a:extLst>
+              <a:ext uri="{28A0092B-C50C-407E-A947-70E740481C1C}">
+                <a14:useLocalDpi xmlns:a14="http://schemas.microsoft.com/office/drawing/2010/main" val="0"/>
+              </a:ext>
+            </a:extLst>
+          </a:blip>
+          <a:srcRect/>
+          <a:stretch>
+            <a:fillRect/>
+          </a:stretch>
+        </p:blipFill>
+        <p:spPr bwMode="auto">
+          <a:xfrm>
+            <a:off x="7111658" y="340614"/>
+            <a:ext cx="4079790" cy="2829869"/>
+          </a:xfrm>
+          <a:prstGeom prst="rect">
+            <a:avLst/>
+          </a:prstGeom>
+          <a:noFill/>
+          <a:extLst>
+            <a:ext uri="{909E8E84-426E-40DD-AFC4-6F175D3DCCD1}">
+              <a14:hiddenFill xmlns:a14="http://schemas.microsoft.com/office/drawing/2010/main">
+                <a:solidFill>
+                  <a:srgbClr val="FFFFFF"/>
+                </a:solidFill>
+              </a14:hiddenFill>
+            </a:ext>
+          </a:extLst>
+        </p:spPr>
+      </p:pic>
+      <p:sp>
+        <p:nvSpPr>
+          <p:cNvPr id="6" name="TextBox 5">
+            <a:extLst>
+              <a:ext uri="{FF2B5EF4-FFF2-40B4-BE49-F238E27FC236}">
+                <a16:creationId xmlns:a16="http://schemas.microsoft.com/office/drawing/2014/main" id="{6ADC8E48-D43E-2E36-EEA3-4B48AACEA53C}"/>
+              </a:ext>
+            </a:extLst>
+          </p:cNvPr>
+          <p:cNvSpPr txBox="1"/>
+          <p:nvPr/>
+        </p:nvSpPr>
+        <p:spPr>
+          <a:xfrm>
+            <a:off x="1161535" y="5659395"/>
+            <a:ext cx="5436973" cy="923330"/>
+          </a:xfrm>
+          <a:prstGeom prst="rect">
+            <a:avLst/>
+          </a:prstGeom>
+          <a:noFill/>
+        </p:spPr>
+        <p:txBody>
+          <a:bodyPr wrap="square" rtlCol="0">
+            <a:spAutoFit/>
           </a:bodyPr>
           <a:lstStyle/>
           <a:p>
-            <a:pPr>
-              <a:buFont typeface="Arial" panose="020B0604020202020204" pitchFamily="34" charset="0"/>
-              <a:buChar char="•"/>
-            </a:pPr>
             <a:r>
               <a:rPr lang="en-US" dirty="0"/>
-              <a:t>Semantic search is a very powerful and fundamental to real world applications like question-answering. </a:t>
-            </a:r>
-            <a:br>
-              <a:rPr lang="en-US" dirty="0"/>
-            </a:br>
-            <a:r>
-              <a:rPr lang="en-US" dirty="0"/>
-              <a:t>Sent1: “Where is Swaroop going”</a:t>
-            </a:r>
-            <a:br>
-              <a:rPr lang="en-US" dirty="0"/>
-            </a:br>
-            <a:r>
-              <a:rPr lang="en-US" dirty="0"/>
-              <a:t>Sent2: “Swaroop is going to college”</a:t>
-            </a:r>
-            <a:br>
-              <a:rPr lang="en-US" dirty="0"/>
-            </a:br>
-            <a:r>
-              <a:rPr lang="en-US" dirty="0"/>
-              <a:t>Based on input query and similarity score the most matching sentence to be retrieved</a:t>
-            </a:r>
-          </a:p>
-          <a:p>
-            <a:pPr>
-              <a:buFont typeface="Arial" panose="020B0604020202020204" pitchFamily="34" charset="0"/>
-              <a:buChar char="•"/>
-            </a:pPr>
-            <a:r>
-              <a:rPr lang="en-US" dirty="0"/>
-              <a:t>Existing </a:t>
-            </a:r>
-            <a:r>
-              <a:rPr lang="en-US" dirty="0" err="1"/>
-              <a:t>explainability</a:t>
-            </a:r>
-            <a:r>
-              <a:rPr lang="en-US" dirty="0"/>
-              <a:t> frameworks are not effective in explaining how models works especially LLM and neural network models. More research to be conducted to generate human friendly explanations through counterfactual explanations.</a:t>
+              <a:t>Observation: Neural networks are overfitting due to less data as training data is only 5749 sentence pairs with vocab size of 8306</a:t>
             </a:r>
           </a:p>
         </p:txBody>
@@ -5540,7 +5692,7 @@
     </p:spTree>
     <p:extLst>
       <p:ext uri="{BB962C8B-B14F-4D97-AF65-F5344CB8AC3E}">
-        <p14:creationId xmlns:p14="http://schemas.microsoft.com/office/powerpoint/2010/main" val="2762595328"/>
+        <p14:creationId xmlns:p14="http://schemas.microsoft.com/office/powerpoint/2010/main" val="3341428205"/>
       </p:ext>
     </p:extLst>
   </p:cSld>
@@ -5572,7 +5724,7 @@
           <p:cNvPr id="2" name="Title 1">
             <a:extLst>
               <a:ext uri="{FF2B5EF4-FFF2-40B4-BE49-F238E27FC236}">
-                <a16:creationId xmlns:a16="http://schemas.microsoft.com/office/drawing/2014/main" id="{8E1AB827-4E97-BC36-3BAA-5158B9D7AD90}"/>
+                <a16:creationId xmlns:a16="http://schemas.microsoft.com/office/drawing/2014/main" id="{98CB23D4-9B76-90AF-6EAD-4A11A6909925}"/>
               </a:ext>
             </a:extLst>
           </p:cNvPr>
@@ -5585,8 +5737,8 @@
         </p:nvSpPr>
         <p:spPr>
           <a:xfrm>
-            <a:off x="416867" y="389175"/>
-            <a:ext cx="11643327" cy="1446550"/>
+            <a:off x="318013" y="376818"/>
+            <a:ext cx="11420906" cy="908285"/>
           </a:xfrm>
         </p:spPr>
         <p:txBody>
@@ -5595,8 +5747,369 @@
           <a:p>
             <a:r>
               <a:rPr lang="en-US" dirty="0"/>
-              <a:t>Conclusion</a:t>
-            </a:r>
+              <a:t>Train vs Validation Losses </a:t>
+            </a:r>
+            <a:r>
+              <a:rPr lang="en-US" dirty="0" err="1"/>
+              <a:t>Contd</a:t>
+            </a:r>
+            <a:endParaRPr lang="en-US" dirty="0"/>
+          </a:p>
+        </p:txBody>
+      </p:sp>
+      <p:sp>
+        <p:nvSpPr>
+          <p:cNvPr id="6" name="TextBox 5">
+            <a:extLst>
+              <a:ext uri="{FF2B5EF4-FFF2-40B4-BE49-F238E27FC236}">
+                <a16:creationId xmlns:a16="http://schemas.microsoft.com/office/drawing/2014/main" id="{6ADC8E48-D43E-2E36-EEA3-4B48AACEA53C}"/>
+              </a:ext>
+            </a:extLst>
+          </p:cNvPr>
+          <p:cNvSpPr txBox="1"/>
+          <p:nvPr/>
+        </p:nvSpPr>
+        <p:spPr>
+          <a:xfrm>
+            <a:off x="6387165" y="2690336"/>
+            <a:ext cx="5436973" cy="1477328"/>
+          </a:xfrm>
+          <a:prstGeom prst="rect">
+            <a:avLst/>
+          </a:prstGeom>
+          <a:noFill/>
+        </p:spPr>
+        <p:txBody>
+          <a:bodyPr wrap="square" rtlCol="0">
+            <a:spAutoFit/>
+          </a:bodyPr>
+          <a:lstStyle/>
+          <a:p>
+            <a:r>
+              <a:rPr lang="en-US" dirty="0"/>
+              <a:t>Observation: </a:t>
+            </a:r>
+            <a:r>
+              <a:rPr lang="en-IN" dirty="0">
+                <a:solidFill>
+                  <a:srgbClr val="000000"/>
+                </a:solidFill>
+                <a:latin typeface="Helvetica Neue" panose="02000503000000020004" pitchFamily="2" charset="0"/>
+              </a:rPr>
+              <a:t>It</a:t>
+            </a:r>
+            <a:r>
+              <a:rPr lang="en-IN" b="0" i="0" dirty="0">
+                <a:solidFill>
+                  <a:srgbClr val="000000"/>
+                </a:solidFill>
+                <a:effectLst/>
+                <a:latin typeface="Helvetica Neue" panose="02000503000000020004" pitchFamily="2" charset="0"/>
+              </a:rPr>
+              <a:t> appears that the training loss and validation loss are fluctuating and not decreasing consistently over the 10 epochs. This suggests that the model may not have converged to the optimal solution yet.</a:t>
+            </a:r>
+            <a:endParaRPr lang="en-US" dirty="0"/>
+          </a:p>
+        </p:txBody>
+      </p:sp>
+      <p:pic>
+        <p:nvPicPr>
+          <p:cNvPr id="3" name="Picture 2">
+            <a:extLst>
+              <a:ext uri="{FF2B5EF4-FFF2-40B4-BE49-F238E27FC236}">
+                <a16:creationId xmlns:a16="http://schemas.microsoft.com/office/drawing/2014/main" id="{0A4D2522-916D-F47D-DA21-90708775724C}"/>
+              </a:ext>
+            </a:extLst>
+          </p:cNvPr>
+          <p:cNvPicPr>
+            <a:picLocks noChangeAspect="1" noChangeArrowheads="1"/>
+          </p:cNvPicPr>
+          <p:nvPr/>
+        </p:nvPicPr>
+        <p:blipFill>
+          <a:blip r:embed="rId2">
+            <a:extLst>
+              <a:ext uri="{28A0092B-C50C-407E-A947-70E740481C1C}">
+                <a14:useLocalDpi xmlns:a14="http://schemas.microsoft.com/office/drawing/2010/main" val="0"/>
+              </a:ext>
+            </a:extLst>
+          </a:blip>
+          <a:srcRect/>
+          <a:stretch>
+            <a:fillRect/>
+          </a:stretch>
+        </p:blipFill>
+        <p:spPr bwMode="auto">
+          <a:xfrm>
+            <a:off x="119449" y="1556173"/>
+            <a:ext cx="5976551" cy="4721060"/>
+          </a:xfrm>
+          <a:prstGeom prst="rect">
+            <a:avLst/>
+          </a:prstGeom>
+          <a:noFill/>
+          <a:extLst>
+            <a:ext uri="{909E8E84-426E-40DD-AFC4-6F175D3DCCD1}">
+              <a14:hiddenFill xmlns:a14="http://schemas.microsoft.com/office/drawing/2010/main">
+                <a:solidFill>
+                  <a:srgbClr val="FFFFFF"/>
+                </a:solidFill>
+              </a14:hiddenFill>
+            </a:ext>
+          </a:extLst>
+        </p:spPr>
+      </p:pic>
+    </p:spTree>
+    <p:extLst>
+      <p:ext uri="{BB962C8B-B14F-4D97-AF65-F5344CB8AC3E}">
+        <p14:creationId xmlns:p14="http://schemas.microsoft.com/office/powerpoint/2010/main" val="3756476364"/>
+      </p:ext>
+    </p:extLst>
+  </p:cSld>
+  <p:clrMapOvr>
+    <a:masterClrMapping/>
+  </p:clrMapOvr>
+</p:sld>
+</file>
+
+<file path=ppt/slides/slide12.xml><?xml version="1.0" encoding="utf-8"?>
+<p:sld xmlns:a="http://schemas.openxmlformats.org/drawingml/2006/main" xmlns:r="http://schemas.openxmlformats.org/officeDocument/2006/relationships" xmlns:p="http://schemas.openxmlformats.org/presentationml/2006/main" showMasterSp="0">
+  <p:cSld>
+    <p:spTree>
+      <p:nvGrpSpPr>
+        <p:cNvPr id="1" name=""/>
+        <p:cNvGrpSpPr/>
+        <p:nvPr/>
+      </p:nvGrpSpPr>
+      <p:grpSpPr>
+        <a:xfrm>
+          <a:off x="0" y="0"/>
+          <a:ext cx="0" cy="0"/>
+          <a:chOff x="0" y="0"/>
+          <a:chExt cx="0" cy="0"/>
+        </a:xfrm>
+      </p:grpSpPr>
+      <p:sp useBgFill="1">
+        <p:nvSpPr>
+          <p:cNvPr id="2064" name="Rectangle 2063">
+            <a:extLst>
+              <a:ext uri="{FF2B5EF4-FFF2-40B4-BE49-F238E27FC236}">
+                <a16:creationId xmlns:a16="http://schemas.microsoft.com/office/drawing/2014/main" id="{579E3846-8D0B-B14A-817A-7FAC9DDAB4D8}"/>
+              </a:ext>
+              <a:ext uri="{C183D7F6-B498-43B3-948B-1728B52AA6E4}">
+                <adec:decorative xmlns:adec="http://schemas.microsoft.com/office/drawing/2017/decorative" val="1"/>
+              </a:ext>
+            </a:extLst>
+          </p:cNvPr>
+          <p:cNvSpPr>
+            <a:spLocks noGrp="1" noRot="1" noChangeAspect="1" noMove="1" noResize="1" noEditPoints="1" noAdjustHandles="1" noChangeArrowheads="1" noChangeShapeType="1" noTextEdit="1"/>
+          </p:cNvSpPr>
+          <p:nvPr>
+            <p:extLst>
+              <p:ext uri="{386F3935-93C4-4BCD-93E2-E3B085C9AB24}">
+                <p16:designElem xmlns:p16="http://schemas.microsoft.com/office/powerpoint/2015/main" val="1"/>
+              </p:ext>
+            </p:extLst>
+          </p:nvPr>
+        </p:nvSpPr>
+        <p:spPr>
+          <a:xfrm>
+            <a:off x="0" y="0"/>
+            <a:ext cx="12192000" cy="6858000"/>
+          </a:xfrm>
+          <a:prstGeom prst="rect">
+            <a:avLst/>
+          </a:prstGeom>
+          <a:ln>
+            <a:noFill/>
+          </a:ln>
+        </p:spPr>
+        <p:style>
+          <a:lnRef idx="2">
+            <a:schemeClr val="accent1">
+              <a:shade val="50000"/>
+            </a:schemeClr>
+          </a:lnRef>
+          <a:fillRef idx="1">
+            <a:schemeClr val="accent1"/>
+          </a:fillRef>
+          <a:effectRef idx="0">
+            <a:schemeClr val="accent1"/>
+          </a:effectRef>
+          <a:fontRef idx="minor">
+            <a:schemeClr val="lt1"/>
+          </a:fontRef>
+        </p:style>
+        <p:txBody>
+          <a:bodyPr rtlCol="0" anchor="ctr"/>
+          <a:lstStyle/>
+          <a:p>
+            <a:pPr algn="ctr"/>
+            <a:endParaRPr lang="en-US"/>
+          </a:p>
+        </p:txBody>
+      </p:sp>
+      <p:sp>
+        <p:nvSpPr>
+          <p:cNvPr id="2066" name="Cross 2065">
+            <a:extLst>
+              <a:ext uri="{FF2B5EF4-FFF2-40B4-BE49-F238E27FC236}">
+                <a16:creationId xmlns:a16="http://schemas.microsoft.com/office/drawing/2014/main" id="{BE50E7BE-734F-224D-B03E-074DE1D12480}"/>
+              </a:ext>
+              <a:ext uri="{C183D7F6-B498-43B3-948B-1728B52AA6E4}">
+                <adec:decorative xmlns:adec="http://schemas.microsoft.com/office/drawing/2017/decorative" val="1"/>
+              </a:ext>
+            </a:extLst>
+          </p:cNvPr>
+          <p:cNvSpPr>
+            <a:spLocks noGrp="1" noRot="1" noChangeAspect="1" noMove="1" noResize="1" noEditPoints="1" noAdjustHandles="1" noChangeArrowheads="1" noChangeShapeType="1" noTextEdit="1"/>
+          </p:cNvSpPr>
+          <p:nvPr>
+            <p:extLst>
+              <p:ext uri="{386F3935-93C4-4BCD-93E2-E3B085C9AB24}">
+                <p16:designElem xmlns:p16="http://schemas.microsoft.com/office/powerpoint/2015/main" val="1"/>
+              </p:ext>
+            </p:extLst>
+          </p:nvPr>
+        </p:nvSpPr>
+        <p:spPr>
+          <a:xfrm>
+            <a:off x="11217667" y="5618903"/>
+            <a:ext cx="524933" cy="524933"/>
+          </a:xfrm>
+          <a:prstGeom prst="plus">
+            <a:avLst>
+              <a:gd name="adj" fmla="val 39516"/>
+            </a:avLst>
+          </a:prstGeom>
+          <a:solidFill>
+            <a:schemeClr val="tx1"/>
+          </a:solidFill>
+          <a:ln>
+            <a:noFill/>
+          </a:ln>
+        </p:spPr>
+        <p:style>
+          <a:lnRef idx="2">
+            <a:schemeClr val="accent1">
+              <a:shade val="50000"/>
+            </a:schemeClr>
+          </a:lnRef>
+          <a:fillRef idx="1">
+            <a:schemeClr val="accent1"/>
+          </a:fillRef>
+          <a:effectRef idx="0">
+            <a:schemeClr val="accent1"/>
+          </a:effectRef>
+          <a:fontRef idx="minor">
+            <a:schemeClr val="lt1"/>
+          </a:fontRef>
+        </p:style>
+        <p:txBody>
+          <a:bodyPr rtlCol="0" anchor="ctr"/>
+          <a:lstStyle/>
+          <a:p>
+            <a:pPr algn="ctr"/>
+            <a:endParaRPr lang="en-US"/>
+          </a:p>
+        </p:txBody>
+      </p:sp>
+      <p:sp>
+        <p:nvSpPr>
+          <p:cNvPr id="2068" name="Rectangle 2067">
+            <a:extLst>
+              <a:ext uri="{FF2B5EF4-FFF2-40B4-BE49-F238E27FC236}">
+                <a16:creationId xmlns:a16="http://schemas.microsoft.com/office/drawing/2014/main" id="{DCA5172B-100A-154D-8648-280629D67DD0}"/>
+              </a:ext>
+              <a:ext uri="{C183D7F6-B498-43B3-948B-1728B52AA6E4}">
+                <adec:decorative xmlns:adec="http://schemas.microsoft.com/office/drawing/2017/decorative" val="1"/>
+              </a:ext>
+            </a:extLst>
+          </p:cNvPr>
+          <p:cNvSpPr>
+            <a:spLocks noGrp="1" noRot="1" noChangeAspect="1" noMove="1" noResize="1" noEditPoints="1" noAdjustHandles="1" noChangeArrowheads="1" noChangeShapeType="1" noTextEdit="1"/>
+          </p:cNvSpPr>
+          <p:nvPr>
+            <p:extLst>
+              <p:ext uri="{386F3935-93C4-4BCD-93E2-E3B085C9AB24}">
+                <p16:designElem xmlns:p16="http://schemas.microsoft.com/office/powerpoint/2015/main" val="1"/>
+              </p:ext>
+            </p:extLst>
+          </p:nvPr>
+        </p:nvSpPr>
+        <p:spPr>
+          <a:xfrm>
+            <a:off x="9881559" y="976630"/>
+            <a:ext cx="1336774" cy="120142"/>
+          </a:xfrm>
+          <a:prstGeom prst="rect">
+            <a:avLst/>
+          </a:prstGeom>
+          <a:solidFill>
+            <a:schemeClr val="tx1"/>
+          </a:solidFill>
+          <a:ln>
+            <a:noFill/>
+          </a:ln>
+        </p:spPr>
+        <p:style>
+          <a:lnRef idx="2">
+            <a:schemeClr val="accent1">
+              <a:shade val="50000"/>
+            </a:schemeClr>
+          </a:lnRef>
+          <a:fillRef idx="1">
+            <a:schemeClr val="accent1"/>
+          </a:fillRef>
+          <a:effectRef idx="0">
+            <a:schemeClr val="accent1"/>
+          </a:effectRef>
+          <a:fontRef idx="minor">
+            <a:schemeClr val="lt1"/>
+          </a:fontRef>
+        </p:style>
+        <p:txBody>
+          <a:bodyPr rtlCol="0" anchor="ctr"/>
+          <a:lstStyle/>
+          <a:p>
+            <a:pPr algn="ctr"/>
+            <a:endParaRPr lang="en-US"/>
+          </a:p>
+        </p:txBody>
+      </p:sp>
+      <p:sp>
+        <p:nvSpPr>
+          <p:cNvPr id="2" name="Title 1">
+            <a:extLst>
+              <a:ext uri="{FF2B5EF4-FFF2-40B4-BE49-F238E27FC236}">
+                <a16:creationId xmlns:a16="http://schemas.microsoft.com/office/drawing/2014/main" id="{79DD15C5-7B05-FF00-0DBD-F18D697B2F2D}"/>
+              </a:ext>
+            </a:extLst>
+          </p:cNvPr>
+          <p:cNvSpPr>
+            <a:spLocks noGrp="1"/>
+          </p:cNvSpPr>
+          <p:nvPr>
+            <p:ph type="title"/>
+          </p:nvPr>
+        </p:nvSpPr>
+        <p:spPr>
+          <a:xfrm>
+            <a:off x="565149" y="1204721"/>
+            <a:ext cx="4114799" cy="1446550"/>
+          </a:xfrm>
+        </p:spPr>
+        <p:txBody>
+          <a:bodyPr>
+            <a:normAutofit/>
+          </a:bodyPr>
+          <a:lstStyle/>
+          <a:p>
+            <a:r>
+              <a:rPr lang="en-US" dirty="0" err="1"/>
+              <a:t>Explainability</a:t>
+            </a:r>
+            <a:endParaRPr lang="en-US" dirty="0"/>
           </a:p>
         </p:txBody>
       </p:sp>
@@ -5605,7 +6118,7 @@
           <p:cNvPr id="3" name="Content Placeholder 2">
             <a:extLst>
               <a:ext uri="{FF2B5EF4-FFF2-40B4-BE49-F238E27FC236}">
-                <a16:creationId xmlns:a16="http://schemas.microsoft.com/office/drawing/2014/main" id="{C07EF299-48C9-FBD0-E7EE-B7E76C90540A}"/>
+                <a16:creationId xmlns:a16="http://schemas.microsoft.com/office/drawing/2014/main" id="{EC9AD255-F366-57ED-6104-BF6494E1EBB3}"/>
               </a:ext>
             </a:extLst>
           </p:cNvPr>
@@ -5618,12 +6131,425 @@
         </p:nvSpPr>
         <p:spPr>
           <a:xfrm>
+            <a:off x="565148" y="2166121"/>
+            <a:ext cx="4114799" cy="3188586"/>
+          </a:xfrm>
+        </p:spPr>
+        <p:txBody>
+          <a:bodyPr>
+            <a:normAutofit/>
+          </a:bodyPr>
+          <a:lstStyle/>
+          <a:p>
+            <a:pPr marL="0" indent="0">
+              <a:lnSpc>
+                <a:spcPct val="90000"/>
+              </a:lnSpc>
+              <a:buNone/>
+            </a:pPr>
+            <a:r>
+              <a:rPr lang="en-US" sz="1700" dirty="0"/>
+              <a:t>As per RAI guidelines, all ML models needs to be explainable.</a:t>
+            </a:r>
+          </a:p>
+          <a:p>
+            <a:pPr marL="0" indent="0">
+              <a:lnSpc>
+                <a:spcPct val="90000"/>
+              </a:lnSpc>
+              <a:buNone/>
+            </a:pPr>
+            <a:r>
+              <a:rPr lang="en-US" sz="1700" dirty="0"/>
+              <a:t>But neural networks are less interpretable hence we need to use black box based explanation frameworks like SHAP to understand which words are playing how much contribution in the similarity score generation.</a:t>
+            </a:r>
+          </a:p>
+          <a:p>
+            <a:pPr marL="0" indent="0">
+              <a:lnSpc>
+                <a:spcPct val="90000"/>
+              </a:lnSpc>
+              <a:buNone/>
+            </a:pPr>
+            <a:r>
+              <a:rPr lang="en-US" sz="1700" dirty="0"/>
+              <a:t>Along with </a:t>
+            </a:r>
+            <a:r>
+              <a:rPr lang="en-US" sz="1700" dirty="0" err="1"/>
+              <a:t>explainability</a:t>
+            </a:r>
+            <a:r>
+              <a:rPr lang="en-US" sz="1700" dirty="0"/>
+              <a:t> to end users this analysis would also be really helpful in debugging the model as post-hoc analysis</a:t>
+            </a:r>
+          </a:p>
+        </p:txBody>
+      </p:sp>
+      <p:pic>
+        <p:nvPicPr>
+          <p:cNvPr id="2050" name="Picture 2" descr="Chart&#10;&#10;Description automatically generated">
+            <a:extLst>
+              <a:ext uri="{FF2B5EF4-FFF2-40B4-BE49-F238E27FC236}">
+                <a16:creationId xmlns:a16="http://schemas.microsoft.com/office/drawing/2014/main" id="{BD08A3EE-0DD1-2062-9F5B-8CDF98A92D5B}"/>
+              </a:ext>
+            </a:extLst>
+          </p:cNvPr>
+          <p:cNvPicPr>
+            <a:picLocks noChangeAspect="1" noChangeArrowheads="1"/>
+          </p:cNvPicPr>
+          <p:nvPr/>
+        </p:nvPicPr>
+        <p:blipFill>
+          <a:blip r:embed="rId2">
+            <a:extLst>
+              <a:ext uri="{28A0092B-C50C-407E-A947-70E740481C1C}">
+                <a14:useLocalDpi xmlns:a14="http://schemas.microsoft.com/office/drawing/2010/main" val="0"/>
+              </a:ext>
+            </a:extLst>
+          </a:blip>
+          <a:stretch>
+            <a:fillRect/>
+          </a:stretch>
+        </p:blipFill>
+        <p:spPr bwMode="auto">
+          <a:xfrm>
+            <a:off x="5486709" y="1912993"/>
+            <a:ext cx="5731624" cy="3295683"/>
+          </a:xfrm>
+          <a:prstGeom prst="rect">
+            <a:avLst/>
+          </a:prstGeom>
+          <a:noFill/>
+          <a:extLst>
+            <a:ext uri="{909E8E84-426E-40DD-AFC4-6F175D3DCCD1}">
+              <a14:hiddenFill xmlns:a14="http://schemas.microsoft.com/office/drawing/2010/main">
+                <a:solidFill>
+                  <a:srgbClr val="FFFFFF"/>
+                </a:solidFill>
+              </a14:hiddenFill>
+            </a:ext>
+          </a:extLst>
+        </p:spPr>
+      </p:pic>
+      <p:sp>
+        <p:nvSpPr>
+          <p:cNvPr id="5" name="TextBox 4">
+            <a:extLst>
+              <a:ext uri="{FF2B5EF4-FFF2-40B4-BE49-F238E27FC236}">
+                <a16:creationId xmlns:a16="http://schemas.microsoft.com/office/drawing/2014/main" id="{60AD3083-8EED-7338-DCF9-DF3603149CB1}"/>
+              </a:ext>
+            </a:extLst>
+          </p:cNvPr>
+          <p:cNvSpPr txBox="1"/>
+          <p:nvPr/>
+        </p:nvSpPr>
+        <p:spPr>
+          <a:xfrm>
+            <a:off x="4950373" y="5208676"/>
+            <a:ext cx="2680137" cy="923330"/>
+          </a:xfrm>
+          <a:prstGeom prst="rect">
+            <a:avLst/>
+          </a:prstGeom>
+          <a:noFill/>
+        </p:spPr>
+        <p:txBody>
+          <a:bodyPr wrap="square" rtlCol="0">
+            <a:spAutoFit/>
+          </a:bodyPr>
+          <a:lstStyle/>
+          <a:p>
+            <a:r>
+              <a:rPr lang="en-US" dirty="0"/>
+              <a:t>Input:</a:t>
+            </a:r>
+          </a:p>
+          <a:p>
+            <a:r>
+              <a:rPr lang="en-US" dirty="0"/>
+              <a:t>Sent1: “He hates apples”</a:t>
+            </a:r>
+          </a:p>
+          <a:p>
+            <a:r>
+              <a:rPr lang="en-US" dirty="0"/>
+              <a:t>Sent2: “He likes applies”</a:t>
+            </a:r>
+          </a:p>
+        </p:txBody>
+      </p:sp>
+      <p:sp>
+        <p:nvSpPr>
+          <p:cNvPr id="6" name="TextBox 5">
+            <a:extLst>
+              <a:ext uri="{FF2B5EF4-FFF2-40B4-BE49-F238E27FC236}">
+                <a16:creationId xmlns:a16="http://schemas.microsoft.com/office/drawing/2014/main" id="{1B680FC4-3FF0-2EA2-824F-B43B0B212671}"/>
+              </a:ext>
+            </a:extLst>
+          </p:cNvPr>
+          <p:cNvSpPr txBox="1"/>
+          <p:nvPr/>
+        </p:nvSpPr>
+        <p:spPr>
+          <a:xfrm>
+            <a:off x="7762614" y="5088709"/>
+            <a:ext cx="3941074" cy="1754326"/>
+          </a:xfrm>
+          <a:prstGeom prst="rect">
+            <a:avLst/>
+          </a:prstGeom>
+          <a:noFill/>
+        </p:spPr>
+        <p:txBody>
+          <a:bodyPr wrap="square" rtlCol="0">
+            <a:spAutoFit/>
+          </a:bodyPr>
+          <a:lstStyle/>
+          <a:p>
+            <a:r>
+              <a:rPr lang="en-US" dirty="0"/>
+              <a:t>Interpretation:</a:t>
+            </a:r>
+          </a:p>
+          <a:p>
+            <a:r>
+              <a:rPr lang="en-US" dirty="0"/>
+              <a:t>The words “hates” and “likes” are negatively contributing to the similarity score and ”apples” is positively contributing. Which is obvious.</a:t>
+            </a:r>
+          </a:p>
+        </p:txBody>
+      </p:sp>
+    </p:spTree>
+    <p:extLst>
+      <p:ext uri="{BB962C8B-B14F-4D97-AF65-F5344CB8AC3E}">
+        <p14:creationId xmlns:p14="http://schemas.microsoft.com/office/powerpoint/2010/main" val="3309442883"/>
+      </p:ext>
+    </p:extLst>
+  </p:cSld>
+  <p:clrMapOvr>
+    <a:masterClrMapping/>
+  </p:clrMapOvr>
+</p:sld>
+</file>
+
+<file path=ppt/slides/slide13.xml><?xml version="1.0" encoding="utf-8"?>
+<p:sld xmlns:a="http://schemas.openxmlformats.org/drawingml/2006/main" xmlns:r="http://schemas.openxmlformats.org/officeDocument/2006/relationships" xmlns:p="http://schemas.openxmlformats.org/presentationml/2006/main" showMasterSp="0">
+  <p:cSld>
+    <p:spTree>
+      <p:nvGrpSpPr>
+        <p:cNvPr id="1" name=""/>
+        <p:cNvGrpSpPr/>
+        <p:nvPr/>
+      </p:nvGrpSpPr>
+      <p:grpSpPr>
+        <a:xfrm>
+          <a:off x="0" y="0"/>
+          <a:ext cx="0" cy="0"/>
+          <a:chOff x="0" y="0"/>
+          <a:chExt cx="0" cy="0"/>
+        </a:xfrm>
+      </p:grpSpPr>
+      <p:sp>
+        <p:nvSpPr>
+          <p:cNvPr id="2" name="Title 1">
+            <a:extLst>
+              <a:ext uri="{FF2B5EF4-FFF2-40B4-BE49-F238E27FC236}">
+                <a16:creationId xmlns:a16="http://schemas.microsoft.com/office/drawing/2014/main" id="{4D689CBE-5B2F-19BB-7BF6-B8629BABDAED}"/>
+              </a:ext>
+            </a:extLst>
+          </p:cNvPr>
+          <p:cNvSpPr>
+            <a:spLocks noGrp="1"/>
+          </p:cNvSpPr>
+          <p:nvPr>
+            <p:ph type="title"/>
+          </p:nvPr>
+        </p:nvSpPr>
+        <p:spPr>
+          <a:xfrm>
+            <a:off x="466295" y="389175"/>
+            <a:ext cx="8267296" cy="1446550"/>
+          </a:xfrm>
+        </p:spPr>
+        <p:txBody>
+          <a:bodyPr/>
+          <a:lstStyle/>
+          <a:p>
+            <a:r>
+              <a:rPr lang="en-US" dirty="0"/>
+              <a:t>Extensibility</a:t>
+            </a:r>
+          </a:p>
+        </p:txBody>
+      </p:sp>
+      <p:sp>
+        <p:nvSpPr>
+          <p:cNvPr id="3" name="Content Placeholder 2">
+            <a:extLst>
+              <a:ext uri="{FF2B5EF4-FFF2-40B4-BE49-F238E27FC236}">
+                <a16:creationId xmlns:a16="http://schemas.microsoft.com/office/drawing/2014/main" id="{A81BD03E-2FF5-7B14-621E-D6D207B2615A}"/>
+              </a:ext>
+            </a:extLst>
+          </p:cNvPr>
+          <p:cNvSpPr>
+            <a:spLocks noGrp="1"/>
+          </p:cNvSpPr>
+          <p:nvPr>
+            <p:ph idx="1"/>
+          </p:nvPr>
+        </p:nvSpPr>
+        <p:spPr>
+          <a:xfrm>
+            <a:off x="466294" y="1493033"/>
+            <a:ext cx="11420905" cy="3188586"/>
+          </a:xfrm>
+        </p:spPr>
+        <p:txBody>
+          <a:bodyPr>
+            <a:normAutofit fontScale="92500"/>
+          </a:bodyPr>
+          <a:lstStyle/>
+          <a:p>
+            <a:pPr>
+              <a:buFont typeface="Arial" panose="020B0604020202020204" pitchFamily="34" charset="0"/>
+              <a:buChar char="•"/>
+            </a:pPr>
+            <a:r>
+              <a:rPr lang="en-US" dirty="0"/>
+              <a:t>Semantic search is a very powerful and fundamental to real world applications like question-answering. </a:t>
+            </a:r>
+            <a:br>
+              <a:rPr lang="en-US" dirty="0"/>
+            </a:br>
+            <a:r>
+              <a:rPr lang="en-US" dirty="0"/>
+              <a:t>Sent1: “Where is Swaroop going”</a:t>
+            </a:r>
+            <a:br>
+              <a:rPr lang="en-US" dirty="0"/>
+            </a:br>
+            <a:r>
+              <a:rPr lang="en-US" dirty="0"/>
+              <a:t>Sent2: “Swaroop is going to college”</a:t>
+            </a:r>
+            <a:br>
+              <a:rPr lang="en-US" dirty="0"/>
+            </a:br>
+            <a:r>
+              <a:rPr lang="en-US" dirty="0"/>
+              <a:t>Based on input query and similarity score the most matching sentence to be retrieved</a:t>
+            </a:r>
+          </a:p>
+          <a:p>
+            <a:pPr>
+              <a:buFont typeface="Arial" panose="020B0604020202020204" pitchFamily="34" charset="0"/>
+              <a:buChar char="•"/>
+            </a:pPr>
+            <a:r>
+              <a:rPr lang="en-US" dirty="0"/>
+              <a:t>Existing </a:t>
+            </a:r>
+            <a:r>
+              <a:rPr lang="en-US" dirty="0" err="1"/>
+              <a:t>explainability</a:t>
+            </a:r>
+            <a:r>
+              <a:rPr lang="en-US" dirty="0"/>
+              <a:t> frameworks are not effective in explaining how models works especially LLM and neural network models. More research to be conducted to generate human friendly explanations through counterfactual explanations.</a:t>
+            </a:r>
+          </a:p>
+        </p:txBody>
+      </p:sp>
+    </p:spTree>
+    <p:extLst>
+      <p:ext uri="{BB962C8B-B14F-4D97-AF65-F5344CB8AC3E}">
+        <p14:creationId xmlns:p14="http://schemas.microsoft.com/office/powerpoint/2010/main" val="2762595328"/>
+      </p:ext>
+    </p:extLst>
+  </p:cSld>
+  <p:clrMapOvr>
+    <a:masterClrMapping/>
+  </p:clrMapOvr>
+</p:sld>
+</file>
+
+<file path=ppt/slides/slide14.xml><?xml version="1.0" encoding="utf-8"?>
+<p:sld xmlns:a="http://schemas.openxmlformats.org/drawingml/2006/main" xmlns:r="http://schemas.openxmlformats.org/officeDocument/2006/relationships" xmlns:p="http://schemas.openxmlformats.org/presentationml/2006/main" showMasterSp="0">
+  <p:cSld>
+    <p:spTree>
+      <p:nvGrpSpPr>
+        <p:cNvPr id="1" name=""/>
+        <p:cNvGrpSpPr/>
+        <p:nvPr/>
+      </p:nvGrpSpPr>
+      <p:grpSpPr>
+        <a:xfrm>
+          <a:off x="0" y="0"/>
+          <a:ext cx="0" cy="0"/>
+          <a:chOff x="0" y="0"/>
+          <a:chExt cx="0" cy="0"/>
+        </a:xfrm>
+      </p:grpSpPr>
+      <p:sp>
+        <p:nvSpPr>
+          <p:cNvPr id="2" name="Title 1">
+            <a:extLst>
+              <a:ext uri="{FF2B5EF4-FFF2-40B4-BE49-F238E27FC236}">
+                <a16:creationId xmlns:a16="http://schemas.microsoft.com/office/drawing/2014/main" id="{8E1AB827-4E97-BC36-3BAA-5158B9D7AD90}"/>
+              </a:ext>
+            </a:extLst>
+          </p:cNvPr>
+          <p:cNvSpPr>
+            <a:spLocks noGrp="1"/>
+          </p:cNvSpPr>
+          <p:nvPr>
+            <p:ph type="title"/>
+          </p:nvPr>
+        </p:nvSpPr>
+        <p:spPr>
+          <a:xfrm>
+            <a:off x="416867" y="389175"/>
+            <a:ext cx="11643327" cy="1446550"/>
+          </a:xfrm>
+        </p:spPr>
+        <p:txBody>
+          <a:bodyPr/>
+          <a:lstStyle/>
+          <a:p>
+            <a:r>
+              <a:rPr lang="en-US" dirty="0"/>
+              <a:t>Conclusion</a:t>
+            </a:r>
+          </a:p>
+        </p:txBody>
+      </p:sp>
+      <p:sp>
+        <p:nvSpPr>
+          <p:cNvPr id="3" name="Content Placeholder 2">
+            <a:extLst>
+              <a:ext uri="{FF2B5EF4-FFF2-40B4-BE49-F238E27FC236}">
+                <a16:creationId xmlns:a16="http://schemas.microsoft.com/office/drawing/2014/main" id="{C07EF299-48C9-FBD0-E7EE-B7E76C90540A}"/>
+              </a:ext>
+            </a:extLst>
+          </p:cNvPr>
+          <p:cNvSpPr>
+            <a:spLocks noGrp="1"/>
+          </p:cNvSpPr>
+          <p:nvPr>
+            <p:ph idx="1"/>
+          </p:nvPr>
+        </p:nvSpPr>
+        <p:spPr>
+          <a:xfrm>
             <a:off x="515722" y="1653670"/>
             <a:ext cx="11433261" cy="3188586"/>
           </a:xfrm>
         </p:spPr>
         <p:txBody>
-          <a:bodyPr/>
+          <a:bodyPr>
+            <a:normAutofit fontScale="70000" lnSpcReduction="20000"/>
+          </a:bodyPr>
           <a:lstStyle/>
           <a:p>
             <a:pPr marL="0" indent="0">
@@ -5631,7 +6557,7 @@
             </a:pPr>
             <a:r>
               <a:rPr lang="en-US" dirty="0"/>
-              <a:t>Even state of art models like Bert is also not able to capture the context and with more labelled data these issues can be solved by fine tuning the models:</a:t>
+              <a:t>In this project we have applied various deep learning and traditional model architectures to generate sentence similarity scores. We have demonstrated and documented reproducible experiments for reference.</a:t>
             </a:r>
           </a:p>
           <a:p>
@@ -5640,7 +6566,23 @@
             </a:pPr>
             <a:r>
               <a:rPr lang="en-US" dirty="0"/>
-              <a:t>Sent1: “boy came to college”</a:t>
+              <a:t>We trained models on both multi lingual (</a:t>
+            </a:r>
+            <a:r>
+              <a:rPr lang="en-US" dirty="0" err="1"/>
+              <a:t>en-en</a:t>
+            </a:r>
+            <a:r>
+              <a:rPr lang="en-US" dirty="0"/>
+              <a:t>, es-es) and cross lingual (</a:t>
+            </a:r>
+            <a:r>
+              <a:rPr lang="en-US" dirty="0" err="1"/>
+              <a:t>en</a:t>
+            </a:r>
+            <a:r>
+              <a:rPr lang="en-US" dirty="0"/>
+              <a:t>-es) sentence pairs and generated semantic similarity scores.</a:t>
             </a:r>
           </a:p>
           <a:p>
@@ -5649,7 +6591,23 @@
             </a:pPr>
             <a:r>
               <a:rPr lang="en-US" dirty="0"/>
-              <a:t>Sent2: “boy came from college”</a:t>
+              <a:t>We also researched and extended our implementation with </a:t>
+            </a:r>
+            <a:r>
+              <a:rPr lang="en-US" dirty="0" err="1"/>
+              <a:t>explainability</a:t>
+            </a:r>
+            <a:r>
+              <a:rPr lang="en-US" dirty="0"/>
+              <a:t> and generated </a:t>
+            </a:r>
+            <a:r>
+              <a:rPr lang="en-US" dirty="0" err="1"/>
+              <a:t>shap</a:t>
+            </a:r>
+            <a:r>
+              <a:rPr lang="en-US" dirty="0"/>
+              <a:t> waterfall plots for the same.</a:t>
             </a:r>
           </a:p>
           <a:p>
@@ -5658,7 +6616,34 @@
             </a:pPr>
             <a:r>
               <a:rPr lang="en-US" dirty="0"/>
-              <a:t>STS Score: 4.77</a:t>
+              <a:t>Some findings: Even state of art models like Bert is also not able to capture the context and it is likely that with more labelled data these issues can be solved by fine tuning the models:</a:t>
+            </a:r>
+          </a:p>
+          <a:p>
+            <a:pPr marL="0" indent="0">
+              <a:buNone/>
+            </a:pPr>
+            <a:r>
+              <a:rPr lang="en-US" dirty="0"/>
+              <a:t>Sent1: “boy came to college”</a:t>
+            </a:r>
+          </a:p>
+          <a:p>
+            <a:pPr marL="0" indent="0">
+              <a:buNone/>
+            </a:pPr>
+            <a:r>
+              <a:rPr lang="en-US" dirty="0"/>
+              <a:t>Sent2: “boy came from college”</a:t>
+            </a:r>
+          </a:p>
+          <a:p>
+            <a:pPr marL="0" indent="0">
+              <a:buNone/>
+            </a:pPr>
+            <a:r>
+              <a:rPr lang="en-US" dirty="0"/>
+              <a:t>Predicted STS Score: 4.77</a:t>
             </a:r>
           </a:p>
         </p:txBody>
@@ -5744,12 +6729,14 @@
         </p:nvSpPr>
         <p:spPr>
           <a:xfrm>
-            <a:off x="461250" y="1167638"/>
-            <a:ext cx="8267296" cy="3188586"/>
-          </a:xfrm>
-        </p:spPr>
-        <p:txBody>
-          <a:bodyPr/>
+            <a:off x="461249" y="1167637"/>
+            <a:ext cx="9029591" cy="4528969"/>
+          </a:xfrm>
+        </p:spPr>
+        <p:txBody>
+          <a:bodyPr>
+            <a:normAutofit/>
+          </a:bodyPr>
           <a:lstStyle/>
           <a:p>
             <a:pPr>
@@ -5810,6 +6797,16 @@
             <a:r>
               <a:rPr lang="en-US" dirty="0"/>
               <a:t>Extensibility</a:t>
+            </a:r>
+          </a:p>
+          <a:p>
+            <a:pPr>
+              <a:buFont typeface="Arial" panose="020B0604020202020204" pitchFamily="34" charset="0"/>
+              <a:buChar char="•"/>
+            </a:pPr>
+            <a:r>
+              <a:rPr lang="en-US" dirty="0"/>
+              <a:t>Conclusion</a:t>
             </a:r>
           </a:p>
           <a:p>
@@ -7043,6 +8040,13 @@
               <a:rPr lang="en-US" dirty="0"/>
               <a:t>Sentence1</a:t>
             </a:r>
+            <a:br>
+              <a:rPr lang="en-US" dirty="0"/>
+            </a:br>
+            <a:r>
+              <a:rPr lang="en-US" dirty="0"/>
+              <a:t>mean</a:t>
+            </a:r>
           </a:p>
         </p:txBody>
       </p:sp>
@@ -7095,6 +8099,13 @@
             <a:r>
               <a:rPr lang="en-US" dirty="0"/>
               <a:t>Sentence2</a:t>
+            </a:r>
+            <a:br>
+              <a:rPr lang="en-US" dirty="0"/>
+            </a:br>
+            <a:r>
+              <a:rPr lang="en-US" dirty="0"/>
+              <a:t>mean</a:t>
             </a:r>
           </a:p>
         </p:txBody>
@@ -7933,7 +8944,7 @@
           <p:cNvPr id="2" name="Title 1">
             <a:extLst>
               <a:ext uri="{FF2B5EF4-FFF2-40B4-BE49-F238E27FC236}">
-                <a16:creationId xmlns:a16="http://schemas.microsoft.com/office/drawing/2014/main" id="{3603CCCC-1A3E-BE97-ED0F-4024889EB742}"/>
+                <a16:creationId xmlns:a16="http://schemas.microsoft.com/office/drawing/2014/main" id="{502E1233-F0E1-189A-01DE-535130D718DD}"/>
               </a:ext>
             </a:extLst>
           </p:cNvPr>
@@ -7946,8 +8957,8 @@
         </p:nvSpPr>
         <p:spPr>
           <a:xfrm>
-            <a:off x="565149" y="376819"/>
-            <a:ext cx="11532115" cy="1446550"/>
+            <a:off x="565150" y="500386"/>
+            <a:ext cx="11371478" cy="846500"/>
           </a:xfrm>
         </p:spPr>
         <p:txBody>
@@ -7956,7 +8967,7 @@
           <a:p>
             <a:r>
               <a:rPr lang="en-US" dirty="0"/>
-              <a:t>Model Designs:</a:t>
+              <a:t>Model Designs</a:t>
             </a:r>
           </a:p>
         </p:txBody>
@@ -7966,7 +8977,7 @@
           <p:cNvPr id="3" name="Content Placeholder 2">
             <a:extLst>
               <a:ext uri="{FF2B5EF4-FFF2-40B4-BE49-F238E27FC236}">
-                <a16:creationId xmlns:a16="http://schemas.microsoft.com/office/drawing/2014/main" id="{66758C92-F5EB-1DFB-60D6-B2877C875030}"/>
+                <a16:creationId xmlns:a16="http://schemas.microsoft.com/office/drawing/2014/main" id="{1C3837E5-F2DB-8A5D-5B43-186D4FC3BEA4}"/>
               </a:ext>
             </a:extLst>
           </p:cNvPr>
@@ -7979,8 +8990,8 @@
         </p:nvSpPr>
         <p:spPr>
           <a:xfrm>
-            <a:off x="565149" y="1320038"/>
-            <a:ext cx="11061702" cy="3188586"/>
+            <a:off x="565150" y="1443605"/>
+            <a:ext cx="11371478" cy="4808914"/>
           </a:xfrm>
         </p:spPr>
         <p:txBody>
@@ -7992,44 +9003,657 @@
             </a:pPr>
             <a:r>
               <a:rPr lang="en-US" dirty="0"/>
-              <a:t>Design3: </a:t>
+              <a:t>Design3: Siamese </a:t>
+            </a:r>
+            <a:r>
+              <a:rPr lang="en-US" dirty="0" err="1"/>
+              <a:t>BiLSTM</a:t>
+            </a:r>
+            <a:r>
+              <a:rPr lang="en-US" dirty="0"/>
+              <a:t> neural network with self attention</a:t>
             </a:r>
           </a:p>
           <a:p>
             <a:pPr marL="0" indent="0">
               <a:buNone/>
             </a:pPr>
+            <a:endParaRPr lang="en-US" dirty="0"/>
+          </a:p>
+        </p:txBody>
+      </p:sp>
+      <p:sp>
+        <p:nvSpPr>
+          <p:cNvPr id="4" name="Rounded Rectangle 3">
+            <a:extLst>
+              <a:ext uri="{FF2B5EF4-FFF2-40B4-BE49-F238E27FC236}">
+                <a16:creationId xmlns:a16="http://schemas.microsoft.com/office/drawing/2014/main" id="{018AF050-79AD-DF04-86BF-07489D9AA24D}"/>
+              </a:ext>
+            </a:extLst>
+          </p:cNvPr>
+          <p:cNvSpPr/>
+          <p:nvPr/>
+        </p:nvSpPr>
+        <p:spPr>
+          <a:xfrm>
+            <a:off x="565150" y="2320919"/>
+            <a:ext cx="1509024" cy="1138895"/>
+          </a:xfrm>
+          <a:prstGeom prst="roundRect">
+            <a:avLst/>
+          </a:prstGeom>
+          <a:solidFill>
+            <a:srgbClr val="0070C0"/>
+          </a:solidFill>
+          <a:ln>
+            <a:noFill/>
+          </a:ln>
+        </p:spPr>
+        <p:style>
+          <a:lnRef idx="0">
+            <a:scrgbClr r="0" g="0" b="0"/>
+          </a:lnRef>
+          <a:fillRef idx="0">
+            <a:scrgbClr r="0" g="0" b="0"/>
+          </a:fillRef>
+          <a:effectRef idx="0">
+            <a:scrgbClr r="0" g="0" b="0"/>
+          </a:effectRef>
+          <a:fontRef idx="minor">
+            <a:schemeClr val="lt1"/>
+          </a:fontRef>
+        </p:style>
+        <p:txBody>
+          <a:bodyPr rtlCol="0" anchor="ctr"/>
+          <a:lstStyle/>
+          <a:p>
+            <a:pPr algn="ctr"/>
             <a:r>
               <a:rPr lang="en-US" dirty="0"/>
-              <a:t>Load Pretrained models and fine tune for the current dataset like:</a:t>
-            </a:r>
-          </a:p>
-          <a:p>
-            <a:pPr lvl="1">
-              <a:buFont typeface="Arial" panose="020B0604020202020204" pitchFamily="34" charset="0"/>
-              <a:buChar char="•"/>
-            </a:pPr>
+              <a:t>Word2vec embeddings of sentence1</a:t>
+            </a:r>
+          </a:p>
+        </p:txBody>
+      </p:sp>
+      <p:sp>
+        <p:nvSpPr>
+          <p:cNvPr id="5" name="Rounded Rectangle 4">
+            <a:extLst>
+              <a:ext uri="{FF2B5EF4-FFF2-40B4-BE49-F238E27FC236}">
+                <a16:creationId xmlns:a16="http://schemas.microsoft.com/office/drawing/2014/main" id="{58AE5A5D-51F4-3B0B-F300-A4A4C6607039}"/>
+              </a:ext>
+            </a:extLst>
+          </p:cNvPr>
+          <p:cNvSpPr/>
+          <p:nvPr/>
+        </p:nvSpPr>
+        <p:spPr>
+          <a:xfrm>
+            <a:off x="593895" y="4286719"/>
+            <a:ext cx="1509024" cy="1138895"/>
+          </a:xfrm>
+          <a:prstGeom prst="roundRect">
+            <a:avLst/>
+          </a:prstGeom>
+          <a:solidFill>
+            <a:srgbClr val="0070C0"/>
+          </a:solidFill>
+          <a:ln>
+            <a:noFill/>
+          </a:ln>
+        </p:spPr>
+        <p:style>
+          <a:lnRef idx="0">
+            <a:scrgbClr r="0" g="0" b="0"/>
+          </a:lnRef>
+          <a:fillRef idx="0">
+            <a:scrgbClr r="0" g="0" b="0"/>
+          </a:fillRef>
+          <a:effectRef idx="0">
+            <a:scrgbClr r="0" g="0" b="0"/>
+          </a:effectRef>
+          <a:fontRef idx="minor">
+            <a:schemeClr val="lt1"/>
+          </a:fontRef>
+        </p:style>
+        <p:txBody>
+          <a:bodyPr rtlCol="0" anchor="ctr"/>
+          <a:lstStyle/>
+          <a:p>
+            <a:pPr algn="ctr"/>
             <a:r>
               <a:rPr lang="en-US" dirty="0"/>
-              <a:t>Fine tune Doc2vec model on current dataset</a:t>
-            </a:r>
-          </a:p>
-          <a:p>
-            <a:pPr lvl="1">
-              <a:buFont typeface="Arial" panose="020B0604020202020204" pitchFamily="34" charset="0"/>
-              <a:buChar char="•"/>
-            </a:pPr>
+              <a:t>Word2vec embeddings of sentence2</a:t>
+            </a:r>
+          </a:p>
+        </p:txBody>
+      </p:sp>
+      <p:sp>
+        <p:nvSpPr>
+          <p:cNvPr id="19" name="Rounded Rectangle 18">
+            <a:extLst>
+              <a:ext uri="{FF2B5EF4-FFF2-40B4-BE49-F238E27FC236}">
+                <a16:creationId xmlns:a16="http://schemas.microsoft.com/office/drawing/2014/main" id="{49E6F8A5-C478-A738-1DB0-3E623981B56B}"/>
+              </a:ext>
+            </a:extLst>
+          </p:cNvPr>
+          <p:cNvSpPr/>
+          <p:nvPr/>
+        </p:nvSpPr>
+        <p:spPr>
+          <a:xfrm>
+            <a:off x="5451087" y="3147824"/>
+            <a:ext cx="1452693" cy="1138895"/>
+          </a:xfrm>
+          <a:prstGeom prst="roundRect">
+            <a:avLst/>
+          </a:prstGeom>
+          <a:solidFill>
+            <a:srgbClr val="0070C0"/>
+          </a:solidFill>
+          <a:ln>
+            <a:noFill/>
+          </a:ln>
+        </p:spPr>
+        <p:style>
+          <a:lnRef idx="0">
+            <a:scrgbClr r="0" g="0" b="0"/>
+          </a:lnRef>
+          <a:fillRef idx="0">
+            <a:scrgbClr r="0" g="0" b="0"/>
+          </a:fillRef>
+          <a:effectRef idx="0">
+            <a:scrgbClr r="0" g="0" b="0"/>
+          </a:effectRef>
+          <a:fontRef idx="minor">
+            <a:schemeClr val="lt1"/>
+          </a:fontRef>
+        </p:style>
+        <p:txBody>
+          <a:bodyPr rtlCol="0" anchor="ctr"/>
+          <a:lstStyle/>
+          <a:p>
+            <a:pPr algn="ctr"/>
             <a:r>
               <a:rPr lang="en-US" dirty="0"/>
-              <a:t>Fine tune SBERT model to achieve state of art like results</a:t>
-            </a:r>
-          </a:p>
-        </p:txBody>
-      </p:sp>
+              <a:t>Self Attention</a:t>
+            </a:r>
+          </a:p>
+        </p:txBody>
+      </p:sp>
+      <p:sp>
+        <p:nvSpPr>
+          <p:cNvPr id="22" name="Rounded Rectangle 21">
+            <a:extLst>
+              <a:ext uri="{FF2B5EF4-FFF2-40B4-BE49-F238E27FC236}">
+                <a16:creationId xmlns:a16="http://schemas.microsoft.com/office/drawing/2014/main" id="{B15ABBD0-D154-DA61-51A3-5C481ECAEE22}"/>
+              </a:ext>
+            </a:extLst>
+          </p:cNvPr>
+          <p:cNvSpPr/>
+          <p:nvPr/>
+        </p:nvSpPr>
+        <p:spPr>
+          <a:xfrm>
+            <a:off x="7924972" y="3147824"/>
+            <a:ext cx="1334529" cy="1138895"/>
+          </a:xfrm>
+          <a:prstGeom prst="roundRect">
+            <a:avLst/>
+          </a:prstGeom>
+          <a:solidFill>
+            <a:srgbClr val="0070C0"/>
+          </a:solidFill>
+          <a:ln>
+            <a:noFill/>
+          </a:ln>
+        </p:spPr>
+        <p:style>
+          <a:lnRef idx="0">
+            <a:scrgbClr r="0" g="0" b="0"/>
+          </a:lnRef>
+          <a:fillRef idx="0">
+            <a:scrgbClr r="0" g="0" b="0"/>
+          </a:fillRef>
+          <a:effectRef idx="0">
+            <a:scrgbClr r="0" g="0" b="0"/>
+          </a:effectRef>
+          <a:fontRef idx="minor">
+            <a:schemeClr val="lt1"/>
+          </a:fontRef>
+        </p:style>
+        <p:txBody>
+          <a:bodyPr rtlCol="0" anchor="ctr"/>
+          <a:lstStyle/>
+          <a:p>
+            <a:pPr algn="ctr"/>
+            <a:r>
+              <a:rPr lang="en-US" dirty="0"/>
+              <a:t>FC Linear Layer</a:t>
+            </a:r>
+          </a:p>
+        </p:txBody>
+      </p:sp>
+      <p:sp>
+        <p:nvSpPr>
+          <p:cNvPr id="23" name="Rounded Rectangle 22">
+            <a:extLst>
+              <a:ext uri="{FF2B5EF4-FFF2-40B4-BE49-F238E27FC236}">
+                <a16:creationId xmlns:a16="http://schemas.microsoft.com/office/drawing/2014/main" id="{5CB4247B-36BD-E62E-3273-6602DE36E864}"/>
+              </a:ext>
+            </a:extLst>
+          </p:cNvPr>
+          <p:cNvSpPr/>
+          <p:nvPr/>
+        </p:nvSpPr>
+        <p:spPr>
+          <a:xfrm>
+            <a:off x="9728841" y="3147824"/>
+            <a:ext cx="1452693" cy="1138895"/>
+          </a:xfrm>
+          <a:prstGeom prst="roundRect">
+            <a:avLst/>
+          </a:prstGeom>
+          <a:solidFill>
+            <a:srgbClr val="0070C0"/>
+          </a:solidFill>
+          <a:ln>
+            <a:noFill/>
+          </a:ln>
+        </p:spPr>
+        <p:style>
+          <a:lnRef idx="0">
+            <a:scrgbClr r="0" g="0" b="0"/>
+          </a:lnRef>
+          <a:fillRef idx="0">
+            <a:scrgbClr r="0" g="0" b="0"/>
+          </a:fillRef>
+          <a:effectRef idx="0">
+            <a:scrgbClr r="0" g="0" b="0"/>
+          </a:effectRef>
+          <a:fontRef idx="minor">
+            <a:schemeClr val="lt1"/>
+          </a:fontRef>
+        </p:style>
+        <p:txBody>
+          <a:bodyPr rtlCol="0" anchor="ctr"/>
+          <a:lstStyle/>
+          <a:p>
+            <a:pPr algn="ctr"/>
+            <a:r>
+              <a:rPr lang="en-US" dirty="0"/>
+              <a:t>Output as Regression scores from 0 to 1</a:t>
+            </a:r>
+          </a:p>
+        </p:txBody>
+      </p:sp>
+      <p:cxnSp>
+        <p:nvCxnSpPr>
+          <p:cNvPr id="27" name="Straight Arrow Connector 26">
+            <a:extLst>
+              <a:ext uri="{FF2B5EF4-FFF2-40B4-BE49-F238E27FC236}">
+                <a16:creationId xmlns:a16="http://schemas.microsoft.com/office/drawing/2014/main" id="{31223BA0-E740-52F8-7257-CA4E1BF4B08F}"/>
+              </a:ext>
+            </a:extLst>
+          </p:cNvPr>
+          <p:cNvCxnSpPr>
+            <a:cxnSpLocks/>
+            <a:stCxn id="19" idx="3"/>
+            <a:endCxn id="22" idx="1"/>
+          </p:cNvCxnSpPr>
+          <p:nvPr/>
+        </p:nvCxnSpPr>
+        <p:spPr>
+          <a:xfrm>
+            <a:off x="6903780" y="3717272"/>
+            <a:ext cx="1021192" cy="0"/>
+          </a:xfrm>
+          <a:prstGeom prst="straightConnector1">
+            <a:avLst/>
+          </a:prstGeom>
+          <a:ln>
+            <a:tailEnd type="triangle"/>
+          </a:ln>
+        </p:spPr>
+        <p:style>
+          <a:lnRef idx="1">
+            <a:schemeClr val="accent1"/>
+          </a:lnRef>
+          <a:fillRef idx="0">
+            <a:schemeClr val="accent1"/>
+          </a:fillRef>
+          <a:effectRef idx="0">
+            <a:schemeClr val="accent1"/>
+          </a:effectRef>
+          <a:fontRef idx="minor">
+            <a:schemeClr val="tx1"/>
+          </a:fontRef>
+        </p:style>
+      </p:cxnSp>
+      <p:cxnSp>
+        <p:nvCxnSpPr>
+          <p:cNvPr id="31" name="Straight Arrow Connector 30">
+            <a:extLst>
+              <a:ext uri="{FF2B5EF4-FFF2-40B4-BE49-F238E27FC236}">
+                <a16:creationId xmlns:a16="http://schemas.microsoft.com/office/drawing/2014/main" id="{A5A94F4A-A07B-9E09-9C04-F7D6FBCFD6A9}"/>
+              </a:ext>
+            </a:extLst>
+          </p:cNvPr>
+          <p:cNvCxnSpPr>
+            <a:stCxn id="22" idx="3"/>
+            <a:endCxn id="23" idx="1"/>
+          </p:cNvCxnSpPr>
+          <p:nvPr/>
+        </p:nvCxnSpPr>
+        <p:spPr>
+          <a:xfrm>
+            <a:off x="9259501" y="3717272"/>
+            <a:ext cx="469340" cy="0"/>
+          </a:xfrm>
+          <a:prstGeom prst="straightConnector1">
+            <a:avLst/>
+          </a:prstGeom>
+          <a:ln>
+            <a:tailEnd type="triangle"/>
+          </a:ln>
+        </p:spPr>
+        <p:style>
+          <a:lnRef idx="1">
+            <a:schemeClr val="accent1"/>
+          </a:lnRef>
+          <a:fillRef idx="0">
+            <a:schemeClr val="accent1"/>
+          </a:fillRef>
+          <a:effectRef idx="0">
+            <a:schemeClr val="accent1"/>
+          </a:effectRef>
+          <a:fontRef idx="minor">
+            <a:schemeClr val="tx1"/>
+          </a:fontRef>
+        </p:style>
+      </p:cxnSp>
+      <p:sp>
+        <p:nvSpPr>
+          <p:cNvPr id="17" name="Rounded Rectangle 16">
+            <a:extLst>
+              <a:ext uri="{FF2B5EF4-FFF2-40B4-BE49-F238E27FC236}">
+                <a16:creationId xmlns:a16="http://schemas.microsoft.com/office/drawing/2014/main" id="{B5865494-17F6-992F-1E5E-17CF3736FA16}"/>
+              </a:ext>
+            </a:extLst>
+          </p:cNvPr>
+          <p:cNvSpPr/>
+          <p:nvPr/>
+        </p:nvSpPr>
+        <p:spPr>
+          <a:xfrm>
+            <a:off x="3095366" y="2320919"/>
+            <a:ext cx="1334529" cy="1138895"/>
+          </a:xfrm>
+          <a:prstGeom prst="roundRect">
+            <a:avLst/>
+          </a:prstGeom>
+          <a:solidFill>
+            <a:srgbClr val="0070C0"/>
+          </a:solidFill>
+          <a:ln>
+            <a:noFill/>
+          </a:ln>
+        </p:spPr>
+        <p:style>
+          <a:lnRef idx="0">
+            <a:scrgbClr r="0" g="0" b="0"/>
+          </a:lnRef>
+          <a:fillRef idx="0">
+            <a:scrgbClr r="0" g="0" b="0"/>
+          </a:fillRef>
+          <a:effectRef idx="0">
+            <a:scrgbClr r="0" g="0" b="0"/>
+          </a:effectRef>
+          <a:fontRef idx="minor">
+            <a:schemeClr val="lt1"/>
+          </a:fontRef>
+        </p:style>
+        <p:txBody>
+          <a:bodyPr rtlCol="0" anchor="ctr"/>
+          <a:lstStyle/>
+          <a:p>
+            <a:pPr algn="ctr"/>
+            <a:r>
+              <a:rPr lang="en-US" dirty="0" err="1"/>
+              <a:t>BiLSTM</a:t>
+            </a:r>
+            <a:endParaRPr lang="en-US" dirty="0"/>
+          </a:p>
+        </p:txBody>
+      </p:sp>
+      <p:sp>
+        <p:nvSpPr>
+          <p:cNvPr id="20" name="Rounded Rectangle 19">
+            <a:extLst>
+              <a:ext uri="{FF2B5EF4-FFF2-40B4-BE49-F238E27FC236}">
+                <a16:creationId xmlns:a16="http://schemas.microsoft.com/office/drawing/2014/main" id="{8E4127B2-02C7-FCA3-5295-B2A40F14E56A}"/>
+              </a:ext>
+            </a:extLst>
+          </p:cNvPr>
+          <p:cNvSpPr/>
+          <p:nvPr/>
+        </p:nvSpPr>
+        <p:spPr>
+          <a:xfrm>
+            <a:off x="3095366" y="4286626"/>
+            <a:ext cx="1334529" cy="1138895"/>
+          </a:xfrm>
+          <a:prstGeom prst="roundRect">
+            <a:avLst/>
+          </a:prstGeom>
+          <a:solidFill>
+            <a:srgbClr val="0070C0"/>
+          </a:solidFill>
+          <a:ln>
+            <a:noFill/>
+          </a:ln>
+        </p:spPr>
+        <p:style>
+          <a:lnRef idx="0">
+            <a:scrgbClr r="0" g="0" b="0"/>
+          </a:lnRef>
+          <a:fillRef idx="0">
+            <a:scrgbClr r="0" g="0" b="0"/>
+          </a:fillRef>
+          <a:effectRef idx="0">
+            <a:scrgbClr r="0" g="0" b="0"/>
+          </a:effectRef>
+          <a:fontRef idx="minor">
+            <a:schemeClr val="lt1"/>
+          </a:fontRef>
+        </p:style>
+        <p:txBody>
+          <a:bodyPr rtlCol="0" anchor="ctr"/>
+          <a:lstStyle/>
+          <a:p>
+            <a:pPr algn="ctr"/>
+            <a:r>
+              <a:rPr lang="en-US" dirty="0" err="1"/>
+              <a:t>BiLSTM</a:t>
+            </a:r>
+            <a:endParaRPr lang="en-US" dirty="0"/>
+          </a:p>
+        </p:txBody>
+      </p:sp>
+      <p:cxnSp>
+        <p:nvCxnSpPr>
+          <p:cNvPr id="36" name="Straight Arrow Connector 35">
+            <a:extLst>
+              <a:ext uri="{FF2B5EF4-FFF2-40B4-BE49-F238E27FC236}">
+                <a16:creationId xmlns:a16="http://schemas.microsoft.com/office/drawing/2014/main" id="{BA19A199-C1D7-2902-A254-485422469456}"/>
+              </a:ext>
+            </a:extLst>
+          </p:cNvPr>
+          <p:cNvCxnSpPr>
+            <a:cxnSpLocks/>
+            <a:stCxn id="4" idx="3"/>
+            <a:endCxn id="17" idx="1"/>
+          </p:cNvCxnSpPr>
+          <p:nvPr/>
+        </p:nvCxnSpPr>
+        <p:spPr>
+          <a:xfrm>
+            <a:off x="2074174" y="2890367"/>
+            <a:ext cx="1021192" cy="0"/>
+          </a:xfrm>
+          <a:prstGeom prst="straightConnector1">
+            <a:avLst/>
+          </a:prstGeom>
+          <a:ln>
+            <a:tailEnd type="triangle"/>
+          </a:ln>
+        </p:spPr>
+        <p:style>
+          <a:lnRef idx="1">
+            <a:schemeClr val="accent1"/>
+          </a:lnRef>
+          <a:fillRef idx="0">
+            <a:schemeClr val="accent1"/>
+          </a:fillRef>
+          <a:effectRef idx="0">
+            <a:schemeClr val="accent1"/>
+          </a:effectRef>
+          <a:fontRef idx="minor">
+            <a:schemeClr val="tx1"/>
+          </a:fontRef>
+        </p:style>
+      </p:cxnSp>
+      <p:cxnSp>
+        <p:nvCxnSpPr>
+          <p:cNvPr id="38" name="Straight Arrow Connector 37">
+            <a:extLst>
+              <a:ext uri="{FF2B5EF4-FFF2-40B4-BE49-F238E27FC236}">
+                <a16:creationId xmlns:a16="http://schemas.microsoft.com/office/drawing/2014/main" id="{B42AE838-98C3-66F3-450C-2B3749ACFF9B}"/>
+              </a:ext>
+            </a:extLst>
+          </p:cNvPr>
+          <p:cNvCxnSpPr>
+            <a:cxnSpLocks/>
+            <a:stCxn id="5" idx="3"/>
+            <a:endCxn id="20" idx="1"/>
+          </p:cNvCxnSpPr>
+          <p:nvPr/>
+        </p:nvCxnSpPr>
+        <p:spPr>
+          <a:xfrm flipV="1">
+            <a:off x="2102919" y="4856074"/>
+            <a:ext cx="992447" cy="93"/>
+          </a:xfrm>
+          <a:prstGeom prst="straightConnector1">
+            <a:avLst/>
+          </a:prstGeom>
+          <a:ln>
+            <a:tailEnd type="triangle"/>
+          </a:ln>
+        </p:spPr>
+        <p:style>
+          <a:lnRef idx="1">
+            <a:schemeClr val="accent1"/>
+          </a:lnRef>
+          <a:fillRef idx="0">
+            <a:schemeClr val="accent1"/>
+          </a:fillRef>
+          <a:effectRef idx="0">
+            <a:schemeClr val="accent1"/>
+          </a:effectRef>
+          <a:fontRef idx="minor">
+            <a:schemeClr val="tx1"/>
+          </a:fontRef>
+        </p:style>
+      </p:cxnSp>
+      <p:cxnSp>
+        <p:nvCxnSpPr>
+          <p:cNvPr id="40" name="Elbow Connector 39">
+            <a:extLst>
+              <a:ext uri="{FF2B5EF4-FFF2-40B4-BE49-F238E27FC236}">
+                <a16:creationId xmlns:a16="http://schemas.microsoft.com/office/drawing/2014/main" id="{89E46BFC-5914-C468-DD67-DEB442DF7C59}"/>
+              </a:ext>
+            </a:extLst>
+          </p:cNvPr>
+          <p:cNvCxnSpPr>
+            <a:stCxn id="17" idx="3"/>
+            <a:endCxn id="19" idx="0"/>
+          </p:cNvCxnSpPr>
+          <p:nvPr/>
+        </p:nvCxnSpPr>
+        <p:spPr>
+          <a:xfrm>
+            <a:off x="4429895" y="2890367"/>
+            <a:ext cx="1747539" cy="257457"/>
+          </a:xfrm>
+          <a:prstGeom prst="bentConnector2">
+            <a:avLst/>
+          </a:prstGeom>
+          <a:ln>
+            <a:tailEnd type="triangle"/>
+          </a:ln>
+        </p:spPr>
+        <p:style>
+          <a:lnRef idx="1">
+            <a:schemeClr val="accent1"/>
+          </a:lnRef>
+          <a:fillRef idx="0">
+            <a:schemeClr val="accent1"/>
+          </a:fillRef>
+          <a:effectRef idx="0">
+            <a:schemeClr val="accent1"/>
+          </a:effectRef>
+          <a:fontRef idx="minor">
+            <a:schemeClr val="tx1"/>
+          </a:fontRef>
+        </p:style>
+      </p:cxnSp>
+      <p:cxnSp>
+        <p:nvCxnSpPr>
+          <p:cNvPr id="42" name="Elbow Connector 41">
+            <a:extLst>
+              <a:ext uri="{FF2B5EF4-FFF2-40B4-BE49-F238E27FC236}">
+                <a16:creationId xmlns:a16="http://schemas.microsoft.com/office/drawing/2014/main" id="{86140576-F75D-42D3-A4C5-5BFB8DC405A6}"/>
+              </a:ext>
+            </a:extLst>
+          </p:cNvPr>
+          <p:cNvCxnSpPr>
+            <a:stCxn id="20" idx="3"/>
+            <a:endCxn id="19" idx="2"/>
+          </p:cNvCxnSpPr>
+          <p:nvPr/>
+        </p:nvCxnSpPr>
+        <p:spPr>
+          <a:xfrm flipV="1">
+            <a:off x="4429895" y="4286719"/>
+            <a:ext cx="1747539" cy="569355"/>
+          </a:xfrm>
+          <a:prstGeom prst="bentConnector2">
+            <a:avLst/>
+          </a:prstGeom>
+          <a:ln>
+            <a:tailEnd type="triangle"/>
+          </a:ln>
+        </p:spPr>
+        <p:style>
+          <a:lnRef idx="1">
+            <a:schemeClr val="accent1"/>
+          </a:lnRef>
+          <a:fillRef idx="0">
+            <a:schemeClr val="accent1"/>
+          </a:fillRef>
+          <a:effectRef idx="0">
+            <a:schemeClr val="accent1"/>
+          </a:effectRef>
+          <a:fontRef idx="minor">
+            <a:schemeClr val="tx1"/>
+          </a:fontRef>
+        </p:style>
+      </p:cxnSp>
     </p:spTree>
     <p:extLst>
       <p:ext uri="{BB962C8B-B14F-4D97-AF65-F5344CB8AC3E}">
-        <p14:creationId xmlns:p14="http://schemas.microsoft.com/office/powerpoint/2010/main" val="1425252824"/>
+        <p14:creationId xmlns:p14="http://schemas.microsoft.com/office/powerpoint/2010/main" val="2263863964"/>
       </p:ext>
     </p:extLst>
   </p:cSld>
@@ -8061,6 +9685,134 @@
           <p:cNvPr id="2" name="Title 1">
             <a:extLst>
               <a:ext uri="{FF2B5EF4-FFF2-40B4-BE49-F238E27FC236}">
+                <a16:creationId xmlns:a16="http://schemas.microsoft.com/office/drawing/2014/main" id="{3603CCCC-1A3E-BE97-ED0F-4024889EB742}"/>
+              </a:ext>
+            </a:extLst>
+          </p:cNvPr>
+          <p:cNvSpPr>
+            <a:spLocks noGrp="1"/>
+          </p:cNvSpPr>
+          <p:nvPr>
+            <p:ph type="title"/>
+          </p:nvPr>
+        </p:nvSpPr>
+        <p:spPr>
+          <a:xfrm>
+            <a:off x="565149" y="376819"/>
+            <a:ext cx="11532115" cy="1446550"/>
+          </a:xfrm>
+        </p:spPr>
+        <p:txBody>
+          <a:bodyPr/>
+          <a:lstStyle/>
+          <a:p>
+            <a:r>
+              <a:rPr lang="en-US" dirty="0"/>
+              <a:t>Model Designs:</a:t>
+            </a:r>
+          </a:p>
+        </p:txBody>
+      </p:sp>
+      <p:sp>
+        <p:nvSpPr>
+          <p:cNvPr id="3" name="Content Placeholder 2">
+            <a:extLst>
+              <a:ext uri="{FF2B5EF4-FFF2-40B4-BE49-F238E27FC236}">
+                <a16:creationId xmlns:a16="http://schemas.microsoft.com/office/drawing/2014/main" id="{66758C92-F5EB-1DFB-60D6-B2877C875030}"/>
+              </a:ext>
+            </a:extLst>
+          </p:cNvPr>
+          <p:cNvSpPr>
+            <a:spLocks noGrp="1"/>
+          </p:cNvSpPr>
+          <p:nvPr>
+            <p:ph idx="1"/>
+          </p:nvPr>
+        </p:nvSpPr>
+        <p:spPr>
+          <a:xfrm>
+            <a:off x="565149" y="1320038"/>
+            <a:ext cx="11061702" cy="3188586"/>
+          </a:xfrm>
+        </p:spPr>
+        <p:txBody>
+          <a:bodyPr/>
+          <a:lstStyle/>
+          <a:p>
+            <a:pPr marL="0" indent="0">
+              <a:buNone/>
+            </a:pPr>
+            <a:r>
+              <a:rPr lang="en-US" dirty="0"/>
+              <a:t>Design4: </a:t>
+            </a:r>
+          </a:p>
+          <a:p>
+            <a:pPr marL="0" indent="0">
+              <a:buNone/>
+            </a:pPr>
+            <a:r>
+              <a:rPr lang="en-US" dirty="0"/>
+              <a:t>Load Pretrained models and fine tune for the current dataset like:</a:t>
+            </a:r>
+          </a:p>
+          <a:p>
+            <a:pPr lvl="1">
+              <a:buFont typeface="Arial" panose="020B0604020202020204" pitchFamily="34" charset="0"/>
+              <a:buChar char="•"/>
+            </a:pPr>
+            <a:r>
+              <a:rPr lang="en-US" dirty="0"/>
+              <a:t>Fine tune Doc2vec model on current dataset</a:t>
+            </a:r>
+          </a:p>
+          <a:p>
+            <a:pPr lvl="1">
+              <a:buFont typeface="Arial" panose="020B0604020202020204" pitchFamily="34" charset="0"/>
+              <a:buChar char="•"/>
+            </a:pPr>
+            <a:r>
+              <a:rPr lang="en-US" dirty="0"/>
+              <a:t>Fine tune SBERT model to achieve state of art like results</a:t>
+            </a:r>
+          </a:p>
+        </p:txBody>
+      </p:sp>
+    </p:spTree>
+    <p:extLst>
+      <p:ext uri="{BB962C8B-B14F-4D97-AF65-F5344CB8AC3E}">
+        <p14:creationId xmlns:p14="http://schemas.microsoft.com/office/powerpoint/2010/main" val="1425252824"/>
+      </p:ext>
+    </p:extLst>
+  </p:cSld>
+  <p:clrMapOvr>
+    <a:masterClrMapping/>
+  </p:clrMapOvr>
+</p:sld>
+</file>
+
+<file path=ppt/slides/slide8.xml><?xml version="1.0" encoding="utf-8"?>
+<p:sld xmlns:a="http://schemas.openxmlformats.org/drawingml/2006/main" xmlns:r="http://schemas.openxmlformats.org/officeDocument/2006/relationships" xmlns:p="http://schemas.openxmlformats.org/presentationml/2006/main" showMasterSp="0">
+  <p:cSld>
+    <p:spTree>
+      <p:nvGrpSpPr>
+        <p:cNvPr id="1" name=""/>
+        <p:cNvGrpSpPr/>
+        <p:nvPr/>
+      </p:nvGrpSpPr>
+      <p:grpSpPr>
+        <a:xfrm>
+          <a:off x="0" y="0"/>
+          <a:ext cx="0" cy="0"/>
+          <a:chOff x="0" y="0"/>
+          <a:chExt cx="0" cy="0"/>
+        </a:xfrm>
+      </p:grpSpPr>
+      <p:sp>
+        <p:nvSpPr>
+          <p:cNvPr id="2" name="Title 1">
+            <a:extLst>
+              <a:ext uri="{FF2B5EF4-FFF2-40B4-BE49-F238E27FC236}">
                 <a16:creationId xmlns:a16="http://schemas.microsoft.com/office/drawing/2014/main" id="{A8976B50-B660-35A7-1C60-E6D6CDA1AB11}"/>
               </a:ext>
             </a:extLst>
@@ -8105,7 +9857,7 @@
             <p:ph idx="1"/>
             <p:extLst>
               <p:ext uri="{D42A27DB-BD31-4B8C-83A1-F6EECF244321}">
-                <p14:modId xmlns:p14="http://schemas.microsoft.com/office/powerpoint/2010/main" val="857385988"/>
+                <p14:modId xmlns:p14="http://schemas.microsoft.com/office/powerpoint/2010/main" val="1465614068"/>
               </p:ext>
             </p:extLst>
           </p:nvPr>
@@ -8312,7 +10064,7 @@
                     <a:p>
                       <a:r>
                         <a:rPr lang="en-US" dirty="0"/>
-                        <a:t>Design1</a:t>
+                        <a:t>Approach1</a:t>
                       </a:r>
                     </a:p>
                   </a:txBody>
@@ -8545,7 +10297,7 @@
                     <a:p>
                       <a:r>
                         <a:rPr lang="en-US" dirty="0"/>
-                        <a:t>Design3</a:t>
+                        <a:t>Design4</a:t>
                       </a:r>
                     </a:p>
                   </a:txBody>
@@ -8671,7 +10423,7 @@
                     <a:p>
                       <a:r>
                         <a:rPr lang="en-US" dirty="0"/>
-                        <a:t>Design1</a:t>
+                        <a:t>Design2</a:t>
                       </a:r>
                     </a:p>
                   </a:txBody>
@@ -8777,7 +10529,7 @@
                     <a:p>
                       <a:r>
                         <a:rPr lang="en-US" dirty="0"/>
-                        <a:t>Design2</a:t>
+                        <a:t>Design1</a:t>
                       </a:r>
                     </a:p>
                   </a:txBody>
@@ -8886,7 +10638,7 @@
                     <a:p>
                       <a:r>
                         <a:rPr lang="en-US" dirty="0"/>
-                        <a:t>Design3</a:t>
+                        <a:t>Design4</a:t>
                       </a:r>
                     </a:p>
                   </a:txBody>
@@ -8967,245 +10719,6 @@
 </p:sld>
 </file>
 
-<file path=ppt/slides/slide8.xml><?xml version="1.0" encoding="utf-8"?>
-<p:sld xmlns:a="http://schemas.openxmlformats.org/drawingml/2006/main" xmlns:r="http://schemas.openxmlformats.org/officeDocument/2006/relationships" xmlns:p="http://schemas.openxmlformats.org/presentationml/2006/main" showMasterSp="0">
-  <p:cSld>
-    <p:spTree>
-      <p:nvGrpSpPr>
-        <p:cNvPr id="1" name=""/>
-        <p:cNvGrpSpPr/>
-        <p:nvPr/>
-      </p:nvGrpSpPr>
-      <p:grpSpPr>
-        <a:xfrm>
-          <a:off x="0" y="0"/>
-          <a:ext cx="0" cy="0"/>
-          <a:chOff x="0" y="0"/>
-          <a:chExt cx="0" cy="0"/>
-        </a:xfrm>
-      </p:grpSpPr>
-      <p:sp>
-        <p:nvSpPr>
-          <p:cNvPr id="2" name="Title 1">
-            <a:extLst>
-              <a:ext uri="{FF2B5EF4-FFF2-40B4-BE49-F238E27FC236}">
-                <a16:creationId xmlns:a16="http://schemas.microsoft.com/office/drawing/2014/main" id="{98CB23D4-9B76-90AF-6EAD-4A11A6909925}"/>
-              </a:ext>
-            </a:extLst>
-          </p:cNvPr>
-          <p:cNvSpPr>
-            <a:spLocks noGrp="1"/>
-          </p:cNvSpPr>
-          <p:nvPr>
-            <p:ph type="title"/>
-          </p:nvPr>
-        </p:nvSpPr>
-        <p:spPr>
-          <a:xfrm>
-            <a:off x="318013" y="376818"/>
-            <a:ext cx="11420906" cy="908285"/>
-          </a:xfrm>
-        </p:spPr>
-        <p:txBody>
-          <a:bodyPr/>
-          <a:lstStyle/>
-          <a:p>
-            <a:r>
-              <a:rPr lang="en-US" dirty="0"/>
-              <a:t>Train vs Validation Losses</a:t>
-            </a:r>
-          </a:p>
-        </p:txBody>
-      </p:sp>
-      <p:pic>
-        <p:nvPicPr>
-          <p:cNvPr id="1026" name="Picture 2">
-            <a:extLst>
-              <a:ext uri="{FF2B5EF4-FFF2-40B4-BE49-F238E27FC236}">
-                <a16:creationId xmlns:a16="http://schemas.microsoft.com/office/drawing/2014/main" id="{1CC13B02-438B-9B56-F004-810DA5E17483}"/>
-              </a:ext>
-            </a:extLst>
-          </p:cNvPr>
-          <p:cNvPicPr>
-            <a:picLocks noChangeAspect="1" noChangeArrowheads="1"/>
-          </p:cNvPicPr>
-          <p:nvPr/>
-        </p:nvPicPr>
-        <p:blipFill>
-          <a:blip r:embed="rId2">
-            <a:extLst>
-              <a:ext uri="{28A0092B-C50C-407E-A947-70E740481C1C}">
-                <a14:useLocalDpi xmlns:a14="http://schemas.microsoft.com/office/drawing/2010/main" val="0"/>
-              </a:ext>
-            </a:extLst>
-          </a:blip>
-          <a:srcRect/>
-          <a:stretch>
-            <a:fillRect/>
-          </a:stretch>
-        </p:blipFill>
-        <p:spPr bwMode="auto">
-          <a:xfrm>
-            <a:off x="614575" y="1856571"/>
-            <a:ext cx="4264969" cy="3374889"/>
-          </a:xfrm>
-          <a:prstGeom prst="rect">
-            <a:avLst/>
-          </a:prstGeom>
-          <a:noFill/>
-          <a:extLst>
-            <a:ext uri="{909E8E84-426E-40DD-AFC4-6F175D3DCCD1}">
-              <a14:hiddenFill xmlns:a14="http://schemas.microsoft.com/office/drawing/2010/main">
-                <a:solidFill>
-                  <a:srgbClr val="FFFFFF"/>
-                </a:solidFill>
-              </a14:hiddenFill>
-            </a:ext>
-          </a:extLst>
-        </p:spPr>
-      </p:pic>
-      <p:pic>
-        <p:nvPicPr>
-          <p:cNvPr id="1028" name="Picture 4">
-            <a:extLst>
-              <a:ext uri="{FF2B5EF4-FFF2-40B4-BE49-F238E27FC236}">
-                <a16:creationId xmlns:a16="http://schemas.microsoft.com/office/drawing/2014/main" id="{F9080B4B-CA69-4C3B-8B4D-1317A8E0C79A}"/>
-              </a:ext>
-            </a:extLst>
-          </p:cNvPr>
-          <p:cNvPicPr>
-            <a:picLocks noChangeAspect="1" noChangeArrowheads="1"/>
-          </p:cNvPicPr>
-          <p:nvPr/>
-        </p:nvPicPr>
-        <p:blipFill>
-          <a:blip r:embed="rId3">
-            <a:extLst>
-              <a:ext uri="{28A0092B-C50C-407E-A947-70E740481C1C}">
-                <a14:useLocalDpi xmlns:a14="http://schemas.microsoft.com/office/drawing/2010/main" val="0"/>
-              </a:ext>
-            </a:extLst>
-          </a:blip>
-          <a:srcRect/>
-          <a:stretch>
-            <a:fillRect/>
-          </a:stretch>
-        </p:blipFill>
-        <p:spPr bwMode="auto">
-          <a:xfrm>
-            <a:off x="7111657" y="3287991"/>
-            <a:ext cx="4264969" cy="3452955"/>
-          </a:xfrm>
-          <a:prstGeom prst="rect">
-            <a:avLst/>
-          </a:prstGeom>
-          <a:noFill/>
-          <a:extLst>
-            <a:ext uri="{909E8E84-426E-40DD-AFC4-6F175D3DCCD1}">
-              <a14:hiddenFill xmlns:a14="http://schemas.microsoft.com/office/drawing/2010/main">
-                <a:solidFill>
-                  <a:srgbClr val="FFFFFF"/>
-                </a:solidFill>
-              </a14:hiddenFill>
-            </a:ext>
-          </a:extLst>
-        </p:spPr>
-      </p:pic>
-      <p:pic>
-        <p:nvPicPr>
-          <p:cNvPr id="1030" name="Picture 6">
-            <a:extLst>
-              <a:ext uri="{FF2B5EF4-FFF2-40B4-BE49-F238E27FC236}">
-                <a16:creationId xmlns:a16="http://schemas.microsoft.com/office/drawing/2014/main" id="{4324233F-7DC1-A6C4-788D-35A949FE3488}"/>
-              </a:ext>
-            </a:extLst>
-          </p:cNvPr>
-          <p:cNvPicPr>
-            <a:picLocks noChangeAspect="1" noChangeArrowheads="1"/>
-          </p:cNvPicPr>
-          <p:nvPr/>
-        </p:nvPicPr>
-        <p:blipFill>
-          <a:blip r:embed="rId4">
-            <a:extLst>
-              <a:ext uri="{28A0092B-C50C-407E-A947-70E740481C1C}">
-                <a14:useLocalDpi xmlns:a14="http://schemas.microsoft.com/office/drawing/2010/main" val="0"/>
-              </a:ext>
-            </a:extLst>
-          </a:blip>
-          <a:srcRect/>
-          <a:stretch>
-            <a:fillRect/>
-          </a:stretch>
-        </p:blipFill>
-        <p:spPr bwMode="auto">
-          <a:xfrm>
-            <a:off x="7111658" y="340614"/>
-            <a:ext cx="4079790" cy="2829869"/>
-          </a:xfrm>
-          <a:prstGeom prst="rect">
-            <a:avLst/>
-          </a:prstGeom>
-          <a:noFill/>
-          <a:extLst>
-            <a:ext uri="{909E8E84-426E-40DD-AFC4-6F175D3DCCD1}">
-              <a14:hiddenFill xmlns:a14="http://schemas.microsoft.com/office/drawing/2010/main">
-                <a:solidFill>
-                  <a:srgbClr val="FFFFFF"/>
-                </a:solidFill>
-              </a14:hiddenFill>
-            </a:ext>
-          </a:extLst>
-        </p:spPr>
-      </p:pic>
-      <p:sp>
-        <p:nvSpPr>
-          <p:cNvPr id="6" name="TextBox 5">
-            <a:extLst>
-              <a:ext uri="{FF2B5EF4-FFF2-40B4-BE49-F238E27FC236}">
-                <a16:creationId xmlns:a16="http://schemas.microsoft.com/office/drawing/2014/main" id="{6ADC8E48-D43E-2E36-EEA3-4B48AACEA53C}"/>
-              </a:ext>
-            </a:extLst>
-          </p:cNvPr>
-          <p:cNvSpPr txBox="1"/>
-          <p:nvPr/>
-        </p:nvSpPr>
-        <p:spPr>
-          <a:xfrm>
-            <a:off x="1161535" y="5659395"/>
-            <a:ext cx="5436973" cy="923330"/>
-          </a:xfrm>
-          <a:prstGeom prst="rect">
-            <a:avLst/>
-          </a:prstGeom>
-          <a:noFill/>
-        </p:spPr>
-        <p:txBody>
-          <a:bodyPr wrap="square" rtlCol="0">
-            <a:spAutoFit/>
-          </a:bodyPr>
-          <a:lstStyle/>
-          <a:p>
-            <a:r>
-              <a:rPr lang="en-US" dirty="0"/>
-              <a:t>Observation: Neural networks are overfitting due to less data as training data is only 5749 sentence pairs with vocab size of 8306</a:t>
-            </a:r>
-          </a:p>
-        </p:txBody>
-      </p:sp>
-    </p:spTree>
-    <p:extLst>
-      <p:ext uri="{BB962C8B-B14F-4D97-AF65-F5344CB8AC3E}">
-        <p14:creationId xmlns:p14="http://schemas.microsoft.com/office/powerpoint/2010/main" val="3341428205"/>
-      </p:ext>
-    </p:extLst>
-  </p:cSld>
-  <p:clrMapOvr>
-    <a:masterClrMapping/>
-  </p:clrMapOvr>
-</p:sld>
-</file>
-
 <file path=ppt/slides/slide9.xml><?xml version="1.0" encoding="utf-8"?>
 <p:sld xmlns:a="http://schemas.openxmlformats.org/drawingml/2006/main" xmlns:r="http://schemas.openxmlformats.org/officeDocument/2006/relationships" xmlns:p="http://schemas.openxmlformats.org/presentationml/2006/main" showMasterSp="0">
   <p:cSld>
@@ -9223,200 +10736,12 @@
           <a:chExt cx="0" cy="0"/>
         </a:xfrm>
       </p:grpSpPr>
-      <p:sp useBgFill="1">
-        <p:nvSpPr>
-          <p:cNvPr id="2064" name="Rectangle 2063">
-            <a:extLst>
-              <a:ext uri="{FF2B5EF4-FFF2-40B4-BE49-F238E27FC236}">
-                <a16:creationId xmlns:a16="http://schemas.microsoft.com/office/drawing/2014/main" id="{579E3846-8D0B-B14A-817A-7FAC9DDAB4D8}"/>
-              </a:ext>
-              <a:ext uri="{C183D7F6-B498-43B3-948B-1728B52AA6E4}">
-                <adec:decorative xmlns:adec="http://schemas.microsoft.com/office/drawing/2017/decorative" val="1"/>
-              </a:ext>
-            </a:extLst>
-          </p:cNvPr>
-          <p:cNvSpPr>
-            <a:spLocks noGrp="1" noRot="1" noChangeAspect="1" noMove="1" noResize="1" noEditPoints="1" noAdjustHandles="1" noChangeArrowheads="1" noChangeShapeType="1" noTextEdit="1"/>
-          </p:cNvSpPr>
-          <p:nvPr>
-            <p:extLst>
-              <p:ext uri="{386F3935-93C4-4BCD-93E2-E3B085C9AB24}">
-                <p16:designElem xmlns:p16="http://schemas.microsoft.com/office/powerpoint/2015/main" val="1"/>
-              </p:ext>
-            </p:extLst>
-          </p:nvPr>
-        </p:nvSpPr>
-        <p:spPr>
-          <a:xfrm>
-            <a:off x="0" y="0"/>
-            <a:ext cx="12192000" cy="6858000"/>
-          </a:xfrm>
-          <a:prstGeom prst="rect">
-            <a:avLst/>
-          </a:prstGeom>
-          <a:ln>
-            <a:noFill/>
-          </a:ln>
-        </p:spPr>
-        <p:style>
-          <a:lnRef idx="2">
-            <a:schemeClr val="accent1">
-              <a:shade val="50000"/>
-            </a:schemeClr>
-          </a:lnRef>
-          <a:fillRef idx="1">
-            <a:schemeClr val="accent1"/>
-          </a:fillRef>
-          <a:effectRef idx="0">
-            <a:schemeClr val="accent1"/>
-          </a:effectRef>
-          <a:fontRef idx="minor">
-            <a:schemeClr val="lt1"/>
-          </a:fontRef>
-        </p:style>
-        <p:txBody>
-          <a:bodyPr rtlCol="0" anchor="ctr"/>
-          <a:lstStyle/>
-          <a:p>
-            <a:pPr algn="ctr"/>
-            <a:endParaRPr lang="en-US"/>
-          </a:p>
-        </p:txBody>
-      </p:sp>
-      <p:sp>
-        <p:nvSpPr>
-          <p:cNvPr id="2066" name="Cross 2065">
-            <a:extLst>
-              <a:ext uri="{FF2B5EF4-FFF2-40B4-BE49-F238E27FC236}">
-                <a16:creationId xmlns:a16="http://schemas.microsoft.com/office/drawing/2014/main" id="{BE50E7BE-734F-224D-B03E-074DE1D12480}"/>
-              </a:ext>
-              <a:ext uri="{C183D7F6-B498-43B3-948B-1728B52AA6E4}">
-                <adec:decorative xmlns:adec="http://schemas.microsoft.com/office/drawing/2017/decorative" val="1"/>
-              </a:ext>
-            </a:extLst>
-          </p:cNvPr>
-          <p:cNvSpPr>
-            <a:spLocks noGrp="1" noRot="1" noChangeAspect="1" noMove="1" noResize="1" noEditPoints="1" noAdjustHandles="1" noChangeArrowheads="1" noChangeShapeType="1" noTextEdit="1"/>
-          </p:cNvSpPr>
-          <p:nvPr>
-            <p:extLst>
-              <p:ext uri="{386F3935-93C4-4BCD-93E2-E3B085C9AB24}">
-                <p16:designElem xmlns:p16="http://schemas.microsoft.com/office/powerpoint/2015/main" val="1"/>
-              </p:ext>
-            </p:extLst>
-          </p:nvPr>
-        </p:nvSpPr>
-        <p:spPr>
-          <a:xfrm>
-            <a:off x="11217667" y="5618903"/>
-            <a:ext cx="524933" cy="524933"/>
-          </a:xfrm>
-          <a:prstGeom prst="plus">
-            <a:avLst>
-              <a:gd name="adj" fmla="val 39516"/>
-            </a:avLst>
-          </a:prstGeom>
-          <a:solidFill>
-            <a:schemeClr val="tx1"/>
-          </a:solidFill>
-          <a:ln>
-            <a:noFill/>
-          </a:ln>
-        </p:spPr>
-        <p:style>
-          <a:lnRef idx="2">
-            <a:schemeClr val="accent1">
-              <a:shade val="50000"/>
-            </a:schemeClr>
-          </a:lnRef>
-          <a:fillRef idx="1">
-            <a:schemeClr val="accent1"/>
-          </a:fillRef>
-          <a:effectRef idx="0">
-            <a:schemeClr val="accent1"/>
-          </a:effectRef>
-          <a:fontRef idx="minor">
-            <a:schemeClr val="lt1"/>
-          </a:fontRef>
-        </p:style>
-        <p:txBody>
-          <a:bodyPr rtlCol="0" anchor="ctr"/>
-          <a:lstStyle/>
-          <a:p>
-            <a:pPr algn="ctr"/>
-            <a:endParaRPr lang="en-US"/>
-          </a:p>
-        </p:txBody>
-      </p:sp>
-      <p:sp>
-        <p:nvSpPr>
-          <p:cNvPr id="2068" name="Rectangle 2067">
-            <a:extLst>
-              <a:ext uri="{FF2B5EF4-FFF2-40B4-BE49-F238E27FC236}">
-                <a16:creationId xmlns:a16="http://schemas.microsoft.com/office/drawing/2014/main" id="{DCA5172B-100A-154D-8648-280629D67DD0}"/>
-              </a:ext>
-              <a:ext uri="{C183D7F6-B498-43B3-948B-1728B52AA6E4}">
-                <adec:decorative xmlns:adec="http://schemas.microsoft.com/office/drawing/2017/decorative" val="1"/>
-              </a:ext>
-            </a:extLst>
-          </p:cNvPr>
-          <p:cNvSpPr>
-            <a:spLocks noGrp="1" noRot="1" noChangeAspect="1" noMove="1" noResize="1" noEditPoints="1" noAdjustHandles="1" noChangeArrowheads="1" noChangeShapeType="1" noTextEdit="1"/>
-          </p:cNvSpPr>
-          <p:nvPr>
-            <p:extLst>
-              <p:ext uri="{386F3935-93C4-4BCD-93E2-E3B085C9AB24}">
-                <p16:designElem xmlns:p16="http://schemas.microsoft.com/office/powerpoint/2015/main" val="1"/>
-              </p:ext>
-            </p:extLst>
-          </p:nvPr>
-        </p:nvSpPr>
-        <p:spPr>
-          <a:xfrm>
-            <a:off x="9881559" y="976630"/>
-            <a:ext cx="1336774" cy="120142"/>
-          </a:xfrm>
-          <a:prstGeom prst="rect">
-            <a:avLst/>
-          </a:prstGeom>
-          <a:solidFill>
-            <a:schemeClr val="tx1"/>
-          </a:solidFill>
-          <a:ln>
-            <a:noFill/>
-          </a:ln>
-        </p:spPr>
-        <p:style>
-          <a:lnRef idx="2">
-            <a:schemeClr val="accent1">
-              <a:shade val="50000"/>
-            </a:schemeClr>
-          </a:lnRef>
-          <a:fillRef idx="1">
-            <a:schemeClr val="accent1"/>
-          </a:fillRef>
-          <a:effectRef idx="0">
-            <a:schemeClr val="accent1"/>
-          </a:effectRef>
-          <a:fontRef idx="minor">
-            <a:schemeClr val="lt1"/>
-          </a:fontRef>
-        </p:style>
-        <p:txBody>
-          <a:bodyPr rtlCol="0" anchor="ctr"/>
-          <a:lstStyle/>
-          <a:p>
-            <a:pPr algn="ctr"/>
-            <a:endParaRPr lang="en-US"/>
-          </a:p>
-        </p:txBody>
-      </p:sp>
       <p:sp>
         <p:nvSpPr>
           <p:cNvPr id="2" name="Title 1">
             <a:extLst>
               <a:ext uri="{FF2B5EF4-FFF2-40B4-BE49-F238E27FC236}">
-                <a16:creationId xmlns:a16="http://schemas.microsoft.com/office/drawing/2014/main" id="{79DD15C5-7B05-FF00-0DBD-F18D697B2F2D}"/>
+                <a16:creationId xmlns:a16="http://schemas.microsoft.com/office/drawing/2014/main" id="{A8976B50-B660-35A7-1C60-E6D6CDA1AB11}"/>
               </a:ext>
             </a:extLst>
           </p:cNvPr>
@@ -9429,235 +10754,461 @@
         </p:nvSpPr>
         <p:spPr>
           <a:xfrm>
-            <a:off x="565149" y="1204721"/>
-            <a:ext cx="4114799" cy="1446550"/>
-          </a:xfrm>
-        </p:spPr>
-        <p:txBody>
-          <a:bodyPr>
-            <a:normAutofit/>
-          </a:bodyPr>
-          <a:lstStyle/>
-          <a:p>
+            <a:off x="441580" y="254501"/>
+            <a:ext cx="10568289" cy="1446550"/>
+          </a:xfrm>
+        </p:spPr>
+        <p:txBody>
+          <a:bodyPr/>
+          <a:lstStyle/>
+          <a:p>
+            <a:r>
+              <a:rPr lang="en-US" dirty="0"/>
+              <a:t>Experiments </a:t>
+            </a:r>
             <a:r>
               <a:rPr lang="en-US" dirty="0" err="1"/>
-              <a:t>Explainability</a:t>
-            </a:r>
-            <a:endParaRPr lang="en-US" dirty="0"/>
-          </a:p>
-        </p:txBody>
-      </p:sp>
-      <p:sp>
-        <p:nvSpPr>
-          <p:cNvPr id="3" name="Content Placeholder 2">
-            <a:extLst>
-              <a:ext uri="{FF2B5EF4-FFF2-40B4-BE49-F238E27FC236}">
-                <a16:creationId xmlns:a16="http://schemas.microsoft.com/office/drawing/2014/main" id="{EC9AD255-F366-57ED-6104-BF6494E1EBB3}"/>
-              </a:ext>
-            </a:extLst>
-          </p:cNvPr>
-          <p:cNvSpPr>
-            <a:spLocks noGrp="1"/>
-          </p:cNvSpPr>
+              <a:t>Contd</a:t>
+            </a:r>
+            <a:r>
+              <a:rPr lang="en-US" dirty="0"/>
+              <a:t>…</a:t>
+            </a:r>
+          </a:p>
+        </p:txBody>
+      </p:sp>
+      <p:graphicFrame>
+        <p:nvGraphicFramePr>
+          <p:cNvPr id="4" name="Table 4">
+            <a:extLst>
+              <a:ext uri="{FF2B5EF4-FFF2-40B4-BE49-F238E27FC236}">
+                <a16:creationId xmlns:a16="http://schemas.microsoft.com/office/drawing/2014/main" id="{5755DB75-1BA5-3DEC-41D9-C60AEA29E169}"/>
+              </a:ext>
+            </a:extLst>
+          </p:cNvPr>
+          <p:cNvGraphicFramePr>
+            <a:graphicFrameLocks noGrp="1"/>
+          </p:cNvGraphicFramePr>
           <p:nvPr>
             <p:ph idx="1"/>
+            <p:extLst>
+              <p:ext uri="{D42A27DB-BD31-4B8C-83A1-F6EECF244321}">
+                <p14:modId xmlns:p14="http://schemas.microsoft.com/office/powerpoint/2010/main" val="3308965454"/>
+              </p:ext>
+            </p:extLst>
           </p:nvPr>
-        </p:nvSpPr>
-        <p:spPr>
-          <a:xfrm>
-            <a:off x="565148" y="2166121"/>
-            <a:ext cx="4114799" cy="3188586"/>
-          </a:xfrm>
-        </p:spPr>
-        <p:txBody>
-          <a:bodyPr>
-            <a:normAutofit/>
-          </a:bodyPr>
-          <a:lstStyle/>
-          <a:p>
-            <a:pPr marL="0" indent="0">
-              <a:lnSpc>
-                <a:spcPct val="90000"/>
-              </a:lnSpc>
-              <a:buNone/>
-            </a:pPr>
-            <a:r>
-              <a:rPr lang="en-US" sz="1700" dirty="0"/>
-              <a:t>As per RAI guidelines, all ML models needs to be explainable.</a:t>
-            </a:r>
-          </a:p>
-          <a:p>
-            <a:pPr marL="0" indent="0">
-              <a:lnSpc>
-                <a:spcPct val="90000"/>
-              </a:lnSpc>
-              <a:buNone/>
-            </a:pPr>
-            <a:r>
-              <a:rPr lang="en-US" sz="1700" dirty="0"/>
-              <a:t>But neural networks are less interpretable hence we need to use black box based explanation frameworks like SHAP to understand which words are playing how much contribution in the similarity score generation.</a:t>
-            </a:r>
-          </a:p>
-          <a:p>
-            <a:pPr marL="0" indent="0">
-              <a:lnSpc>
-                <a:spcPct val="90000"/>
-              </a:lnSpc>
-              <a:buNone/>
-            </a:pPr>
-            <a:r>
-              <a:rPr lang="en-US" sz="1700" dirty="0"/>
-              <a:t>Along with </a:t>
-            </a:r>
-            <a:r>
-              <a:rPr lang="en-US" sz="1700" dirty="0" err="1"/>
-              <a:t>explainability</a:t>
-            </a:r>
-            <a:r>
-              <a:rPr lang="en-US" sz="1700" dirty="0"/>
-              <a:t> to end users this analysis would also be really helpful in debugging the model as post-hoc analysis</a:t>
-            </a:r>
-          </a:p>
-        </p:txBody>
-      </p:sp>
-      <p:pic>
-        <p:nvPicPr>
-          <p:cNvPr id="2050" name="Picture 2" descr="Chart&#10;&#10;Description automatically generated">
-            <a:extLst>
-              <a:ext uri="{FF2B5EF4-FFF2-40B4-BE49-F238E27FC236}">
-                <a16:creationId xmlns:a16="http://schemas.microsoft.com/office/drawing/2014/main" id="{BD08A3EE-0DD1-2062-9F5B-8CDF98A92D5B}"/>
-              </a:ext>
-            </a:extLst>
-          </p:cNvPr>
-          <p:cNvPicPr>
-            <a:picLocks noChangeAspect="1" noChangeArrowheads="1"/>
-          </p:cNvPicPr>
-          <p:nvPr/>
-        </p:nvPicPr>
-        <p:blipFill>
-          <a:blip r:embed="rId2">
-            <a:extLst>
-              <a:ext uri="{28A0092B-C50C-407E-A947-70E740481C1C}">
-                <a14:useLocalDpi xmlns:a14="http://schemas.microsoft.com/office/drawing/2010/main" val="0"/>
-              </a:ext>
-            </a:extLst>
-          </a:blip>
-          <a:stretch>
-            <a:fillRect/>
-          </a:stretch>
-        </p:blipFill>
-        <p:spPr bwMode="auto">
-          <a:xfrm>
-            <a:off x="5486709" y="1912993"/>
-            <a:ext cx="5731624" cy="3295683"/>
-          </a:xfrm>
-          <a:prstGeom prst="rect">
-            <a:avLst/>
-          </a:prstGeom>
-          <a:noFill/>
-          <a:extLst>
-            <a:ext uri="{909E8E84-426E-40DD-AFC4-6F175D3DCCD1}">
-              <a14:hiddenFill xmlns:a14="http://schemas.microsoft.com/office/drawing/2010/main">
-                <a:solidFill>
-                  <a:srgbClr val="FFFFFF"/>
-                </a:solidFill>
-              </a14:hiddenFill>
-            </a:ext>
-          </a:extLst>
-        </p:spPr>
-      </p:pic>
-      <p:sp>
-        <p:nvSpPr>
-          <p:cNvPr id="5" name="TextBox 4">
-            <a:extLst>
-              <a:ext uri="{FF2B5EF4-FFF2-40B4-BE49-F238E27FC236}">
-                <a16:creationId xmlns:a16="http://schemas.microsoft.com/office/drawing/2014/main" id="{60AD3083-8EED-7338-DCF9-DF3603149CB1}"/>
-              </a:ext>
-            </a:extLst>
-          </p:cNvPr>
-          <p:cNvSpPr txBox="1"/>
-          <p:nvPr/>
-        </p:nvSpPr>
-        <p:spPr>
-          <a:xfrm>
-            <a:off x="4950373" y="5208676"/>
-            <a:ext cx="2680137" cy="923330"/>
-          </a:xfrm>
-          <a:prstGeom prst="rect">
-            <a:avLst/>
-          </a:prstGeom>
-          <a:noFill/>
-        </p:spPr>
-        <p:txBody>
-          <a:bodyPr wrap="square" rtlCol="0">
-            <a:spAutoFit/>
-          </a:bodyPr>
-          <a:lstStyle/>
-          <a:p>
-            <a:r>
-              <a:rPr lang="en-US" dirty="0"/>
-              <a:t>Input:</a:t>
-            </a:r>
-          </a:p>
-          <a:p>
-            <a:r>
-              <a:rPr lang="en-US" dirty="0"/>
-              <a:t>Sent1: “He hates apples”</a:t>
-            </a:r>
-          </a:p>
-          <a:p>
-            <a:r>
-              <a:rPr lang="en-US" dirty="0"/>
-              <a:t>Sent2: “He likes applies”</a:t>
-            </a:r>
-          </a:p>
-        </p:txBody>
-      </p:sp>
-      <p:sp>
-        <p:nvSpPr>
-          <p:cNvPr id="6" name="TextBox 5">
-            <a:extLst>
-              <a:ext uri="{FF2B5EF4-FFF2-40B4-BE49-F238E27FC236}">
-                <a16:creationId xmlns:a16="http://schemas.microsoft.com/office/drawing/2014/main" id="{1B680FC4-3FF0-2EA2-824F-B43B0B212671}"/>
-              </a:ext>
-            </a:extLst>
-          </p:cNvPr>
-          <p:cNvSpPr txBox="1"/>
-          <p:nvPr/>
-        </p:nvSpPr>
-        <p:spPr>
-          <a:xfrm>
-            <a:off x="7762614" y="5088709"/>
-            <a:ext cx="3941074" cy="1754326"/>
-          </a:xfrm>
-          <a:prstGeom prst="rect">
-            <a:avLst/>
-          </a:prstGeom>
-          <a:noFill/>
-        </p:spPr>
-        <p:txBody>
-          <a:bodyPr wrap="square" rtlCol="0">
-            <a:spAutoFit/>
-          </a:bodyPr>
-          <a:lstStyle/>
-          <a:p>
-            <a:r>
-              <a:rPr lang="en-US" dirty="0"/>
-              <a:t>Interpretation:</a:t>
-            </a:r>
-          </a:p>
-          <a:p>
-            <a:r>
-              <a:rPr lang="en-US" dirty="0"/>
-              <a:t>The words “hates” and “likes” are negatively contributing to the similarity score and ”apples” is positively contributing. Which is obvious.</a:t>
-            </a:r>
-          </a:p>
-        </p:txBody>
-      </p:sp>
+        </p:nvGraphicFramePr>
+        <p:xfrm>
+          <a:off x="441580" y="977776"/>
+          <a:ext cx="10976063" cy="1925320"/>
+        </p:xfrm>
+        <a:graphic>
+          <a:graphicData uri="http://schemas.openxmlformats.org/drawingml/2006/table">
+            <a:tbl>
+              <a:tblPr firstRow="1" bandRow="1">
+                <a:tableStyleId>{7DF18680-E054-41AD-8BC1-D1AEF772440D}</a:tableStyleId>
+              </a:tblPr>
+              <a:tblGrid>
+                <a:gridCol w="857374">
+                  <a:extLst>
+                    <a:ext uri="{9D8B030D-6E8A-4147-A177-3AD203B41FA5}">
+                      <a16:colId xmlns:a16="http://schemas.microsoft.com/office/drawing/2014/main" val="3133613118"/>
+                    </a:ext>
+                  </a:extLst>
+                </a:gridCol>
+                <a:gridCol w="2278644">
+                  <a:extLst>
+                    <a:ext uri="{9D8B030D-6E8A-4147-A177-3AD203B41FA5}">
+                      <a16:colId xmlns:a16="http://schemas.microsoft.com/office/drawing/2014/main" val="3841614346"/>
+                    </a:ext>
+                  </a:extLst>
+                </a:gridCol>
+                <a:gridCol w="1568009">
+                  <a:extLst>
+                    <a:ext uri="{9D8B030D-6E8A-4147-A177-3AD203B41FA5}">
+                      <a16:colId xmlns:a16="http://schemas.microsoft.com/office/drawing/2014/main" val="1600152621"/>
+                    </a:ext>
+                  </a:extLst>
+                </a:gridCol>
+                <a:gridCol w="1730920">
+                  <a:extLst>
+                    <a:ext uri="{9D8B030D-6E8A-4147-A177-3AD203B41FA5}">
+                      <a16:colId xmlns:a16="http://schemas.microsoft.com/office/drawing/2014/main" val="969051646"/>
+                    </a:ext>
+                  </a:extLst>
+                </a:gridCol>
+                <a:gridCol w="1405098">
+                  <a:extLst>
+                    <a:ext uri="{9D8B030D-6E8A-4147-A177-3AD203B41FA5}">
+                      <a16:colId xmlns:a16="http://schemas.microsoft.com/office/drawing/2014/main" val="2864839101"/>
+                    </a:ext>
+                  </a:extLst>
+                </a:gridCol>
+                <a:gridCol w="1568009">
+                  <a:extLst>
+                    <a:ext uri="{9D8B030D-6E8A-4147-A177-3AD203B41FA5}">
+                      <a16:colId xmlns:a16="http://schemas.microsoft.com/office/drawing/2014/main" val="1927313780"/>
+                    </a:ext>
+                  </a:extLst>
+                </a:gridCol>
+                <a:gridCol w="1568009">
+                  <a:extLst>
+                    <a:ext uri="{9D8B030D-6E8A-4147-A177-3AD203B41FA5}">
+                      <a16:colId xmlns:a16="http://schemas.microsoft.com/office/drawing/2014/main" val="2011091926"/>
+                    </a:ext>
+                  </a:extLst>
+                </a:gridCol>
+              </a:tblGrid>
+              <a:tr h="370840">
+                <a:tc>
+                  <a:txBody>
+                    <a:bodyPr/>
+                    <a:lstStyle/>
+                    <a:p>
+                      <a:r>
+                        <a:rPr lang="en-US" dirty="0"/>
+                        <a:t>Exp No</a:t>
+                      </a:r>
+                    </a:p>
+                  </a:txBody>
+                  <a:tcPr/>
+                </a:tc>
+                <a:tc>
+                  <a:txBody>
+                    <a:bodyPr/>
+                    <a:lstStyle/>
+                    <a:p>
+                      <a:r>
+                        <a:rPr lang="en-US" dirty="0"/>
+                        <a:t>Model Name</a:t>
+                      </a:r>
+                    </a:p>
+                  </a:txBody>
+                  <a:tcPr/>
+                </a:tc>
+                <a:tc>
+                  <a:txBody>
+                    <a:bodyPr/>
+                    <a:lstStyle/>
+                    <a:p>
+                      <a:r>
+                        <a:rPr lang="en-US" dirty="0"/>
+                        <a:t>Design Type</a:t>
+                      </a:r>
+                    </a:p>
+                  </a:txBody>
+                  <a:tcPr/>
+                </a:tc>
+                <a:tc>
+                  <a:txBody>
+                    <a:bodyPr/>
+                    <a:lstStyle/>
+                    <a:p>
+                      <a:r>
+                        <a:rPr lang="en-US" dirty="0" err="1"/>
+                        <a:t>Optim</a:t>
+                      </a:r>
+                      <a:r>
+                        <a:rPr lang="en-US" dirty="0"/>
+                        <a:t> </a:t>
+                      </a:r>
+                      <a:r>
+                        <a:rPr lang="en-US" dirty="0" err="1"/>
+                        <a:t>Func</a:t>
+                      </a:r>
+                      <a:endParaRPr lang="en-US" dirty="0"/>
+                    </a:p>
+                  </a:txBody>
+                  <a:tcPr/>
+                </a:tc>
+                <a:tc>
+                  <a:txBody>
+                    <a:bodyPr/>
+                    <a:lstStyle/>
+                    <a:p>
+                      <a:r>
+                        <a:rPr lang="en-US" dirty="0"/>
+                        <a:t>Train Data r value</a:t>
+                      </a:r>
+                    </a:p>
+                  </a:txBody>
+                  <a:tcPr/>
+                </a:tc>
+                <a:tc>
+                  <a:txBody>
+                    <a:bodyPr/>
+                    <a:lstStyle/>
+                    <a:p>
+                      <a:r>
+                        <a:rPr lang="en-US" dirty="0"/>
+                        <a:t>Val Data r value</a:t>
+                      </a:r>
+                    </a:p>
+                  </a:txBody>
+                  <a:tcPr/>
+                </a:tc>
+                <a:tc>
+                  <a:txBody>
+                    <a:bodyPr/>
+                    <a:lstStyle/>
+                    <a:p>
+                      <a:r>
+                        <a:rPr lang="en-US" dirty="0"/>
+                        <a:t>Test Data r value</a:t>
+                      </a:r>
+                    </a:p>
+                  </a:txBody>
+                  <a:tcPr/>
+                </a:tc>
+                <a:extLst>
+                  <a:ext uri="{0D108BD9-81ED-4DB2-BD59-A6C34878D82A}">
+                    <a16:rowId xmlns:a16="http://schemas.microsoft.com/office/drawing/2014/main" val="1401507077"/>
+                  </a:ext>
+                </a:extLst>
+              </a:tr>
+              <a:tr h="370840">
+                <a:tc>
+                  <a:txBody>
+                    <a:bodyPr/>
+                    <a:lstStyle/>
+                    <a:p>
+                      <a:r>
+                        <a:rPr lang="en-US" dirty="0"/>
+                        <a:t>7</a:t>
+                      </a:r>
+                    </a:p>
+                  </a:txBody>
+                  <a:tcPr/>
+                </a:tc>
+                <a:tc>
+                  <a:txBody>
+                    <a:bodyPr/>
+                    <a:lstStyle/>
+                    <a:p>
+                      <a:r>
+                        <a:rPr lang="en-US" dirty="0"/>
+                        <a:t>Siamese </a:t>
+                      </a:r>
+                      <a:r>
+                        <a:rPr lang="en-US" dirty="0" err="1"/>
+                        <a:t>BiLSTM</a:t>
+                      </a:r>
+                      <a:endParaRPr lang="en-US" dirty="0"/>
+                    </a:p>
+                  </a:txBody>
+                  <a:tcPr/>
+                </a:tc>
+                <a:tc>
+                  <a:txBody>
+                    <a:bodyPr/>
+                    <a:lstStyle/>
+                    <a:p>
+                      <a:r>
+                        <a:rPr lang="en-US" dirty="0"/>
+                        <a:t>Design3</a:t>
+                      </a:r>
+                    </a:p>
+                  </a:txBody>
+                  <a:tcPr/>
+                </a:tc>
+                <a:tc>
+                  <a:txBody>
+                    <a:bodyPr/>
+                    <a:lstStyle/>
+                    <a:p>
+                      <a:r>
+                        <a:rPr lang="en-US" dirty="0" err="1"/>
+                        <a:t>PearsonLoss</a:t>
+                      </a:r>
+                      <a:endParaRPr lang="en-US" dirty="0"/>
+                    </a:p>
+                  </a:txBody>
+                  <a:tcPr/>
+                </a:tc>
+                <a:tc>
+                  <a:txBody>
+                    <a:bodyPr/>
+                    <a:lstStyle/>
+                    <a:p>
+                      <a:r>
+                        <a:rPr lang="en-US" dirty="0"/>
+                        <a:t>0.18</a:t>
+                      </a:r>
+                    </a:p>
+                  </a:txBody>
+                  <a:tcPr/>
+                </a:tc>
+                <a:tc>
+                  <a:txBody>
+                    <a:bodyPr/>
+                    <a:lstStyle/>
+                    <a:p>
+                      <a:r>
+                        <a:rPr lang="en-US" dirty="0"/>
+                        <a:t>0.09</a:t>
+                      </a:r>
+                    </a:p>
+                  </a:txBody>
+                  <a:tcPr/>
+                </a:tc>
+                <a:tc>
+                  <a:txBody>
+                    <a:bodyPr/>
+                    <a:lstStyle/>
+                    <a:p>
+                      <a:r>
+                        <a:rPr lang="en-US" dirty="0"/>
+                        <a:t>0.13</a:t>
+                      </a:r>
+                    </a:p>
+                  </a:txBody>
+                  <a:tcPr/>
+                </a:tc>
+                <a:extLst>
+                  <a:ext uri="{0D108BD9-81ED-4DB2-BD59-A6C34878D82A}">
+                    <a16:rowId xmlns:a16="http://schemas.microsoft.com/office/drawing/2014/main" val="3969947293"/>
+                  </a:ext>
+                </a:extLst>
+              </a:tr>
+              <a:tr h="370840">
+                <a:tc>
+                  <a:txBody>
+                    <a:bodyPr/>
+                    <a:lstStyle/>
+                    <a:p>
+                      <a:r>
+                        <a:rPr lang="en-US" dirty="0"/>
+                        <a:t>8</a:t>
+                      </a:r>
+                    </a:p>
+                  </a:txBody>
+                  <a:tcPr/>
+                </a:tc>
+                <a:tc>
+                  <a:txBody>
+                    <a:bodyPr/>
+                    <a:lstStyle/>
+                    <a:p>
+                      <a:pPr marL="0" marR="0" lvl="0" indent="0" algn="l" defTabSz="914400" rtl="0" eaLnBrk="1" fontAlgn="auto" latinLnBrk="0" hangingPunct="1">
+                        <a:lnSpc>
+                          <a:spcPct val="100000"/>
+                        </a:lnSpc>
+                        <a:spcBef>
+                          <a:spcPts val="0"/>
+                        </a:spcBef>
+                        <a:spcAft>
+                          <a:spcPts val="0"/>
+                        </a:spcAft>
+                        <a:buClrTx/>
+                        <a:buSzTx/>
+                        <a:buFontTx/>
+                        <a:buNone/>
+                        <a:tabLst/>
+                        <a:defRPr/>
+                      </a:pPr>
+                      <a:r>
+                        <a:rPr lang="en-US" dirty="0"/>
+                        <a:t>Cross Lingual Siamese </a:t>
+                      </a:r>
+                      <a:r>
+                        <a:rPr lang="en-US" dirty="0" err="1"/>
+                        <a:t>BiLSTM</a:t>
+                      </a:r>
+                      <a:r>
+                        <a:rPr lang="en-US" dirty="0"/>
+                        <a:t> for </a:t>
+                      </a:r>
+                      <a:r>
+                        <a:rPr lang="en-US" dirty="0" err="1"/>
+                        <a:t>en</a:t>
+                      </a:r>
+                      <a:r>
+                        <a:rPr lang="en-US" dirty="0"/>
+                        <a:t>-es</a:t>
+                      </a:r>
+                    </a:p>
+                  </a:txBody>
+                  <a:tcPr/>
+                </a:tc>
+                <a:tc>
+                  <a:txBody>
+                    <a:bodyPr/>
+                    <a:lstStyle/>
+                    <a:p>
+                      <a:r>
+                        <a:rPr lang="en-US" dirty="0"/>
+                        <a:t>Design3</a:t>
+                      </a:r>
+                    </a:p>
+                  </a:txBody>
+                  <a:tcPr/>
+                </a:tc>
+                <a:tc>
+                  <a:txBody>
+                    <a:bodyPr/>
+                    <a:lstStyle/>
+                    <a:p>
+                      <a:r>
+                        <a:rPr lang="en-US" dirty="0"/>
+                        <a:t>MSE Loss</a:t>
+                      </a:r>
+                    </a:p>
+                  </a:txBody>
+                  <a:tcPr/>
+                </a:tc>
+                <a:tc>
+                  <a:txBody>
+                    <a:bodyPr/>
+                    <a:lstStyle/>
+                    <a:p>
+                      <a:r>
+                        <a:rPr lang="en-US" dirty="0"/>
+                        <a:t>0.153</a:t>
+                      </a:r>
+                    </a:p>
+                  </a:txBody>
+                  <a:tcPr/>
+                </a:tc>
+                <a:tc>
+                  <a:txBody>
+                    <a:bodyPr/>
+                    <a:lstStyle/>
+                    <a:p>
+                      <a:r>
+                        <a:rPr lang="en-US" dirty="0"/>
+                        <a:t>0.08</a:t>
+                      </a:r>
+                    </a:p>
+                  </a:txBody>
+                  <a:tcPr/>
+                </a:tc>
+                <a:tc>
+                  <a:txBody>
+                    <a:bodyPr/>
+                    <a:lstStyle/>
+                    <a:p>
+                      <a:r>
+                        <a:rPr lang="en-US" dirty="0"/>
+                        <a:t>0.103</a:t>
+                      </a:r>
+                    </a:p>
+                  </a:txBody>
+                  <a:tcPr/>
+                </a:tc>
+                <a:extLst>
+                  <a:ext uri="{0D108BD9-81ED-4DB2-BD59-A6C34878D82A}">
+                    <a16:rowId xmlns:a16="http://schemas.microsoft.com/office/drawing/2014/main" val="2040851283"/>
+                  </a:ext>
+                </a:extLst>
+              </a:tr>
+            </a:tbl>
+          </a:graphicData>
+        </a:graphic>
+      </p:graphicFrame>
     </p:spTree>
     <p:extLst>
       <p:ext uri="{BB962C8B-B14F-4D97-AF65-F5344CB8AC3E}">
-        <p14:creationId xmlns:p14="http://schemas.microsoft.com/office/powerpoint/2010/main" val="3309442883"/>
+        <p14:creationId xmlns:p14="http://schemas.microsoft.com/office/powerpoint/2010/main" val="3841735592"/>
       </p:ext>
     </p:extLst>
   </p:cSld>

</xml_diff>

<commit_message>
updated the final report
</commit_message>
<xml_diff>
--- a/4-final_report.pptx
+++ b/4-final_report.pptx
@@ -12,13 +12,14 @@
     <p:sldId id="259" r:id="rId6"/>
     <p:sldId id="267" r:id="rId7"/>
     <p:sldId id="261" r:id="rId8"/>
-    <p:sldId id="262" r:id="rId9"/>
-    <p:sldId id="268" r:id="rId10"/>
-    <p:sldId id="263" r:id="rId11"/>
-    <p:sldId id="269" r:id="rId12"/>
-    <p:sldId id="264" r:id="rId13"/>
-    <p:sldId id="265" r:id="rId14"/>
-    <p:sldId id="266" r:id="rId15"/>
+    <p:sldId id="270" r:id="rId9"/>
+    <p:sldId id="262" r:id="rId10"/>
+    <p:sldId id="268" r:id="rId11"/>
+    <p:sldId id="263" r:id="rId12"/>
+    <p:sldId id="269" r:id="rId13"/>
+    <p:sldId id="264" r:id="rId14"/>
+    <p:sldId id="265" r:id="rId15"/>
+    <p:sldId id="266" r:id="rId16"/>
   </p:sldIdLst>
   <p:sldSz cx="12192000" cy="6858000"/>
   <p:notesSz cx="6858000" cy="9144000"/>
@@ -440,7 +441,7 @@
             <a:fld id="{73C3BD54-29B9-3D42-B178-776ED395AA85}" type="datetimeFigureOut">
               <a:rPr lang="en-US" smtClean="0"/>
               <a:pPr/>
-              <a:t>5/3/23</a:t>
+              <a:t>5/5/23</a:t>
             </a:fld>
             <a:endParaRPr lang="en-US" sz="1400"/>
           </a:p>
@@ -690,7 +691,7 @@
           <a:p>
             <a:fld id="{73C3BD54-29B9-3D42-B178-776ED395AA85}" type="datetimeFigureOut">
               <a:rPr lang="en-US" smtClean="0"/>
-              <a:t>5/3/23</a:t>
+              <a:t>5/5/23</a:t>
             </a:fld>
             <a:endParaRPr lang="en-US"/>
           </a:p>
@@ -1004,7 +1005,7 @@
           <a:p>
             <a:fld id="{73C3BD54-29B9-3D42-B178-776ED395AA85}" type="datetimeFigureOut">
               <a:rPr lang="en-US" smtClean="0"/>
-              <a:t>5/3/23</a:t>
+              <a:t>5/5/23</a:t>
             </a:fld>
             <a:endParaRPr lang="en-US"/>
           </a:p>
@@ -1518,7 +1519,7 @@
           <a:p>
             <a:fld id="{73C3BD54-29B9-3D42-B178-776ED395AA85}" type="datetimeFigureOut">
               <a:rPr lang="en-US" smtClean="0"/>
-              <a:t>5/3/23</a:t>
+              <a:t>5/5/23</a:t>
             </a:fld>
             <a:endParaRPr lang="en-US"/>
           </a:p>
@@ -1949,7 +1950,7 @@
           <a:p>
             <a:fld id="{73C3BD54-29B9-3D42-B178-776ED395AA85}" type="datetimeFigureOut">
               <a:rPr lang="en-US" smtClean="0"/>
-              <a:t>5/3/23</a:t>
+              <a:t>5/5/23</a:t>
             </a:fld>
             <a:endParaRPr lang="en-US"/>
           </a:p>
@@ -2214,7 +2215,7 @@
           <a:p>
             <a:fld id="{73C3BD54-29B9-3D42-B178-776ED395AA85}" type="datetimeFigureOut">
               <a:rPr lang="en-US" smtClean="0"/>
-              <a:t>5/3/23</a:t>
+              <a:t>5/5/23</a:t>
             </a:fld>
             <a:endParaRPr lang="en-US"/>
           </a:p>
@@ -2788,7 +2789,7 @@
           <a:p>
             <a:fld id="{73C3BD54-29B9-3D42-B178-776ED395AA85}" type="datetimeFigureOut">
               <a:rPr lang="en-US" smtClean="0"/>
-              <a:t>5/3/23</a:t>
+              <a:t>5/5/23</a:t>
             </a:fld>
             <a:endParaRPr lang="en-US"/>
           </a:p>
@@ -3091,7 +3092,7 @@
           <a:p>
             <a:fld id="{73C3BD54-29B9-3D42-B178-776ED395AA85}" type="datetimeFigureOut">
               <a:rPr lang="en-US" smtClean="0"/>
-              <a:t>5/3/23</a:t>
+              <a:t>5/5/23</a:t>
             </a:fld>
             <a:endParaRPr lang="en-US"/>
           </a:p>
@@ -3366,7 +3367,7 @@
           <a:p>
             <a:fld id="{73C3BD54-29B9-3D42-B178-776ED395AA85}" type="datetimeFigureOut">
               <a:rPr lang="en-US" smtClean="0"/>
-              <a:t>5/3/23</a:t>
+              <a:t>5/5/23</a:t>
             </a:fld>
             <a:endParaRPr lang="en-US"/>
           </a:p>
@@ -3837,7 +3838,7 @@
           <a:p>
             <a:fld id="{73C3BD54-29B9-3D42-B178-776ED395AA85}" type="datetimeFigureOut">
               <a:rPr lang="en-US" smtClean="0"/>
-              <a:t>5/3/23</a:t>
+              <a:t>5/5/23</a:t>
             </a:fld>
             <a:endParaRPr lang="en-US"/>
           </a:p>
@@ -4288,7 +4289,7 @@
           <a:p>
             <a:fld id="{73C3BD54-29B9-3D42-B178-776ED395AA85}" type="datetimeFigureOut">
               <a:rPr lang="en-US" smtClean="0"/>
-              <a:t>5/3/23</a:t>
+              <a:t>5/5/23</a:t>
             </a:fld>
             <a:endParaRPr lang="en-US"/>
           </a:p>
@@ -4687,7 +4688,7 @@
             <a:fld id="{73C3BD54-29B9-3D42-B178-776ED395AA85}" type="datetimeFigureOut">
               <a:rPr lang="en-US" smtClean="0"/>
               <a:pPr/>
-              <a:t>5/3/23</a:t>
+              <a:t>5/5/23</a:t>
             </a:fld>
             <a:endParaRPr lang="en-US" dirty="0"/>
           </a:p>
@@ -5485,7 +5486,7 @@
           <p:cNvPr id="2" name="Title 1">
             <a:extLst>
               <a:ext uri="{FF2B5EF4-FFF2-40B4-BE49-F238E27FC236}">
-                <a16:creationId xmlns:a16="http://schemas.microsoft.com/office/drawing/2014/main" id="{98CB23D4-9B76-90AF-6EAD-4A11A6909925}"/>
+                <a16:creationId xmlns:a16="http://schemas.microsoft.com/office/drawing/2014/main" id="{A8976B50-B660-35A7-1C60-E6D6CDA1AB11}"/>
               </a:ext>
             </a:extLst>
           </p:cNvPr>
@@ -5498,8 +5499,8 @@
         </p:nvSpPr>
         <p:spPr>
           <a:xfrm>
-            <a:off x="318013" y="376818"/>
-            <a:ext cx="11420906" cy="908285"/>
+            <a:off x="441580" y="254501"/>
+            <a:ext cx="10568289" cy="1446550"/>
           </a:xfrm>
         </p:spPr>
         <p:txBody>
@@ -5508,191 +5509,566 @@
           <a:p>
             <a:r>
               <a:rPr lang="en-US" dirty="0"/>
-              <a:t>Train vs Validation Losses</a:t>
-            </a:r>
-          </a:p>
-        </p:txBody>
-      </p:sp>
-      <p:pic>
-        <p:nvPicPr>
-          <p:cNvPr id="1026" name="Picture 2">
-            <a:extLst>
-              <a:ext uri="{FF2B5EF4-FFF2-40B4-BE49-F238E27FC236}">
-                <a16:creationId xmlns:a16="http://schemas.microsoft.com/office/drawing/2014/main" id="{1CC13B02-438B-9B56-F004-810DA5E17483}"/>
-              </a:ext>
-            </a:extLst>
-          </p:cNvPr>
-          <p:cNvPicPr>
-            <a:picLocks noChangeAspect="1" noChangeArrowheads="1"/>
-          </p:cNvPicPr>
-          <p:nvPr/>
-        </p:nvPicPr>
-        <p:blipFill>
-          <a:blip r:embed="rId2">
-            <a:extLst>
-              <a:ext uri="{28A0092B-C50C-407E-A947-70E740481C1C}">
-                <a14:useLocalDpi xmlns:a14="http://schemas.microsoft.com/office/drawing/2010/main" val="0"/>
-              </a:ext>
-            </a:extLst>
-          </a:blip>
-          <a:srcRect/>
-          <a:stretch>
-            <a:fillRect/>
-          </a:stretch>
-        </p:blipFill>
-        <p:spPr bwMode="auto">
-          <a:xfrm>
-            <a:off x="614575" y="1856571"/>
-            <a:ext cx="4264969" cy="3374889"/>
-          </a:xfrm>
-          <a:prstGeom prst="rect">
-            <a:avLst/>
-          </a:prstGeom>
-          <a:noFill/>
-          <a:extLst>
-            <a:ext uri="{909E8E84-426E-40DD-AFC4-6F175D3DCCD1}">
-              <a14:hiddenFill xmlns:a14="http://schemas.microsoft.com/office/drawing/2010/main">
-                <a:solidFill>
-                  <a:srgbClr val="FFFFFF"/>
-                </a:solidFill>
-              </a14:hiddenFill>
-            </a:ext>
-          </a:extLst>
-        </p:spPr>
-      </p:pic>
-      <p:pic>
-        <p:nvPicPr>
-          <p:cNvPr id="1028" name="Picture 4">
-            <a:extLst>
-              <a:ext uri="{FF2B5EF4-FFF2-40B4-BE49-F238E27FC236}">
-                <a16:creationId xmlns:a16="http://schemas.microsoft.com/office/drawing/2014/main" id="{F9080B4B-CA69-4C3B-8B4D-1317A8E0C79A}"/>
-              </a:ext>
-            </a:extLst>
-          </p:cNvPr>
-          <p:cNvPicPr>
-            <a:picLocks noChangeAspect="1" noChangeArrowheads="1"/>
-          </p:cNvPicPr>
-          <p:nvPr/>
-        </p:nvPicPr>
-        <p:blipFill>
-          <a:blip r:embed="rId3">
-            <a:extLst>
-              <a:ext uri="{28A0092B-C50C-407E-A947-70E740481C1C}">
-                <a14:useLocalDpi xmlns:a14="http://schemas.microsoft.com/office/drawing/2010/main" val="0"/>
-              </a:ext>
-            </a:extLst>
-          </a:blip>
-          <a:srcRect/>
-          <a:stretch>
-            <a:fillRect/>
-          </a:stretch>
-        </p:blipFill>
-        <p:spPr bwMode="auto">
-          <a:xfrm>
-            <a:off x="7111657" y="3287991"/>
-            <a:ext cx="4264969" cy="3452955"/>
-          </a:xfrm>
-          <a:prstGeom prst="rect">
-            <a:avLst/>
-          </a:prstGeom>
-          <a:noFill/>
-          <a:extLst>
-            <a:ext uri="{909E8E84-426E-40DD-AFC4-6F175D3DCCD1}">
-              <a14:hiddenFill xmlns:a14="http://schemas.microsoft.com/office/drawing/2010/main">
-                <a:solidFill>
-                  <a:srgbClr val="FFFFFF"/>
-                </a:solidFill>
-              </a14:hiddenFill>
-            </a:ext>
-          </a:extLst>
-        </p:spPr>
-      </p:pic>
-      <p:pic>
-        <p:nvPicPr>
-          <p:cNvPr id="1030" name="Picture 6">
-            <a:extLst>
-              <a:ext uri="{FF2B5EF4-FFF2-40B4-BE49-F238E27FC236}">
-                <a16:creationId xmlns:a16="http://schemas.microsoft.com/office/drawing/2014/main" id="{4324233F-7DC1-A6C4-788D-35A949FE3488}"/>
-              </a:ext>
-            </a:extLst>
-          </p:cNvPr>
-          <p:cNvPicPr>
-            <a:picLocks noChangeAspect="1" noChangeArrowheads="1"/>
-          </p:cNvPicPr>
-          <p:nvPr/>
-        </p:nvPicPr>
-        <p:blipFill>
-          <a:blip r:embed="rId4">
-            <a:extLst>
-              <a:ext uri="{28A0092B-C50C-407E-A947-70E740481C1C}">
-                <a14:useLocalDpi xmlns:a14="http://schemas.microsoft.com/office/drawing/2010/main" val="0"/>
-              </a:ext>
-            </a:extLst>
-          </a:blip>
-          <a:srcRect/>
-          <a:stretch>
-            <a:fillRect/>
-          </a:stretch>
-        </p:blipFill>
-        <p:spPr bwMode="auto">
-          <a:xfrm>
-            <a:off x="7111658" y="340614"/>
-            <a:ext cx="4079790" cy="2829869"/>
-          </a:xfrm>
-          <a:prstGeom prst="rect">
-            <a:avLst/>
-          </a:prstGeom>
-          <a:noFill/>
-          <a:extLst>
-            <a:ext uri="{909E8E84-426E-40DD-AFC4-6F175D3DCCD1}">
-              <a14:hiddenFill xmlns:a14="http://schemas.microsoft.com/office/drawing/2010/main">
-                <a:solidFill>
-                  <a:srgbClr val="FFFFFF"/>
-                </a:solidFill>
-              </a14:hiddenFill>
-            </a:ext>
-          </a:extLst>
-        </p:spPr>
-      </p:pic>
-      <p:sp>
-        <p:nvSpPr>
-          <p:cNvPr id="6" name="TextBox 5">
-            <a:extLst>
-              <a:ext uri="{FF2B5EF4-FFF2-40B4-BE49-F238E27FC236}">
-                <a16:creationId xmlns:a16="http://schemas.microsoft.com/office/drawing/2014/main" id="{6ADC8E48-D43E-2E36-EEA3-4B48AACEA53C}"/>
-              </a:ext>
-            </a:extLst>
-          </p:cNvPr>
-          <p:cNvSpPr txBox="1"/>
-          <p:nvPr/>
-        </p:nvSpPr>
-        <p:spPr>
-          <a:xfrm>
-            <a:off x="1161535" y="5659395"/>
-            <a:ext cx="5436973" cy="923330"/>
-          </a:xfrm>
-          <a:prstGeom prst="rect">
-            <a:avLst/>
-          </a:prstGeom>
-          <a:noFill/>
-        </p:spPr>
-        <p:txBody>
-          <a:bodyPr wrap="square" rtlCol="0">
-            <a:spAutoFit/>
-          </a:bodyPr>
-          <a:lstStyle/>
-          <a:p>
+              <a:t>Experiments </a:t>
+            </a:r>
+            <a:r>
+              <a:rPr lang="en-US" dirty="0" err="1"/>
+              <a:t>Contd</a:t>
+            </a:r>
             <a:r>
               <a:rPr lang="en-US" dirty="0"/>
-              <a:t>Observation: Neural networks are overfitting due to less data as training data is only 5749 sentence pairs with vocab size of 8306</a:t>
-            </a:r>
-          </a:p>
-        </p:txBody>
-      </p:sp>
+              <a:t>…</a:t>
+            </a:r>
+          </a:p>
+        </p:txBody>
+      </p:sp>
+      <p:graphicFrame>
+        <p:nvGraphicFramePr>
+          <p:cNvPr id="4" name="Table 4">
+            <a:extLst>
+              <a:ext uri="{FF2B5EF4-FFF2-40B4-BE49-F238E27FC236}">
+                <a16:creationId xmlns:a16="http://schemas.microsoft.com/office/drawing/2014/main" id="{5755DB75-1BA5-3DEC-41D9-C60AEA29E169}"/>
+              </a:ext>
+            </a:extLst>
+          </p:cNvPr>
+          <p:cNvGraphicFramePr>
+            <a:graphicFrameLocks noGrp="1"/>
+          </p:cNvGraphicFramePr>
+          <p:nvPr>
+            <p:ph idx="1"/>
+            <p:extLst>
+              <p:ext uri="{D42A27DB-BD31-4B8C-83A1-F6EECF244321}">
+                <p14:modId xmlns:p14="http://schemas.microsoft.com/office/powerpoint/2010/main" val="261818614"/>
+              </p:ext>
+            </p:extLst>
+          </p:nvPr>
+        </p:nvGraphicFramePr>
+        <p:xfrm>
+          <a:off x="441580" y="977776"/>
+          <a:ext cx="10976063" cy="2565400"/>
+        </p:xfrm>
+        <a:graphic>
+          <a:graphicData uri="http://schemas.openxmlformats.org/drawingml/2006/table">
+            <a:tbl>
+              <a:tblPr firstRow="1" bandRow="1">
+                <a:tableStyleId>{7DF18680-E054-41AD-8BC1-D1AEF772440D}</a:tableStyleId>
+              </a:tblPr>
+              <a:tblGrid>
+                <a:gridCol w="857374">
+                  <a:extLst>
+                    <a:ext uri="{9D8B030D-6E8A-4147-A177-3AD203B41FA5}">
+                      <a16:colId xmlns:a16="http://schemas.microsoft.com/office/drawing/2014/main" val="3133613118"/>
+                    </a:ext>
+                  </a:extLst>
+                </a:gridCol>
+                <a:gridCol w="2278644">
+                  <a:extLst>
+                    <a:ext uri="{9D8B030D-6E8A-4147-A177-3AD203B41FA5}">
+                      <a16:colId xmlns:a16="http://schemas.microsoft.com/office/drawing/2014/main" val="3841614346"/>
+                    </a:ext>
+                  </a:extLst>
+                </a:gridCol>
+                <a:gridCol w="1568009">
+                  <a:extLst>
+                    <a:ext uri="{9D8B030D-6E8A-4147-A177-3AD203B41FA5}">
+                      <a16:colId xmlns:a16="http://schemas.microsoft.com/office/drawing/2014/main" val="1600152621"/>
+                    </a:ext>
+                  </a:extLst>
+                </a:gridCol>
+                <a:gridCol w="1730920">
+                  <a:extLst>
+                    <a:ext uri="{9D8B030D-6E8A-4147-A177-3AD203B41FA5}">
+                      <a16:colId xmlns:a16="http://schemas.microsoft.com/office/drawing/2014/main" val="969051646"/>
+                    </a:ext>
+                  </a:extLst>
+                </a:gridCol>
+                <a:gridCol w="1405098">
+                  <a:extLst>
+                    <a:ext uri="{9D8B030D-6E8A-4147-A177-3AD203B41FA5}">
+                      <a16:colId xmlns:a16="http://schemas.microsoft.com/office/drawing/2014/main" val="2864839101"/>
+                    </a:ext>
+                  </a:extLst>
+                </a:gridCol>
+                <a:gridCol w="1568009">
+                  <a:extLst>
+                    <a:ext uri="{9D8B030D-6E8A-4147-A177-3AD203B41FA5}">
+                      <a16:colId xmlns:a16="http://schemas.microsoft.com/office/drawing/2014/main" val="1927313780"/>
+                    </a:ext>
+                  </a:extLst>
+                </a:gridCol>
+                <a:gridCol w="1568009">
+                  <a:extLst>
+                    <a:ext uri="{9D8B030D-6E8A-4147-A177-3AD203B41FA5}">
+                      <a16:colId xmlns:a16="http://schemas.microsoft.com/office/drawing/2014/main" val="2011091926"/>
+                    </a:ext>
+                  </a:extLst>
+                </a:gridCol>
+              </a:tblGrid>
+              <a:tr h="370840">
+                <a:tc>
+                  <a:txBody>
+                    <a:bodyPr/>
+                    <a:lstStyle/>
+                    <a:p>
+                      <a:r>
+                        <a:rPr lang="en-US" dirty="0"/>
+                        <a:t>Exp No</a:t>
+                      </a:r>
+                    </a:p>
+                  </a:txBody>
+                  <a:tcPr/>
+                </a:tc>
+                <a:tc>
+                  <a:txBody>
+                    <a:bodyPr/>
+                    <a:lstStyle/>
+                    <a:p>
+                      <a:r>
+                        <a:rPr lang="en-US" dirty="0"/>
+                        <a:t>Model Name</a:t>
+                      </a:r>
+                    </a:p>
+                  </a:txBody>
+                  <a:tcPr/>
+                </a:tc>
+                <a:tc>
+                  <a:txBody>
+                    <a:bodyPr/>
+                    <a:lstStyle/>
+                    <a:p>
+                      <a:r>
+                        <a:rPr lang="en-US" dirty="0"/>
+                        <a:t>Design Type</a:t>
+                      </a:r>
+                    </a:p>
+                  </a:txBody>
+                  <a:tcPr/>
+                </a:tc>
+                <a:tc>
+                  <a:txBody>
+                    <a:bodyPr/>
+                    <a:lstStyle/>
+                    <a:p>
+                      <a:r>
+                        <a:rPr lang="en-US" dirty="0" err="1"/>
+                        <a:t>Optim</a:t>
+                      </a:r>
+                      <a:r>
+                        <a:rPr lang="en-US" dirty="0"/>
+                        <a:t> </a:t>
+                      </a:r>
+                      <a:r>
+                        <a:rPr lang="en-US" dirty="0" err="1"/>
+                        <a:t>Func</a:t>
+                      </a:r>
+                      <a:endParaRPr lang="en-US" dirty="0"/>
+                    </a:p>
+                  </a:txBody>
+                  <a:tcPr/>
+                </a:tc>
+                <a:tc>
+                  <a:txBody>
+                    <a:bodyPr/>
+                    <a:lstStyle/>
+                    <a:p>
+                      <a:r>
+                        <a:rPr lang="en-US" dirty="0"/>
+                        <a:t>Train Data r value</a:t>
+                      </a:r>
+                    </a:p>
+                  </a:txBody>
+                  <a:tcPr/>
+                </a:tc>
+                <a:tc>
+                  <a:txBody>
+                    <a:bodyPr/>
+                    <a:lstStyle/>
+                    <a:p>
+                      <a:r>
+                        <a:rPr lang="en-US" dirty="0"/>
+                        <a:t>Val Data r value</a:t>
+                      </a:r>
+                    </a:p>
+                  </a:txBody>
+                  <a:tcPr/>
+                </a:tc>
+                <a:tc>
+                  <a:txBody>
+                    <a:bodyPr/>
+                    <a:lstStyle/>
+                    <a:p>
+                      <a:r>
+                        <a:rPr lang="en-US" dirty="0"/>
+                        <a:t>Test Data r value</a:t>
+                      </a:r>
+                    </a:p>
+                  </a:txBody>
+                  <a:tcPr/>
+                </a:tc>
+                <a:extLst>
+                  <a:ext uri="{0D108BD9-81ED-4DB2-BD59-A6C34878D82A}">
+                    <a16:rowId xmlns:a16="http://schemas.microsoft.com/office/drawing/2014/main" val="1401507077"/>
+                  </a:ext>
+                </a:extLst>
+              </a:tr>
+              <a:tr h="370840">
+                <a:tc>
+                  <a:txBody>
+                    <a:bodyPr/>
+                    <a:lstStyle/>
+                    <a:p>
+                      <a:r>
+                        <a:rPr lang="en-US" dirty="0"/>
+                        <a:t>7</a:t>
+                      </a:r>
+                    </a:p>
+                  </a:txBody>
+                  <a:tcPr/>
+                </a:tc>
+                <a:tc>
+                  <a:txBody>
+                    <a:bodyPr/>
+                    <a:lstStyle/>
+                    <a:p>
+                      <a:r>
+                        <a:rPr lang="en-US" dirty="0"/>
+                        <a:t>Siamese </a:t>
+                      </a:r>
+                      <a:r>
+                        <a:rPr lang="en-US" dirty="0" err="1"/>
+                        <a:t>BiLSTM</a:t>
+                      </a:r>
+                      <a:endParaRPr lang="en-US" dirty="0"/>
+                    </a:p>
+                  </a:txBody>
+                  <a:tcPr/>
+                </a:tc>
+                <a:tc>
+                  <a:txBody>
+                    <a:bodyPr/>
+                    <a:lstStyle/>
+                    <a:p>
+                      <a:r>
+                        <a:rPr lang="en-US" dirty="0"/>
+                        <a:t>Design3</a:t>
+                      </a:r>
+                    </a:p>
+                  </a:txBody>
+                  <a:tcPr/>
+                </a:tc>
+                <a:tc>
+                  <a:txBody>
+                    <a:bodyPr/>
+                    <a:lstStyle/>
+                    <a:p>
+                      <a:r>
+                        <a:rPr lang="en-US" dirty="0" err="1"/>
+                        <a:t>PearsonLoss</a:t>
+                      </a:r>
+                      <a:endParaRPr lang="en-US" dirty="0"/>
+                    </a:p>
+                  </a:txBody>
+                  <a:tcPr/>
+                </a:tc>
+                <a:tc>
+                  <a:txBody>
+                    <a:bodyPr/>
+                    <a:lstStyle/>
+                    <a:p>
+                      <a:r>
+                        <a:rPr lang="en-US" dirty="0"/>
+                        <a:t>0.18</a:t>
+                      </a:r>
+                    </a:p>
+                  </a:txBody>
+                  <a:tcPr/>
+                </a:tc>
+                <a:tc>
+                  <a:txBody>
+                    <a:bodyPr/>
+                    <a:lstStyle/>
+                    <a:p>
+                      <a:r>
+                        <a:rPr lang="en-US" dirty="0"/>
+                        <a:t>0.09</a:t>
+                      </a:r>
+                    </a:p>
+                  </a:txBody>
+                  <a:tcPr/>
+                </a:tc>
+                <a:tc>
+                  <a:txBody>
+                    <a:bodyPr/>
+                    <a:lstStyle/>
+                    <a:p>
+                      <a:r>
+                        <a:rPr lang="en-US" dirty="0"/>
+                        <a:t>0.13</a:t>
+                      </a:r>
+                    </a:p>
+                  </a:txBody>
+                  <a:tcPr/>
+                </a:tc>
+                <a:extLst>
+                  <a:ext uri="{0D108BD9-81ED-4DB2-BD59-A6C34878D82A}">
+                    <a16:rowId xmlns:a16="http://schemas.microsoft.com/office/drawing/2014/main" val="3969947293"/>
+                  </a:ext>
+                </a:extLst>
+              </a:tr>
+              <a:tr h="370840">
+                <a:tc>
+                  <a:txBody>
+                    <a:bodyPr/>
+                    <a:lstStyle/>
+                    <a:p>
+                      <a:r>
+                        <a:rPr lang="en-US" dirty="0"/>
+                        <a:t>8</a:t>
+                      </a:r>
+                    </a:p>
+                  </a:txBody>
+                  <a:tcPr/>
+                </a:tc>
+                <a:tc>
+                  <a:txBody>
+                    <a:bodyPr/>
+                    <a:lstStyle/>
+                    <a:p>
+                      <a:pPr marL="0" marR="0" lvl="0" indent="0" algn="l" defTabSz="914400" rtl="0" eaLnBrk="1" fontAlgn="auto" latinLnBrk="0" hangingPunct="1">
+                        <a:lnSpc>
+                          <a:spcPct val="100000"/>
+                        </a:lnSpc>
+                        <a:spcBef>
+                          <a:spcPts val="0"/>
+                        </a:spcBef>
+                        <a:spcAft>
+                          <a:spcPts val="0"/>
+                        </a:spcAft>
+                        <a:buClrTx/>
+                        <a:buSzTx/>
+                        <a:buFontTx/>
+                        <a:buNone/>
+                        <a:tabLst/>
+                        <a:defRPr/>
+                      </a:pPr>
+                      <a:r>
+                        <a:rPr lang="en-US" dirty="0"/>
+                        <a:t>Cross Lingual Siamese </a:t>
+                      </a:r>
+                      <a:r>
+                        <a:rPr lang="en-US" dirty="0" err="1"/>
+                        <a:t>BiLSTM</a:t>
+                      </a:r>
+                      <a:r>
+                        <a:rPr lang="en-US" dirty="0"/>
+                        <a:t> for </a:t>
+                      </a:r>
+                      <a:r>
+                        <a:rPr lang="en-US" dirty="0" err="1"/>
+                        <a:t>en</a:t>
+                      </a:r>
+                      <a:r>
+                        <a:rPr lang="en-US" dirty="0"/>
+                        <a:t>-es</a:t>
+                      </a:r>
+                    </a:p>
+                  </a:txBody>
+                  <a:tcPr/>
+                </a:tc>
+                <a:tc>
+                  <a:txBody>
+                    <a:bodyPr/>
+                    <a:lstStyle/>
+                    <a:p>
+                      <a:r>
+                        <a:rPr lang="en-US" dirty="0"/>
+                        <a:t>Design3</a:t>
+                      </a:r>
+                    </a:p>
+                  </a:txBody>
+                  <a:tcPr/>
+                </a:tc>
+                <a:tc>
+                  <a:txBody>
+                    <a:bodyPr/>
+                    <a:lstStyle/>
+                    <a:p>
+                      <a:r>
+                        <a:rPr lang="en-US" dirty="0"/>
+                        <a:t>MSE Loss</a:t>
+                      </a:r>
+                    </a:p>
+                  </a:txBody>
+                  <a:tcPr/>
+                </a:tc>
+                <a:tc>
+                  <a:txBody>
+                    <a:bodyPr/>
+                    <a:lstStyle/>
+                    <a:p>
+                      <a:r>
+                        <a:rPr lang="en-US" dirty="0"/>
+                        <a:t>0.153</a:t>
+                      </a:r>
+                    </a:p>
+                  </a:txBody>
+                  <a:tcPr/>
+                </a:tc>
+                <a:tc>
+                  <a:txBody>
+                    <a:bodyPr/>
+                    <a:lstStyle/>
+                    <a:p>
+                      <a:r>
+                        <a:rPr lang="en-US" dirty="0"/>
+                        <a:t>0.08</a:t>
+                      </a:r>
+                    </a:p>
+                  </a:txBody>
+                  <a:tcPr/>
+                </a:tc>
+                <a:tc>
+                  <a:txBody>
+                    <a:bodyPr/>
+                    <a:lstStyle/>
+                    <a:p>
+                      <a:r>
+                        <a:rPr lang="en-US" dirty="0"/>
+                        <a:t>0.103</a:t>
+                      </a:r>
+                    </a:p>
+                  </a:txBody>
+                  <a:tcPr/>
+                </a:tc>
+                <a:extLst>
+                  <a:ext uri="{0D108BD9-81ED-4DB2-BD59-A6C34878D82A}">
+                    <a16:rowId xmlns:a16="http://schemas.microsoft.com/office/drawing/2014/main" val="2040851283"/>
+                  </a:ext>
+                </a:extLst>
+              </a:tr>
+              <a:tr h="370840">
+                <a:tc>
+                  <a:txBody>
+                    <a:bodyPr/>
+                    <a:lstStyle/>
+                    <a:p>
+                      <a:r>
+                        <a:rPr lang="en-US" dirty="0"/>
+                        <a:t>9</a:t>
+                      </a:r>
+                    </a:p>
+                  </a:txBody>
+                  <a:tcPr/>
+                </a:tc>
+                <a:tc>
+                  <a:txBody>
+                    <a:bodyPr/>
+                    <a:lstStyle/>
+                    <a:p>
+                      <a:pPr marL="0" marR="0" lvl="0" indent="0" algn="l" defTabSz="914400" rtl="0" eaLnBrk="1" fontAlgn="auto" latinLnBrk="0" hangingPunct="1">
+                        <a:lnSpc>
+                          <a:spcPct val="100000"/>
+                        </a:lnSpc>
+                        <a:spcBef>
+                          <a:spcPts val="0"/>
+                        </a:spcBef>
+                        <a:spcAft>
+                          <a:spcPts val="0"/>
+                        </a:spcAft>
+                        <a:buClrTx/>
+                        <a:buSzTx/>
+                        <a:buFontTx/>
+                        <a:buNone/>
+                        <a:tabLst/>
+                        <a:defRPr/>
+                      </a:pPr>
+                      <a:r>
+                        <a:rPr lang="en-US" dirty="0"/>
+                        <a:t>Cross Lingual SVD Based</a:t>
+                      </a:r>
+                    </a:p>
+                  </a:txBody>
+                  <a:tcPr/>
+                </a:tc>
+                <a:tc>
+                  <a:txBody>
+                    <a:bodyPr/>
+                    <a:lstStyle/>
+                    <a:p>
+                      <a:r>
+                        <a:rPr lang="en-US" dirty="0"/>
+                        <a:t>Design4</a:t>
+                      </a:r>
+                    </a:p>
+                  </a:txBody>
+                  <a:tcPr/>
+                </a:tc>
+                <a:tc>
+                  <a:txBody>
+                    <a:bodyPr/>
+                    <a:lstStyle/>
+                    <a:p>
+                      <a:r>
+                        <a:rPr lang="en-US" dirty="0"/>
+                        <a:t>Cosine Similarity</a:t>
+                      </a:r>
+                    </a:p>
+                  </a:txBody>
+                  <a:tcPr/>
+                </a:tc>
+                <a:tc>
+                  <a:txBody>
+                    <a:bodyPr/>
+                    <a:lstStyle/>
+                    <a:p>
+                      <a:r>
+                        <a:rPr lang="en-US" dirty="0"/>
+                        <a:t>0.15</a:t>
+                      </a:r>
+                    </a:p>
+                  </a:txBody>
+                  <a:tcPr/>
+                </a:tc>
+                <a:tc>
+                  <a:txBody>
+                    <a:bodyPr/>
+                    <a:lstStyle/>
+                    <a:p>
+                      <a:r>
+                        <a:rPr lang="en-US" dirty="0"/>
+                        <a:t>0.07</a:t>
+                      </a:r>
+                    </a:p>
+                  </a:txBody>
+                  <a:tcPr/>
+                </a:tc>
+                <a:tc>
+                  <a:txBody>
+                    <a:bodyPr/>
+                    <a:lstStyle/>
+                    <a:p>
+                      <a:r>
+                        <a:rPr lang="en-US" dirty="0"/>
+                        <a:t>0.08</a:t>
+                      </a:r>
+                    </a:p>
+                  </a:txBody>
+                  <a:tcPr/>
+                </a:tc>
+                <a:extLst>
+                  <a:ext uri="{0D108BD9-81ED-4DB2-BD59-A6C34878D82A}">
+                    <a16:rowId xmlns:a16="http://schemas.microsoft.com/office/drawing/2014/main" val="3532613800"/>
+                  </a:ext>
+                </a:extLst>
+              </a:tr>
+            </a:tbl>
+          </a:graphicData>
+        </a:graphic>
+      </p:graphicFrame>
     </p:spTree>
     <p:extLst>
       <p:ext uri="{BB962C8B-B14F-4D97-AF65-F5344CB8AC3E}">
-        <p14:creationId xmlns:p14="http://schemas.microsoft.com/office/powerpoint/2010/main" val="3341428205"/>
+        <p14:creationId xmlns:p14="http://schemas.microsoft.com/office/powerpoint/2010/main" val="3841735592"/>
       </p:ext>
     </p:extLst>
   </p:cSld>
@@ -5747,77 +6123,17 @@
           <a:p>
             <a:r>
               <a:rPr lang="en-US" dirty="0"/>
-              <a:t>Train vs Validation Losses </a:t>
-            </a:r>
-            <a:r>
-              <a:rPr lang="en-US" dirty="0" err="1"/>
-              <a:t>Contd</a:t>
-            </a:r>
-            <a:endParaRPr lang="en-US" dirty="0"/>
-          </a:p>
-        </p:txBody>
-      </p:sp>
-      <p:sp>
-        <p:nvSpPr>
-          <p:cNvPr id="6" name="TextBox 5">
-            <a:extLst>
-              <a:ext uri="{FF2B5EF4-FFF2-40B4-BE49-F238E27FC236}">
-                <a16:creationId xmlns:a16="http://schemas.microsoft.com/office/drawing/2014/main" id="{6ADC8E48-D43E-2E36-EEA3-4B48AACEA53C}"/>
-              </a:ext>
-            </a:extLst>
-          </p:cNvPr>
-          <p:cNvSpPr txBox="1"/>
-          <p:nvPr/>
-        </p:nvSpPr>
-        <p:spPr>
-          <a:xfrm>
-            <a:off x="6387165" y="2690336"/>
-            <a:ext cx="5436973" cy="1477328"/>
-          </a:xfrm>
-          <a:prstGeom prst="rect">
-            <a:avLst/>
-          </a:prstGeom>
-          <a:noFill/>
-        </p:spPr>
-        <p:txBody>
-          <a:bodyPr wrap="square" rtlCol="0">
-            <a:spAutoFit/>
-          </a:bodyPr>
-          <a:lstStyle/>
-          <a:p>
-            <a:r>
-              <a:rPr lang="en-US" dirty="0"/>
-              <a:t>Observation: </a:t>
-            </a:r>
-            <a:r>
-              <a:rPr lang="en-IN" dirty="0">
-                <a:solidFill>
-                  <a:srgbClr val="000000"/>
-                </a:solidFill>
-                <a:latin typeface="Helvetica Neue" panose="02000503000000020004" pitchFamily="2" charset="0"/>
-              </a:rPr>
-              <a:t>It</a:t>
-            </a:r>
-            <a:r>
-              <a:rPr lang="en-IN" b="0" i="0" dirty="0">
-                <a:solidFill>
-                  <a:srgbClr val="000000"/>
-                </a:solidFill>
-                <a:effectLst/>
-                <a:latin typeface="Helvetica Neue" panose="02000503000000020004" pitchFamily="2" charset="0"/>
-              </a:rPr>
-              <a:t> appears that the training loss and validation loss are fluctuating and not decreasing consistently over the 10 epochs. This suggests that the model may not have converged to the optimal solution yet.</a:t>
-            </a:r>
-            <a:endParaRPr lang="en-US" dirty="0"/>
+              <a:t>Train vs Validation Losses</a:t>
+            </a:r>
           </a:p>
         </p:txBody>
       </p:sp>
       <p:pic>
         <p:nvPicPr>
-          <p:cNvPr id="3" name="Picture 2">
-            <a:extLst>
-              <a:ext uri="{FF2B5EF4-FFF2-40B4-BE49-F238E27FC236}">
-                <a16:creationId xmlns:a16="http://schemas.microsoft.com/office/drawing/2014/main" id="{0A4D2522-916D-F47D-DA21-90708775724C}"/>
+          <p:cNvPr id="1026" name="Picture 2">
+            <a:extLst>
+              <a:ext uri="{FF2B5EF4-FFF2-40B4-BE49-F238E27FC236}">
+                <a16:creationId xmlns:a16="http://schemas.microsoft.com/office/drawing/2014/main" id="{1CC13B02-438B-9B56-F004-810DA5E17483}"/>
               </a:ext>
             </a:extLst>
           </p:cNvPr>
@@ -5841,8 +6157,8 @@
         </p:blipFill>
         <p:spPr bwMode="auto">
           <a:xfrm>
-            <a:off x="119449" y="1556173"/>
-            <a:ext cx="5976551" cy="4721060"/>
+            <a:off x="614575" y="1856571"/>
+            <a:ext cx="4264969" cy="3374889"/>
           </a:xfrm>
           <a:prstGeom prst="rect">
             <a:avLst/>
@@ -5859,10 +6175,139 @@
           </a:extLst>
         </p:spPr>
       </p:pic>
+      <p:pic>
+        <p:nvPicPr>
+          <p:cNvPr id="1028" name="Picture 4">
+            <a:extLst>
+              <a:ext uri="{FF2B5EF4-FFF2-40B4-BE49-F238E27FC236}">
+                <a16:creationId xmlns:a16="http://schemas.microsoft.com/office/drawing/2014/main" id="{F9080B4B-CA69-4C3B-8B4D-1317A8E0C79A}"/>
+              </a:ext>
+            </a:extLst>
+          </p:cNvPr>
+          <p:cNvPicPr>
+            <a:picLocks noChangeAspect="1" noChangeArrowheads="1"/>
+          </p:cNvPicPr>
+          <p:nvPr/>
+        </p:nvPicPr>
+        <p:blipFill>
+          <a:blip r:embed="rId3">
+            <a:extLst>
+              <a:ext uri="{28A0092B-C50C-407E-A947-70E740481C1C}">
+                <a14:useLocalDpi xmlns:a14="http://schemas.microsoft.com/office/drawing/2010/main" val="0"/>
+              </a:ext>
+            </a:extLst>
+          </a:blip>
+          <a:srcRect/>
+          <a:stretch>
+            <a:fillRect/>
+          </a:stretch>
+        </p:blipFill>
+        <p:spPr bwMode="auto">
+          <a:xfrm>
+            <a:off x="7111657" y="3287991"/>
+            <a:ext cx="4264969" cy="3452955"/>
+          </a:xfrm>
+          <a:prstGeom prst="rect">
+            <a:avLst/>
+          </a:prstGeom>
+          <a:noFill/>
+          <a:extLst>
+            <a:ext uri="{909E8E84-426E-40DD-AFC4-6F175D3DCCD1}">
+              <a14:hiddenFill xmlns:a14="http://schemas.microsoft.com/office/drawing/2010/main">
+                <a:solidFill>
+                  <a:srgbClr val="FFFFFF"/>
+                </a:solidFill>
+              </a14:hiddenFill>
+            </a:ext>
+          </a:extLst>
+        </p:spPr>
+      </p:pic>
+      <p:pic>
+        <p:nvPicPr>
+          <p:cNvPr id="1030" name="Picture 6">
+            <a:extLst>
+              <a:ext uri="{FF2B5EF4-FFF2-40B4-BE49-F238E27FC236}">
+                <a16:creationId xmlns:a16="http://schemas.microsoft.com/office/drawing/2014/main" id="{4324233F-7DC1-A6C4-788D-35A949FE3488}"/>
+              </a:ext>
+            </a:extLst>
+          </p:cNvPr>
+          <p:cNvPicPr>
+            <a:picLocks noChangeAspect="1" noChangeArrowheads="1"/>
+          </p:cNvPicPr>
+          <p:nvPr/>
+        </p:nvPicPr>
+        <p:blipFill>
+          <a:blip r:embed="rId4">
+            <a:extLst>
+              <a:ext uri="{28A0092B-C50C-407E-A947-70E740481C1C}">
+                <a14:useLocalDpi xmlns:a14="http://schemas.microsoft.com/office/drawing/2010/main" val="0"/>
+              </a:ext>
+            </a:extLst>
+          </a:blip>
+          <a:srcRect/>
+          <a:stretch>
+            <a:fillRect/>
+          </a:stretch>
+        </p:blipFill>
+        <p:spPr bwMode="auto">
+          <a:xfrm>
+            <a:off x="7111658" y="340614"/>
+            <a:ext cx="4079790" cy="2829869"/>
+          </a:xfrm>
+          <a:prstGeom prst="rect">
+            <a:avLst/>
+          </a:prstGeom>
+          <a:noFill/>
+          <a:extLst>
+            <a:ext uri="{909E8E84-426E-40DD-AFC4-6F175D3DCCD1}">
+              <a14:hiddenFill xmlns:a14="http://schemas.microsoft.com/office/drawing/2010/main">
+                <a:solidFill>
+                  <a:srgbClr val="FFFFFF"/>
+                </a:solidFill>
+              </a14:hiddenFill>
+            </a:ext>
+          </a:extLst>
+        </p:spPr>
+      </p:pic>
+      <p:sp>
+        <p:nvSpPr>
+          <p:cNvPr id="6" name="TextBox 5">
+            <a:extLst>
+              <a:ext uri="{FF2B5EF4-FFF2-40B4-BE49-F238E27FC236}">
+                <a16:creationId xmlns:a16="http://schemas.microsoft.com/office/drawing/2014/main" id="{6ADC8E48-D43E-2E36-EEA3-4B48AACEA53C}"/>
+              </a:ext>
+            </a:extLst>
+          </p:cNvPr>
+          <p:cNvSpPr txBox="1"/>
+          <p:nvPr/>
+        </p:nvSpPr>
+        <p:spPr>
+          <a:xfrm>
+            <a:off x="1161535" y="5659395"/>
+            <a:ext cx="5436973" cy="923330"/>
+          </a:xfrm>
+          <a:prstGeom prst="rect">
+            <a:avLst/>
+          </a:prstGeom>
+          <a:noFill/>
+        </p:spPr>
+        <p:txBody>
+          <a:bodyPr wrap="square" rtlCol="0">
+            <a:spAutoFit/>
+          </a:bodyPr>
+          <a:lstStyle/>
+          <a:p>
+            <a:r>
+              <a:rPr lang="en-US" dirty="0"/>
+              <a:t>Observation: Neural networks are overfitting due to less data as training data is only 5749 sentence pairs with vocab size of 8306</a:t>
+            </a:r>
+          </a:p>
+        </p:txBody>
+      </p:sp>
     </p:spTree>
     <p:extLst>
       <p:ext uri="{BB962C8B-B14F-4D97-AF65-F5344CB8AC3E}">
-        <p14:creationId xmlns:p14="http://schemas.microsoft.com/office/powerpoint/2010/main" val="3756476364"/>
+        <p14:creationId xmlns:p14="http://schemas.microsoft.com/office/powerpoint/2010/main" val="3341428205"/>
       </p:ext>
     </p:extLst>
   </p:cSld>
@@ -5889,200 +6334,12 @@
           <a:chExt cx="0" cy="0"/>
         </a:xfrm>
       </p:grpSpPr>
-      <p:sp useBgFill="1">
-        <p:nvSpPr>
-          <p:cNvPr id="2064" name="Rectangle 2063">
-            <a:extLst>
-              <a:ext uri="{FF2B5EF4-FFF2-40B4-BE49-F238E27FC236}">
-                <a16:creationId xmlns:a16="http://schemas.microsoft.com/office/drawing/2014/main" id="{579E3846-8D0B-B14A-817A-7FAC9DDAB4D8}"/>
-              </a:ext>
-              <a:ext uri="{C183D7F6-B498-43B3-948B-1728B52AA6E4}">
-                <adec:decorative xmlns:adec="http://schemas.microsoft.com/office/drawing/2017/decorative" val="1"/>
-              </a:ext>
-            </a:extLst>
-          </p:cNvPr>
-          <p:cNvSpPr>
-            <a:spLocks noGrp="1" noRot="1" noChangeAspect="1" noMove="1" noResize="1" noEditPoints="1" noAdjustHandles="1" noChangeArrowheads="1" noChangeShapeType="1" noTextEdit="1"/>
-          </p:cNvSpPr>
-          <p:nvPr>
-            <p:extLst>
-              <p:ext uri="{386F3935-93C4-4BCD-93E2-E3B085C9AB24}">
-                <p16:designElem xmlns:p16="http://schemas.microsoft.com/office/powerpoint/2015/main" val="1"/>
-              </p:ext>
-            </p:extLst>
-          </p:nvPr>
-        </p:nvSpPr>
-        <p:spPr>
-          <a:xfrm>
-            <a:off x="0" y="0"/>
-            <a:ext cx="12192000" cy="6858000"/>
-          </a:xfrm>
-          <a:prstGeom prst="rect">
-            <a:avLst/>
-          </a:prstGeom>
-          <a:ln>
-            <a:noFill/>
-          </a:ln>
-        </p:spPr>
-        <p:style>
-          <a:lnRef idx="2">
-            <a:schemeClr val="accent1">
-              <a:shade val="50000"/>
-            </a:schemeClr>
-          </a:lnRef>
-          <a:fillRef idx="1">
-            <a:schemeClr val="accent1"/>
-          </a:fillRef>
-          <a:effectRef idx="0">
-            <a:schemeClr val="accent1"/>
-          </a:effectRef>
-          <a:fontRef idx="minor">
-            <a:schemeClr val="lt1"/>
-          </a:fontRef>
-        </p:style>
-        <p:txBody>
-          <a:bodyPr rtlCol="0" anchor="ctr"/>
-          <a:lstStyle/>
-          <a:p>
-            <a:pPr algn="ctr"/>
-            <a:endParaRPr lang="en-US"/>
-          </a:p>
-        </p:txBody>
-      </p:sp>
-      <p:sp>
-        <p:nvSpPr>
-          <p:cNvPr id="2066" name="Cross 2065">
-            <a:extLst>
-              <a:ext uri="{FF2B5EF4-FFF2-40B4-BE49-F238E27FC236}">
-                <a16:creationId xmlns:a16="http://schemas.microsoft.com/office/drawing/2014/main" id="{BE50E7BE-734F-224D-B03E-074DE1D12480}"/>
-              </a:ext>
-              <a:ext uri="{C183D7F6-B498-43B3-948B-1728B52AA6E4}">
-                <adec:decorative xmlns:adec="http://schemas.microsoft.com/office/drawing/2017/decorative" val="1"/>
-              </a:ext>
-            </a:extLst>
-          </p:cNvPr>
-          <p:cNvSpPr>
-            <a:spLocks noGrp="1" noRot="1" noChangeAspect="1" noMove="1" noResize="1" noEditPoints="1" noAdjustHandles="1" noChangeArrowheads="1" noChangeShapeType="1" noTextEdit="1"/>
-          </p:cNvSpPr>
-          <p:nvPr>
-            <p:extLst>
-              <p:ext uri="{386F3935-93C4-4BCD-93E2-E3B085C9AB24}">
-                <p16:designElem xmlns:p16="http://schemas.microsoft.com/office/powerpoint/2015/main" val="1"/>
-              </p:ext>
-            </p:extLst>
-          </p:nvPr>
-        </p:nvSpPr>
-        <p:spPr>
-          <a:xfrm>
-            <a:off x="11217667" y="5618903"/>
-            <a:ext cx="524933" cy="524933"/>
-          </a:xfrm>
-          <a:prstGeom prst="plus">
-            <a:avLst>
-              <a:gd name="adj" fmla="val 39516"/>
-            </a:avLst>
-          </a:prstGeom>
-          <a:solidFill>
-            <a:schemeClr val="tx1"/>
-          </a:solidFill>
-          <a:ln>
-            <a:noFill/>
-          </a:ln>
-        </p:spPr>
-        <p:style>
-          <a:lnRef idx="2">
-            <a:schemeClr val="accent1">
-              <a:shade val="50000"/>
-            </a:schemeClr>
-          </a:lnRef>
-          <a:fillRef idx="1">
-            <a:schemeClr val="accent1"/>
-          </a:fillRef>
-          <a:effectRef idx="0">
-            <a:schemeClr val="accent1"/>
-          </a:effectRef>
-          <a:fontRef idx="minor">
-            <a:schemeClr val="lt1"/>
-          </a:fontRef>
-        </p:style>
-        <p:txBody>
-          <a:bodyPr rtlCol="0" anchor="ctr"/>
-          <a:lstStyle/>
-          <a:p>
-            <a:pPr algn="ctr"/>
-            <a:endParaRPr lang="en-US"/>
-          </a:p>
-        </p:txBody>
-      </p:sp>
-      <p:sp>
-        <p:nvSpPr>
-          <p:cNvPr id="2068" name="Rectangle 2067">
-            <a:extLst>
-              <a:ext uri="{FF2B5EF4-FFF2-40B4-BE49-F238E27FC236}">
-                <a16:creationId xmlns:a16="http://schemas.microsoft.com/office/drawing/2014/main" id="{DCA5172B-100A-154D-8648-280629D67DD0}"/>
-              </a:ext>
-              <a:ext uri="{C183D7F6-B498-43B3-948B-1728B52AA6E4}">
-                <adec:decorative xmlns:adec="http://schemas.microsoft.com/office/drawing/2017/decorative" val="1"/>
-              </a:ext>
-            </a:extLst>
-          </p:cNvPr>
-          <p:cNvSpPr>
-            <a:spLocks noGrp="1" noRot="1" noChangeAspect="1" noMove="1" noResize="1" noEditPoints="1" noAdjustHandles="1" noChangeArrowheads="1" noChangeShapeType="1" noTextEdit="1"/>
-          </p:cNvSpPr>
-          <p:nvPr>
-            <p:extLst>
-              <p:ext uri="{386F3935-93C4-4BCD-93E2-E3B085C9AB24}">
-                <p16:designElem xmlns:p16="http://schemas.microsoft.com/office/powerpoint/2015/main" val="1"/>
-              </p:ext>
-            </p:extLst>
-          </p:nvPr>
-        </p:nvSpPr>
-        <p:spPr>
-          <a:xfrm>
-            <a:off x="9881559" y="976630"/>
-            <a:ext cx="1336774" cy="120142"/>
-          </a:xfrm>
-          <a:prstGeom prst="rect">
-            <a:avLst/>
-          </a:prstGeom>
-          <a:solidFill>
-            <a:schemeClr val="tx1"/>
-          </a:solidFill>
-          <a:ln>
-            <a:noFill/>
-          </a:ln>
-        </p:spPr>
-        <p:style>
-          <a:lnRef idx="2">
-            <a:schemeClr val="accent1">
-              <a:shade val="50000"/>
-            </a:schemeClr>
-          </a:lnRef>
-          <a:fillRef idx="1">
-            <a:schemeClr val="accent1"/>
-          </a:fillRef>
-          <a:effectRef idx="0">
-            <a:schemeClr val="accent1"/>
-          </a:effectRef>
-          <a:fontRef idx="minor">
-            <a:schemeClr val="lt1"/>
-          </a:fontRef>
-        </p:style>
-        <p:txBody>
-          <a:bodyPr rtlCol="0" anchor="ctr"/>
-          <a:lstStyle/>
-          <a:p>
-            <a:pPr algn="ctr"/>
-            <a:endParaRPr lang="en-US"/>
-          </a:p>
-        </p:txBody>
-      </p:sp>
       <p:sp>
         <p:nvSpPr>
           <p:cNvPr id="2" name="Title 1">
             <a:extLst>
               <a:ext uri="{FF2B5EF4-FFF2-40B4-BE49-F238E27FC236}">
-                <a16:creationId xmlns:a16="http://schemas.microsoft.com/office/drawing/2014/main" id="{79DD15C5-7B05-FF00-0DBD-F18D697B2F2D}"/>
+                <a16:creationId xmlns:a16="http://schemas.microsoft.com/office/drawing/2014/main" id="{98CB23D4-9B76-90AF-6EAD-4A11A6909925}"/>
               </a:ext>
             </a:extLst>
           </p:cNvPr>
@@ -6095,103 +6352,87 @@
         </p:nvSpPr>
         <p:spPr>
           <a:xfrm>
-            <a:off x="565149" y="1204721"/>
-            <a:ext cx="4114799" cy="1446550"/>
-          </a:xfrm>
-        </p:spPr>
-        <p:txBody>
-          <a:bodyPr>
-            <a:normAutofit/>
+            <a:off x="318013" y="376818"/>
+            <a:ext cx="11420906" cy="908285"/>
+          </a:xfrm>
+        </p:spPr>
+        <p:txBody>
+          <a:bodyPr/>
+          <a:lstStyle/>
+          <a:p>
+            <a:r>
+              <a:rPr lang="en-US" dirty="0"/>
+              <a:t>Train vs Validation Losses </a:t>
+            </a:r>
+            <a:r>
+              <a:rPr lang="en-US" dirty="0" err="1"/>
+              <a:t>Contd</a:t>
+            </a:r>
+            <a:endParaRPr lang="en-US" dirty="0"/>
+          </a:p>
+        </p:txBody>
+      </p:sp>
+      <p:sp>
+        <p:nvSpPr>
+          <p:cNvPr id="6" name="TextBox 5">
+            <a:extLst>
+              <a:ext uri="{FF2B5EF4-FFF2-40B4-BE49-F238E27FC236}">
+                <a16:creationId xmlns:a16="http://schemas.microsoft.com/office/drawing/2014/main" id="{6ADC8E48-D43E-2E36-EEA3-4B48AACEA53C}"/>
+              </a:ext>
+            </a:extLst>
+          </p:cNvPr>
+          <p:cNvSpPr txBox="1"/>
+          <p:nvPr/>
+        </p:nvSpPr>
+        <p:spPr>
+          <a:xfrm>
+            <a:off x="6387165" y="2690336"/>
+            <a:ext cx="5436973" cy="1477328"/>
+          </a:xfrm>
+          <a:prstGeom prst="rect">
+            <a:avLst/>
+          </a:prstGeom>
+          <a:noFill/>
+        </p:spPr>
+        <p:txBody>
+          <a:bodyPr wrap="square" rtlCol="0">
+            <a:spAutoFit/>
           </a:bodyPr>
           <a:lstStyle/>
           <a:p>
             <a:r>
-              <a:rPr lang="en-US" dirty="0" err="1"/>
-              <a:t>Explainability</a:t>
+              <a:rPr lang="en-US" dirty="0"/>
+              <a:t>Observation: </a:t>
+            </a:r>
+            <a:r>
+              <a:rPr lang="en-IN" dirty="0">
+                <a:solidFill>
+                  <a:srgbClr val="000000"/>
+                </a:solidFill>
+                <a:latin typeface="Helvetica Neue" panose="02000503000000020004" pitchFamily="2" charset="0"/>
+              </a:rPr>
+              <a:t>It</a:t>
+            </a:r>
+            <a:r>
+              <a:rPr lang="en-IN" b="0" i="0" dirty="0">
+                <a:solidFill>
+                  <a:srgbClr val="000000"/>
+                </a:solidFill>
+                <a:effectLst/>
+                <a:latin typeface="Helvetica Neue" panose="02000503000000020004" pitchFamily="2" charset="0"/>
+              </a:rPr>
+              <a:t> appears that the training loss and validation loss are fluctuating and not decreasing consistently over the 10 epochs. This suggests that the model may not have converged to the optimal solution yet.</a:t>
             </a:r>
             <a:endParaRPr lang="en-US" dirty="0"/>
-          </a:p>
-        </p:txBody>
-      </p:sp>
-      <p:sp>
-        <p:nvSpPr>
-          <p:cNvPr id="3" name="Content Placeholder 2">
-            <a:extLst>
-              <a:ext uri="{FF2B5EF4-FFF2-40B4-BE49-F238E27FC236}">
-                <a16:creationId xmlns:a16="http://schemas.microsoft.com/office/drawing/2014/main" id="{EC9AD255-F366-57ED-6104-BF6494E1EBB3}"/>
-              </a:ext>
-            </a:extLst>
-          </p:cNvPr>
-          <p:cNvSpPr>
-            <a:spLocks noGrp="1"/>
-          </p:cNvSpPr>
-          <p:nvPr>
-            <p:ph idx="1"/>
-          </p:nvPr>
-        </p:nvSpPr>
-        <p:spPr>
-          <a:xfrm>
-            <a:off x="565148" y="2166121"/>
-            <a:ext cx="4114799" cy="3188586"/>
-          </a:xfrm>
-        </p:spPr>
-        <p:txBody>
-          <a:bodyPr>
-            <a:normAutofit/>
-          </a:bodyPr>
-          <a:lstStyle/>
-          <a:p>
-            <a:pPr marL="0" indent="0">
-              <a:lnSpc>
-                <a:spcPct val="90000"/>
-              </a:lnSpc>
-              <a:buNone/>
-            </a:pPr>
-            <a:r>
-              <a:rPr lang="en-US" sz="1700" dirty="0"/>
-              <a:t>As per RAI guidelines, all ML models needs to be explainable.</a:t>
-            </a:r>
-          </a:p>
-          <a:p>
-            <a:pPr marL="0" indent="0">
-              <a:lnSpc>
-                <a:spcPct val="90000"/>
-              </a:lnSpc>
-              <a:buNone/>
-            </a:pPr>
-            <a:r>
-              <a:rPr lang="en-US" sz="1700" dirty="0"/>
-              <a:t>But neural networks are less interpretable hence we need to use black box based explanation frameworks like SHAP to understand which words are playing how much contribution in the similarity score generation.</a:t>
-            </a:r>
-          </a:p>
-          <a:p>
-            <a:pPr marL="0" indent="0">
-              <a:lnSpc>
-                <a:spcPct val="90000"/>
-              </a:lnSpc>
-              <a:buNone/>
-            </a:pPr>
-            <a:r>
-              <a:rPr lang="en-US" sz="1700" dirty="0"/>
-              <a:t>Along with </a:t>
-            </a:r>
-            <a:r>
-              <a:rPr lang="en-US" sz="1700" dirty="0" err="1"/>
-              <a:t>explainability</a:t>
-            </a:r>
-            <a:r>
-              <a:rPr lang="en-US" sz="1700" dirty="0"/>
-              <a:t> to end users this analysis would also be really helpful in debugging the model as post-hoc analysis</a:t>
-            </a:r>
           </a:p>
         </p:txBody>
       </p:sp>
       <p:pic>
         <p:nvPicPr>
-          <p:cNvPr id="2050" name="Picture 2" descr="Chart&#10;&#10;Description automatically generated">
-            <a:extLst>
-              <a:ext uri="{FF2B5EF4-FFF2-40B4-BE49-F238E27FC236}">
-                <a16:creationId xmlns:a16="http://schemas.microsoft.com/office/drawing/2014/main" id="{BD08A3EE-0DD1-2062-9F5B-8CDF98A92D5B}"/>
+          <p:cNvPr id="3" name="Picture 2">
+            <a:extLst>
+              <a:ext uri="{FF2B5EF4-FFF2-40B4-BE49-F238E27FC236}">
+                <a16:creationId xmlns:a16="http://schemas.microsoft.com/office/drawing/2014/main" id="{0A4D2522-916D-F47D-DA21-90708775724C}"/>
               </a:ext>
             </a:extLst>
           </p:cNvPr>
@@ -6208,14 +6449,15 @@
               </a:ext>
             </a:extLst>
           </a:blip>
+          <a:srcRect/>
           <a:stretch>
             <a:fillRect/>
           </a:stretch>
         </p:blipFill>
         <p:spPr bwMode="auto">
           <a:xfrm>
-            <a:off x="5486709" y="1912993"/>
-            <a:ext cx="5731624" cy="3295683"/>
+            <a:off x="119449" y="1556173"/>
+            <a:ext cx="5976551" cy="4721060"/>
           </a:xfrm>
           <a:prstGeom prst="rect">
             <a:avLst/>
@@ -6232,98 +6474,10 @@
           </a:extLst>
         </p:spPr>
       </p:pic>
-      <p:sp>
-        <p:nvSpPr>
-          <p:cNvPr id="5" name="TextBox 4">
-            <a:extLst>
-              <a:ext uri="{FF2B5EF4-FFF2-40B4-BE49-F238E27FC236}">
-                <a16:creationId xmlns:a16="http://schemas.microsoft.com/office/drawing/2014/main" id="{60AD3083-8EED-7338-DCF9-DF3603149CB1}"/>
-              </a:ext>
-            </a:extLst>
-          </p:cNvPr>
-          <p:cNvSpPr txBox="1"/>
-          <p:nvPr/>
-        </p:nvSpPr>
-        <p:spPr>
-          <a:xfrm>
-            <a:off x="4950373" y="5208676"/>
-            <a:ext cx="2680137" cy="923330"/>
-          </a:xfrm>
-          <a:prstGeom prst="rect">
-            <a:avLst/>
-          </a:prstGeom>
-          <a:noFill/>
-        </p:spPr>
-        <p:txBody>
-          <a:bodyPr wrap="square" rtlCol="0">
-            <a:spAutoFit/>
-          </a:bodyPr>
-          <a:lstStyle/>
-          <a:p>
-            <a:r>
-              <a:rPr lang="en-US" dirty="0"/>
-              <a:t>Input:</a:t>
-            </a:r>
-          </a:p>
-          <a:p>
-            <a:r>
-              <a:rPr lang="en-US" dirty="0"/>
-              <a:t>Sent1: “He hates apples”</a:t>
-            </a:r>
-          </a:p>
-          <a:p>
-            <a:r>
-              <a:rPr lang="en-US" dirty="0"/>
-              <a:t>Sent2: “He likes applies”</a:t>
-            </a:r>
-          </a:p>
-        </p:txBody>
-      </p:sp>
-      <p:sp>
-        <p:nvSpPr>
-          <p:cNvPr id="6" name="TextBox 5">
-            <a:extLst>
-              <a:ext uri="{FF2B5EF4-FFF2-40B4-BE49-F238E27FC236}">
-                <a16:creationId xmlns:a16="http://schemas.microsoft.com/office/drawing/2014/main" id="{1B680FC4-3FF0-2EA2-824F-B43B0B212671}"/>
-              </a:ext>
-            </a:extLst>
-          </p:cNvPr>
-          <p:cNvSpPr txBox="1"/>
-          <p:nvPr/>
-        </p:nvSpPr>
-        <p:spPr>
-          <a:xfrm>
-            <a:off x="7762614" y="5088709"/>
-            <a:ext cx="3941074" cy="1754326"/>
-          </a:xfrm>
-          <a:prstGeom prst="rect">
-            <a:avLst/>
-          </a:prstGeom>
-          <a:noFill/>
-        </p:spPr>
-        <p:txBody>
-          <a:bodyPr wrap="square" rtlCol="0">
-            <a:spAutoFit/>
-          </a:bodyPr>
-          <a:lstStyle/>
-          <a:p>
-            <a:r>
-              <a:rPr lang="en-US" dirty="0"/>
-              <a:t>Interpretation:</a:t>
-            </a:r>
-          </a:p>
-          <a:p>
-            <a:r>
-              <a:rPr lang="en-US" dirty="0"/>
-              <a:t>The words “hates” and “likes” are negatively contributing to the similarity score and ”apples” is positively contributing. Which is obvious.</a:t>
-            </a:r>
-          </a:p>
-        </p:txBody>
-      </p:sp>
     </p:spTree>
     <p:extLst>
       <p:ext uri="{BB962C8B-B14F-4D97-AF65-F5344CB8AC3E}">
-        <p14:creationId xmlns:p14="http://schemas.microsoft.com/office/powerpoint/2010/main" val="3309442883"/>
+        <p14:creationId xmlns:p14="http://schemas.microsoft.com/office/powerpoint/2010/main" val="3756476364"/>
       </p:ext>
     </p:extLst>
   </p:cSld>
@@ -6350,12 +6504,200 @@
           <a:chExt cx="0" cy="0"/>
         </a:xfrm>
       </p:grpSpPr>
+      <p:sp useBgFill="1">
+        <p:nvSpPr>
+          <p:cNvPr id="2064" name="Rectangle 2063">
+            <a:extLst>
+              <a:ext uri="{FF2B5EF4-FFF2-40B4-BE49-F238E27FC236}">
+                <a16:creationId xmlns:a16="http://schemas.microsoft.com/office/drawing/2014/main" id="{579E3846-8D0B-B14A-817A-7FAC9DDAB4D8}"/>
+              </a:ext>
+              <a:ext uri="{C183D7F6-B498-43B3-948B-1728B52AA6E4}">
+                <adec:decorative xmlns:adec="http://schemas.microsoft.com/office/drawing/2017/decorative" val="1"/>
+              </a:ext>
+            </a:extLst>
+          </p:cNvPr>
+          <p:cNvSpPr>
+            <a:spLocks noGrp="1" noRot="1" noChangeAspect="1" noMove="1" noResize="1" noEditPoints="1" noAdjustHandles="1" noChangeArrowheads="1" noChangeShapeType="1" noTextEdit="1"/>
+          </p:cNvSpPr>
+          <p:nvPr>
+            <p:extLst>
+              <p:ext uri="{386F3935-93C4-4BCD-93E2-E3B085C9AB24}">
+                <p16:designElem xmlns:p16="http://schemas.microsoft.com/office/powerpoint/2015/main" val="1"/>
+              </p:ext>
+            </p:extLst>
+          </p:nvPr>
+        </p:nvSpPr>
+        <p:spPr>
+          <a:xfrm>
+            <a:off x="0" y="0"/>
+            <a:ext cx="12192000" cy="6858000"/>
+          </a:xfrm>
+          <a:prstGeom prst="rect">
+            <a:avLst/>
+          </a:prstGeom>
+          <a:ln>
+            <a:noFill/>
+          </a:ln>
+        </p:spPr>
+        <p:style>
+          <a:lnRef idx="2">
+            <a:schemeClr val="accent1">
+              <a:shade val="50000"/>
+            </a:schemeClr>
+          </a:lnRef>
+          <a:fillRef idx="1">
+            <a:schemeClr val="accent1"/>
+          </a:fillRef>
+          <a:effectRef idx="0">
+            <a:schemeClr val="accent1"/>
+          </a:effectRef>
+          <a:fontRef idx="minor">
+            <a:schemeClr val="lt1"/>
+          </a:fontRef>
+        </p:style>
+        <p:txBody>
+          <a:bodyPr rtlCol="0" anchor="ctr"/>
+          <a:lstStyle/>
+          <a:p>
+            <a:pPr algn="ctr"/>
+            <a:endParaRPr lang="en-US"/>
+          </a:p>
+        </p:txBody>
+      </p:sp>
+      <p:sp>
+        <p:nvSpPr>
+          <p:cNvPr id="2066" name="Cross 2065">
+            <a:extLst>
+              <a:ext uri="{FF2B5EF4-FFF2-40B4-BE49-F238E27FC236}">
+                <a16:creationId xmlns:a16="http://schemas.microsoft.com/office/drawing/2014/main" id="{BE50E7BE-734F-224D-B03E-074DE1D12480}"/>
+              </a:ext>
+              <a:ext uri="{C183D7F6-B498-43B3-948B-1728B52AA6E4}">
+                <adec:decorative xmlns:adec="http://schemas.microsoft.com/office/drawing/2017/decorative" val="1"/>
+              </a:ext>
+            </a:extLst>
+          </p:cNvPr>
+          <p:cNvSpPr>
+            <a:spLocks noGrp="1" noRot="1" noChangeAspect="1" noMove="1" noResize="1" noEditPoints="1" noAdjustHandles="1" noChangeArrowheads="1" noChangeShapeType="1" noTextEdit="1"/>
+          </p:cNvSpPr>
+          <p:nvPr>
+            <p:extLst>
+              <p:ext uri="{386F3935-93C4-4BCD-93E2-E3B085C9AB24}">
+                <p16:designElem xmlns:p16="http://schemas.microsoft.com/office/powerpoint/2015/main" val="1"/>
+              </p:ext>
+            </p:extLst>
+          </p:nvPr>
+        </p:nvSpPr>
+        <p:spPr>
+          <a:xfrm>
+            <a:off x="11217667" y="5618903"/>
+            <a:ext cx="524933" cy="524933"/>
+          </a:xfrm>
+          <a:prstGeom prst="plus">
+            <a:avLst>
+              <a:gd name="adj" fmla="val 39516"/>
+            </a:avLst>
+          </a:prstGeom>
+          <a:solidFill>
+            <a:schemeClr val="tx1"/>
+          </a:solidFill>
+          <a:ln>
+            <a:noFill/>
+          </a:ln>
+        </p:spPr>
+        <p:style>
+          <a:lnRef idx="2">
+            <a:schemeClr val="accent1">
+              <a:shade val="50000"/>
+            </a:schemeClr>
+          </a:lnRef>
+          <a:fillRef idx="1">
+            <a:schemeClr val="accent1"/>
+          </a:fillRef>
+          <a:effectRef idx="0">
+            <a:schemeClr val="accent1"/>
+          </a:effectRef>
+          <a:fontRef idx="minor">
+            <a:schemeClr val="lt1"/>
+          </a:fontRef>
+        </p:style>
+        <p:txBody>
+          <a:bodyPr rtlCol="0" anchor="ctr"/>
+          <a:lstStyle/>
+          <a:p>
+            <a:pPr algn="ctr"/>
+            <a:endParaRPr lang="en-US"/>
+          </a:p>
+        </p:txBody>
+      </p:sp>
+      <p:sp>
+        <p:nvSpPr>
+          <p:cNvPr id="2068" name="Rectangle 2067">
+            <a:extLst>
+              <a:ext uri="{FF2B5EF4-FFF2-40B4-BE49-F238E27FC236}">
+                <a16:creationId xmlns:a16="http://schemas.microsoft.com/office/drawing/2014/main" id="{DCA5172B-100A-154D-8648-280629D67DD0}"/>
+              </a:ext>
+              <a:ext uri="{C183D7F6-B498-43B3-948B-1728B52AA6E4}">
+                <adec:decorative xmlns:adec="http://schemas.microsoft.com/office/drawing/2017/decorative" val="1"/>
+              </a:ext>
+            </a:extLst>
+          </p:cNvPr>
+          <p:cNvSpPr>
+            <a:spLocks noGrp="1" noRot="1" noChangeAspect="1" noMove="1" noResize="1" noEditPoints="1" noAdjustHandles="1" noChangeArrowheads="1" noChangeShapeType="1" noTextEdit="1"/>
+          </p:cNvSpPr>
+          <p:nvPr>
+            <p:extLst>
+              <p:ext uri="{386F3935-93C4-4BCD-93E2-E3B085C9AB24}">
+                <p16:designElem xmlns:p16="http://schemas.microsoft.com/office/powerpoint/2015/main" val="1"/>
+              </p:ext>
+            </p:extLst>
+          </p:nvPr>
+        </p:nvSpPr>
+        <p:spPr>
+          <a:xfrm>
+            <a:off x="9881559" y="976630"/>
+            <a:ext cx="1336774" cy="120142"/>
+          </a:xfrm>
+          <a:prstGeom prst="rect">
+            <a:avLst/>
+          </a:prstGeom>
+          <a:solidFill>
+            <a:schemeClr val="tx1"/>
+          </a:solidFill>
+          <a:ln>
+            <a:noFill/>
+          </a:ln>
+        </p:spPr>
+        <p:style>
+          <a:lnRef idx="2">
+            <a:schemeClr val="accent1">
+              <a:shade val="50000"/>
+            </a:schemeClr>
+          </a:lnRef>
+          <a:fillRef idx="1">
+            <a:schemeClr val="accent1"/>
+          </a:fillRef>
+          <a:effectRef idx="0">
+            <a:schemeClr val="accent1"/>
+          </a:effectRef>
+          <a:fontRef idx="minor">
+            <a:schemeClr val="lt1"/>
+          </a:fontRef>
+        </p:style>
+        <p:txBody>
+          <a:bodyPr rtlCol="0" anchor="ctr"/>
+          <a:lstStyle/>
+          <a:p>
+            <a:pPr algn="ctr"/>
+            <a:endParaRPr lang="en-US"/>
+          </a:p>
+        </p:txBody>
+      </p:sp>
       <p:sp>
         <p:nvSpPr>
           <p:cNvPr id="2" name="Title 1">
             <a:extLst>
               <a:ext uri="{FF2B5EF4-FFF2-40B4-BE49-F238E27FC236}">
-                <a16:creationId xmlns:a16="http://schemas.microsoft.com/office/drawing/2014/main" id="{4D689CBE-5B2F-19BB-7BF6-B8629BABDAED}"/>
+                <a16:creationId xmlns:a16="http://schemas.microsoft.com/office/drawing/2014/main" id="{79DD15C5-7B05-FF00-0DBD-F18D697B2F2D}"/>
               </a:ext>
             </a:extLst>
           </p:cNvPr>
@@ -6368,18 +6710,21 @@
         </p:nvSpPr>
         <p:spPr>
           <a:xfrm>
-            <a:off x="466295" y="389175"/>
-            <a:ext cx="8267296" cy="1446550"/>
-          </a:xfrm>
-        </p:spPr>
-        <p:txBody>
-          <a:bodyPr/>
-          <a:lstStyle/>
-          <a:p>
-            <a:r>
-              <a:rPr lang="en-US" dirty="0"/>
-              <a:t>Extensibility</a:t>
-            </a:r>
+            <a:off x="565149" y="1204721"/>
+            <a:ext cx="4114799" cy="1446550"/>
+          </a:xfrm>
+        </p:spPr>
+        <p:txBody>
+          <a:bodyPr>
+            <a:normAutofit/>
+          </a:bodyPr>
+          <a:lstStyle/>
+          <a:p>
+            <a:r>
+              <a:rPr lang="en-US" dirty="0" err="1"/>
+              <a:t>Explainability</a:t>
+            </a:r>
+            <a:endParaRPr lang="en-US" dirty="0"/>
           </a:p>
         </p:txBody>
       </p:sp>
@@ -6388,7 +6733,7 @@
           <p:cNvPr id="3" name="Content Placeholder 2">
             <a:extLst>
               <a:ext uri="{FF2B5EF4-FFF2-40B4-BE49-F238E27FC236}">
-                <a16:creationId xmlns:a16="http://schemas.microsoft.com/office/drawing/2014/main" id="{A81BD03E-2FF5-7B14-621E-D6D207B2615A}"/>
+                <a16:creationId xmlns:a16="http://schemas.microsoft.com/office/drawing/2014/main" id="{EC9AD255-F366-57ED-6104-BF6494E1EBB3}"/>
               </a:ext>
             </a:extLst>
           </p:cNvPr>
@@ -6401,62 +6746,191 @@
         </p:nvSpPr>
         <p:spPr>
           <a:xfrm>
-            <a:off x="466294" y="1493033"/>
-            <a:ext cx="11420905" cy="3188586"/>
+            <a:off x="565148" y="2166121"/>
+            <a:ext cx="4114799" cy="3188586"/>
           </a:xfrm>
         </p:spPr>
         <p:txBody>
           <a:bodyPr>
-            <a:normAutofit fontScale="92500"/>
+            <a:normAutofit/>
           </a:bodyPr>
           <a:lstStyle/>
           <a:p>
-            <a:pPr>
-              <a:buFont typeface="Arial" panose="020B0604020202020204" pitchFamily="34" charset="0"/>
-              <a:buChar char="•"/>
+            <a:pPr marL="0" indent="0">
+              <a:lnSpc>
+                <a:spcPct val="90000"/>
+              </a:lnSpc>
+              <a:buNone/>
             </a:pPr>
             <a:r>
+              <a:rPr lang="en-US" sz="1700" dirty="0"/>
+              <a:t>As per RAI guidelines, all ML models needs to be explainable.</a:t>
+            </a:r>
+          </a:p>
+          <a:p>
+            <a:pPr marL="0" indent="0">
+              <a:lnSpc>
+                <a:spcPct val="90000"/>
+              </a:lnSpc>
+              <a:buNone/>
+            </a:pPr>
+            <a:r>
+              <a:rPr lang="en-US" sz="1700" dirty="0"/>
+              <a:t>But neural networks are less interpretable hence we need to use black box based explanation frameworks like SHAP to understand which words are playing how much contribution in the similarity score generation.</a:t>
+            </a:r>
+          </a:p>
+          <a:p>
+            <a:pPr marL="0" indent="0">
+              <a:lnSpc>
+                <a:spcPct val="90000"/>
+              </a:lnSpc>
+              <a:buNone/>
+            </a:pPr>
+            <a:r>
+              <a:rPr lang="en-US" sz="1700" dirty="0"/>
+              <a:t>Along with </a:t>
+            </a:r>
+            <a:r>
+              <a:rPr lang="en-US" sz="1700" dirty="0" err="1"/>
+              <a:t>explainability</a:t>
+            </a:r>
+            <a:r>
+              <a:rPr lang="en-US" sz="1700" dirty="0"/>
+              <a:t> to end users this analysis would also be really helpful in debugging the model as post-hoc analysis</a:t>
+            </a:r>
+          </a:p>
+        </p:txBody>
+      </p:sp>
+      <p:pic>
+        <p:nvPicPr>
+          <p:cNvPr id="2050" name="Picture 2" descr="Chart&#10;&#10;Description automatically generated">
+            <a:extLst>
+              <a:ext uri="{FF2B5EF4-FFF2-40B4-BE49-F238E27FC236}">
+                <a16:creationId xmlns:a16="http://schemas.microsoft.com/office/drawing/2014/main" id="{BD08A3EE-0DD1-2062-9F5B-8CDF98A92D5B}"/>
+              </a:ext>
+            </a:extLst>
+          </p:cNvPr>
+          <p:cNvPicPr>
+            <a:picLocks noChangeAspect="1" noChangeArrowheads="1"/>
+          </p:cNvPicPr>
+          <p:nvPr/>
+        </p:nvPicPr>
+        <p:blipFill>
+          <a:blip r:embed="rId2">
+            <a:extLst>
+              <a:ext uri="{28A0092B-C50C-407E-A947-70E740481C1C}">
+                <a14:useLocalDpi xmlns:a14="http://schemas.microsoft.com/office/drawing/2010/main" val="0"/>
+              </a:ext>
+            </a:extLst>
+          </a:blip>
+          <a:stretch>
+            <a:fillRect/>
+          </a:stretch>
+        </p:blipFill>
+        <p:spPr bwMode="auto">
+          <a:xfrm>
+            <a:off x="5486709" y="1912993"/>
+            <a:ext cx="5731624" cy="3295683"/>
+          </a:xfrm>
+          <a:prstGeom prst="rect">
+            <a:avLst/>
+          </a:prstGeom>
+          <a:noFill/>
+          <a:extLst>
+            <a:ext uri="{909E8E84-426E-40DD-AFC4-6F175D3DCCD1}">
+              <a14:hiddenFill xmlns:a14="http://schemas.microsoft.com/office/drawing/2010/main">
+                <a:solidFill>
+                  <a:srgbClr val="FFFFFF"/>
+                </a:solidFill>
+              </a14:hiddenFill>
+            </a:ext>
+          </a:extLst>
+        </p:spPr>
+      </p:pic>
+      <p:sp>
+        <p:nvSpPr>
+          <p:cNvPr id="5" name="TextBox 4">
+            <a:extLst>
+              <a:ext uri="{FF2B5EF4-FFF2-40B4-BE49-F238E27FC236}">
+                <a16:creationId xmlns:a16="http://schemas.microsoft.com/office/drawing/2014/main" id="{60AD3083-8EED-7338-DCF9-DF3603149CB1}"/>
+              </a:ext>
+            </a:extLst>
+          </p:cNvPr>
+          <p:cNvSpPr txBox="1"/>
+          <p:nvPr/>
+        </p:nvSpPr>
+        <p:spPr>
+          <a:xfrm>
+            <a:off x="4950373" y="5208676"/>
+            <a:ext cx="2680137" cy="923330"/>
+          </a:xfrm>
+          <a:prstGeom prst="rect">
+            <a:avLst/>
+          </a:prstGeom>
+          <a:noFill/>
+        </p:spPr>
+        <p:txBody>
+          <a:bodyPr wrap="square" rtlCol="0">
+            <a:spAutoFit/>
+          </a:bodyPr>
+          <a:lstStyle/>
+          <a:p>
+            <a:r>
               <a:rPr lang="en-US" dirty="0"/>
-              <a:t>Semantic search is a very powerful and fundamental to real world applications like question-answering. </a:t>
-            </a:r>
-            <a:br>
+              <a:t>Input:</a:t>
+            </a:r>
+          </a:p>
+          <a:p>
+            <a:r>
               <a:rPr lang="en-US" dirty="0"/>
-            </a:br>
+              <a:t>Sent1: “He hates apples”</a:t>
+            </a:r>
+          </a:p>
+          <a:p>
             <a:r>
               <a:rPr lang="en-US" dirty="0"/>
-              <a:t>Sent1: “Where is Swaroop going”</a:t>
-            </a:r>
-            <a:br>
+              <a:t>Sent2: “He likes applies”</a:t>
+            </a:r>
+          </a:p>
+        </p:txBody>
+      </p:sp>
+      <p:sp>
+        <p:nvSpPr>
+          <p:cNvPr id="6" name="TextBox 5">
+            <a:extLst>
+              <a:ext uri="{FF2B5EF4-FFF2-40B4-BE49-F238E27FC236}">
+                <a16:creationId xmlns:a16="http://schemas.microsoft.com/office/drawing/2014/main" id="{1B680FC4-3FF0-2EA2-824F-B43B0B212671}"/>
+              </a:ext>
+            </a:extLst>
+          </p:cNvPr>
+          <p:cNvSpPr txBox="1"/>
+          <p:nvPr/>
+        </p:nvSpPr>
+        <p:spPr>
+          <a:xfrm>
+            <a:off x="7762614" y="5088709"/>
+            <a:ext cx="3941074" cy="1754326"/>
+          </a:xfrm>
+          <a:prstGeom prst="rect">
+            <a:avLst/>
+          </a:prstGeom>
+          <a:noFill/>
+        </p:spPr>
+        <p:txBody>
+          <a:bodyPr wrap="square" rtlCol="0">
+            <a:spAutoFit/>
+          </a:bodyPr>
+          <a:lstStyle/>
+          <a:p>
+            <a:r>
               <a:rPr lang="en-US" dirty="0"/>
-            </a:br>
+              <a:t>Interpretation:</a:t>
+            </a:r>
+          </a:p>
+          <a:p>
             <a:r>
               <a:rPr lang="en-US" dirty="0"/>
-              <a:t>Sent2: “Swaroop is going to college”</a:t>
-            </a:r>
-            <a:br>
-              <a:rPr lang="en-US" dirty="0"/>
-            </a:br>
-            <a:r>
-              <a:rPr lang="en-US" dirty="0"/>
-              <a:t>Based on input query and similarity score the most matching sentence to be retrieved</a:t>
-            </a:r>
-          </a:p>
-          <a:p>
-            <a:pPr>
-              <a:buFont typeface="Arial" panose="020B0604020202020204" pitchFamily="34" charset="0"/>
-              <a:buChar char="•"/>
-            </a:pPr>
-            <a:r>
-              <a:rPr lang="en-US" dirty="0"/>
-              <a:t>Existing </a:t>
-            </a:r>
-            <a:r>
-              <a:rPr lang="en-US" dirty="0" err="1"/>
-              <a:t>explainability</a:t>
-            </a:r>
-            <a:r>
-              <a:rPr lang="en-US" dirty="0"/>
-              <a:t> frameworks are not effective in explaining how models works especially LLM and neural network models. More research to be conducted to generate human friendly explanations through counterfactual explanations.</a:t>
+              <a:t>The words “hates” and “likes” are negatively contributing to the similarity score and ”apples” is positively contributing. Which is obvious.</a:t>
             </a:r>
           </a:p>
         </p:txBody>
@@ -6464,7 +6938,7 @@
     </p:spTree>
     <p:extLst>
       <p:ext uri="{BB962C8B-B14F-4D97-AF65-F5344CB8AC3E}">
-        <p14:creationId xmlns:p14="http://schemas.microsoft.com/office/powerpoint/2010/main" val="2762595328"/>
+        <p14:creationId xmlns:p14="http://schemas.microsoft.com/office/powerpoint/2010/main" val="3309442883"/>
       </p:ext>
     </p:extLst>
   </p:cSld>
@@ -6496,7 +6970,7 @@
           <p:cNvPr id="2" name="Title 1">
             <a:extLst>
               <a:ext uri="{FF2B5EF4-FFF2-40B4-BE49-F238E27FC236}">
-                <a16:creationId xmlns:a16="http://schemas.microsoft.com/office/drawing/2014/main" id="{8E1AB827-4E97-BC36-3BAA-5158B9D7AD90}"/>
+                <a16:creationId xmlns:a16="http://schemas.microsoft.com/office/drawing/2014/main" id="{4D689CBE-5B2F-19BB-7BF6-B8629BABDAED}"/>
               </a:ext>
             </a:extLst>
           </p:cNvPr>
@@ -6509,8 +6983,8 @@
         </p:nvSpPr>
         <p:spPr>
           <a:xfrm>
-            <a:off x="416867" y="389175"/>
-            <a:ext cx="11643327" cy="1446550"/>
+            <a:off x="466295" y="389175"/>
+            <a:ext cx="8267296" cy="1446550"/>
           </a:xfrm>
         </p:spPr>
         <p:txBody>
@@ -6519,7 +6993,7 @@
           <a:p>
             <a:r>
               <a:rPr lang="en-US" dirty="0"/>
-              <a:t>Conclusion</a:t>
+              <a:t>Extensibility</a:t>
             </a:r>
           </a:p>
         </p:txBody>
@@ -6529,7 +7003,7 @@
           <p:cNvPr id="3" name="Content Placeholder 2">
             <a:extLst>
               <a:ext uri="{FF2B5EF4-FFF2-40B4-BE49-F238E27FC236}">
-                <a16:creationId xmlns:a16="http://schemas.microsoft.com/office/drawing/2014/main" id="{C07EF299-48C9-FBD0-E7EE-B7E76C90540A}"/>
+                <a16:creationId xmlns:a16="http://schemas.microsoft.com/office/drawing/2014/main" id="{A81BD03E-2FF5-7B14-621E-D6D207B2615A}"/>
               </a:ext>
             </a:extLst>
           </p:cNvPr>
@@ -6542,13 +7016,154 @@
         </p:nvSpPr>
         <p:spPr>
           <a:xfrm>
+            <a:off x="466294" y="1493033"/>
+            <a:ext cx="11420905" cy="3188586"/>
+          </a:xfrm>
+        </p:spPr>
+        <p:txBody>
+          <a:bodyPr>
+            <a:normAutofit fontScale="92500"/>
+          </a:bodyPr>
+          <a:lstStyle/>
+          <a:p>
+            <a:pPr>
+              <a:buFont typeface="Arial" panose="020B0604020202020204" pitchFamily="34" charset="0"/>
+              <a:buChar char="•"/>
+            </a:pPr>
+            <a:r>
+              <a:rPr lang="en-US" dirty="0"/>
+              <a:t>Semantic search is a very powerful and fundamental to real world applications like question-answering. </a:t>
+            </a:r>
+            <a:br>
+              <a:rPr lang="en-US" dirty="0"/>
+            </a:br>
+            <a:r>
+              <a:rPr lang="en-US" dirty="0"/>
+              <a:t>Sent1: “Where is Swaroop going”</a:t>
+            </a:r>
+            <a:br>
+              <a:rPr lang="en-US" dirty="0"/>
+            </a:br>
+            <a:r>
+              <a:rPr lang="en-US" dirty="0"/>
+              <a:t>Sent2: “Swaroop is going to college”</a:t>
+            </a:r>
+            <a:br>
+              <a:rPr lang="en-US" dirty="0"/>
+            </a:br>
+            <a:r>
+              <a:rPr lang="en-US" dirty="0"/>
+              <a:t>Based on input query and similarity score the most matching sentence to be retrieved</a:t>
+            </a:r>
+          </a:p>
+          <a:p>
+            <a:pPr>
+              <a:buFont typeface="Arial" panose="020B0604020202020204" pitchFamily="34" charset="0"/>
+              <a:buChar char="•"/>
+            </a:pPr>
+            <a:r>
+              <a:rPr lang="en-US" dirty="0"/>
+              <a:t>Existing </a:t>
+            </a:r>
+            <a:r>
+              <a:rPr lang="en-US" dirty="0" err="1"/>
+              <a:t>explainability</a:t>
+            </a:r>
+            <a:r>
+              <a:rPr lang="en-US" dirty="0"/>
+              <a:t> frameworks are not effective in explaining how models works especially LLM and neural network models. More research to be conducted to generate human friendly explanations through counterfactual explanations.</a:t>
+            </a:r>
+          </a:p>
+        </p:txBody>
+      </p:sp>
+    </p:spTree>
+    <p:extLst>
+      <p:ext uri="{BB962C8B-B14F-4D97-AF65-F5344CB8AC3E}">
+        <p14:creationId xmlns:p14="http://schemas.microsoft.com/office/powerpoint/2010/main" val="2762595328"/>
+      </p:ext>
+    </p:extLst>
+  </p:cSld>
+  <p:clrMapOvr>
+    <a:masterClrMapping/>
+  </p:clrMapOvr>
+</p:sld>
+</file>
+
+<file path=ppt/slides/slide15.xml><?xml version="1.0" encoding="utf-8"?>
+<p:sld xmlns:a="http://schemas.openxmlformats.org/drawingml/2006/main" xmlns:r="http://schemas.openxmlformats.org/officeDocument/2006/relationships" xmlns:p="http://schemas.openxmlformats.org/presentationml/2006/main" showMasterSp="0">
+  <p:cSld>
+    <p:spTree>
+      <p:nvGrpSpPr>
+        <p:cNvPr id="1" name=""/>
+        <p:cNvGrpSpPr/>
+        <p:nvPr/>
+      </p:nvGrpSpPr>
+      <p:grpSpPr>
+        <a:xfrm>
+          <a:off x="0" y="0"/>
+          <a:ext cx="0" cy="0"/>
+          <a:chOff x="0" y="0"/>
+          <a:chExt cx="0" cy="0"/>
+        </a:xfrm>
+      </p:grpSpPr>
+      <p:sp>
+        <p:nvSpPr>
+          <p:cNvPr id="2" name="Title 1">
+            <a:extLst>
+              <a:ext uri="{FF2B5EF4-FFF2-40B4-BE49-F238E27FC236}">
+                <a16:creationId xmlns:a16="http://schemas.microsoft.com/office/drawing/2014/main" id="{8E1AB827-4E97-BC36-3BAA-5158B9D7AD90}"/>
+              </a:ext>
+            </a:extLst>
+          </p:cNvPr>
+          <p:cNvSpPr>
+            <a:spLocks noGrp="1"/>
+          </p:cNvSpPr>
+          <p:nvPr>
+            <p:ph type="title"/>
+          </p:nvPr>
+        </p:nvSpPr>
+        <p:spPr>
+          <a:xfrm>
+            <a:off x="416867" y="389175"/>
+            <a:ext cx="11643327" cy="1446550"/>
+          </a:xfrm>
+        </p:spPr>
+        <p:txBody>
+          <a:bodyPr/>
+          <a:lstStyle/>
+          <a:p>
+            <a:r>
+              <a:rPr lang="en-US" dirty="0"/>
+              <a:t>Conclusion</a:t>
+            </a:r>
+          </a:p>
+        </p:txBody>
+      </p:sp>
+      <p:sp>
+        <p:nvSpPr>
+          <p:cNvPr id="3" name="Content Placeholder 2">
+            <a:extLst>
+              <a:ext uri="{FF2B5EF4-FFF2-40B4-BE49-F238E27FC236}">
+                <a16:creationId xmlns:a16="http://schemas.microsoft.com/office/drawing/2014/main" id="{C07EF299-48C9-FBD0-E7EE-B7E76C90540A}"/>
+              </a:ext>
+            </a:extLst>
+          </p:cNvPr>
+          <p:cNvSpPr>
+            <a:spLocks noGrp="1"/>
+          </p:cNvSpPr>
+          <p:nvPr>
+            <p:ph idx="1"/>
+          </p:nvPr>
+        </p:nvSpPr>
+        <p:spPr>
+          <a:xfrm>
             <a:off x="515722" y="1653670"/>
-            <a:ext cx="11433261" cy="3188586"/>
+            <a:ext cx="11643327" cy="3738138"/>
           </a:xfrm>
         </p:spPr>
         <p:txBody>
           <a:bodyPr>
-            <a:normAutofit fontScale="70000" lnSpcReduction="20000"/>
+            <a:normAutofit fontScale="77500" lnSpcReduction="20000"/>
           </a:bodyPr>
           <a:lstStyle/>
           <a:p>
@@ -6557,7 +7172,7 @@
             </a:pPr>
             <a:r>
               <a:rPr lang="en-US" dirty="0"/>
-              <a:t>In this project we have applied various deep learning and traditional model architectures to generate sentence similarity scores. We have demonstrated and documented reproducible experiments for reference.</a:t>
+              <a:t>In this project we have applied various deep learning and traditional model architectures to generate sentence similarity scores. We have demonstrated and documented reproducible experiments for reference. Overall we have explored 4 types of designs.</a:t>
             </a:r>
           </a:p>
           <a:p>
@@ -9792,6 +10407,154 @@
 </file>
 
 <file path=ppt/slides/slide8.xml><?xml version="1.0" encoding="utf-8"?>
+<p:sld xmlns:a="http://schemas.openxmlformats.org/drawingml/2006/main" xmlns:r="http://schemas.openxmlformats.org/officeDocument/2006/relationships" xmlns:p="http://schemas.openxmlformats.org/presentationml/2006/main" showMasterSp="0">
+  <p:cSld>
+    <p:spTree>
+      <p:nvGrpSpPr>
+        <p:cNvPr id="1" name=""/>
+        <p:cNvGrpSpPr/>
+        <p:nvPr/>
+      </p:nvGrpSpPr>
+      <p:grpSpPr>
+        <a:xfrm>
+          <a:off x="0" y="0"/>
+          <a:ext cx="0" cy="0"/>
+          <a:chOff x="0" y="0"/>
+          <a:chExt cx="0" cy="0"/>
+        </a:xfrm>
+      </p:grpSpPr>
+      <p:sp>
+        <p:nvSpPr>
+          <p:cNvPr id="2" name="Title 1">
+            <a:extLst>
+              <a:ext uri="{FF2B5EF4-FFF2-40B4-BE49-F238E27FC236}">
+                <a16:creationId xmlns:a16="http://schemas.microsoft.com/office/drawing/2014/main" id="{3603CCCC-1A3E-BE97-ED0F-4024889EB742}"/>
+              </a:ext>
+            </a:extLst>
+          </p:cNvPr>
+          <p:cNvSpPr>
+            <a:spLocks noGrp="1"/>
+          </p:cNvSpPr>
+          <p:nvPr>
+            <p:ph type="title"/>
+          </p:nvPr>
+        </p:nvSpPr>
+        <p:spPr>
+          <a:xfrm>
+            <a:off x="565149" y="376819"/>
+            <a:ext cx="11532115" cy="1446550"/>
+          </a:xfrm>
+        </p:spPr>
+        <p:txBody>
+          <a:bodyPr/>
+          <a:lstStyle/>
+          <a:p>
+            <a:r>
+              <a:rPr lang="en-US" dirty="0"/>
+              <a:t>Model Designs:</a:t>
+            </a:r>
+          </a:p>
+        </p:txBody>
+      </p:sp>
+      <p:sp>
+        <p:nvSpPr>
+          <p:cNvPr id="3" name="Content Placeholder 2">
+            <a:extLst>
+              <a:ext uri="{FF2B5EF4-FFF2-40B4-BE49-F238E27FC236}">
+                <a16:creationId xmlns:a16="http://schemas.microsoft.com/office/drawing/2014/main" id="{66758C92-F5EB-1DFB-60D6-B2877C875030}"/>
+              </a:ext>
+            </a:extLst>
+          </p:cNvPr>
+          <p:cNvSpPr>
+            <a:spLocks noGrp="1"/>
+          </p:cNvSpPr>
+          <p:nvPr>
+            <p:ph idx="1"/>
+          </p:nvPr>
+        </p:nvSpPr>
+        <p:spPr>
+          <a:xfrm>
+            <a:off x="565149" y="1320038"/>
+            <a:ext cx="11061702" cy="3188586"/>
+          </a:xfrm>
+        </p:spPr>
+        <p:txBody>
+          <a:bodyPr/>
+          <a:lstStyle/>
+          <a:p>
+            <a:pPr marL="0" indent="0">
+              <a:buNone/>
+            </a:pPr>
+            <a:r>
+              <a:rPr lang="en-US" dirty="0"/>
+              <a:t>Design5: </a:t>
+            </a:r>
+          </a:p>
+          <a:p>
+            <a:pPr marL="0" indent="0">
+              <a:buNone/>
+            </a:pPr>
+            <a:r>
+              <a:rPr lang="en-US" dirty="0"/>
+              <a:t>SVD approach for cross lingual:</a:t>
+            </a:r>
+          </a:p>
+          <a:p>
+            <a:pPr lvl="1">
+              <a:buFont typeface="Arial" panose="020B0604020202020204" pitchFamily="34" charset="0"/>
+              <a:buChar char="•"/>
+            </a:pPr>
+            <a:r>
+              <a:rPr lang="en-US" dirty="0"/>
+              <a:t>Get fast text embeddings for source and target language</a:t>
+            </a:r>
+          </a:p>
+          <a:p>
+            <a:pPr lvl="1">
+              <a:buFont typeface="Arial" panose="020B0604020202020204" pitchFamily="34" charset="0"/>
+              <a:buChar char="•"/>
+            </a:pPr>
+            <a:r>
+              <a:rPr lang="en-US" dirty="0"/>
+              <a:t>Concatenate them and create a common matrix</a:t>
+            </a:r>
+          </a:p>
+          <a:p>
+            <a:pPr lvl="1">
+              <a:buFont typeface="Arial" panose="020B0604020202020204" pitchFamily="34" charset="0"/>
+              <a:buChar char="•"/>
+            </a:pPr>
+            <a:r>
+              <a:rPr lang="en-US" dirty="0"/>
+              <a:t>Now apply SVD normalization</a:t>
+            </a:r>
+          </a:p>
+          <a:p>
+            <a:pPr lvl="1">
+              <a:buFont typeface="Arial" panose="020B0604020202020204" pitchFamily="34" charset="0"/>
+              <a:buChar char="•"/>
+            </a:pPr>
+            <a:r>
+              <a:rPr lang="en-US" dirty="0"/>
+              <a:t>The normalized matrices can be used for common embeddings for both the source and target languages.</a:t>
+            </a:r>
+          </a:p>
+        </p:txBody>
+      </p:sp>
+    </p:spTree>
+    <p:extLst>
+      <p:ext uri="{BB962C8B-B14F-4D97-AF65-F5344CB8AC3E}">
+        <p14:creationId xmlns:p14="http://schemas.microsoft.com/office/powerpoint/2010/main" val="2918464463"/>
+      </p:ext>
+    </p:extLst>
+  </p:cSld>
+  <p:clrMapOvr>
+    <a:masterClrMapping/>
+  </p:clrMapOvr>
+</p:sld>
+</file>
+
+<file path=ppt/slides/slide9.xml><?xml version="1.0" encoding="utf-8"?>
 <p:sld xmlns:a="http://schemas.openxmlformats.org/drawingml/2006/main" xmlns:r="http://schemas.openxmlformats.org/officeDocument/2006/relationships" xmlns:p="http://schemas.openxmlformats.org/presentationml/2006/main" showMasterSp="0">
   <p:cSld>
     <p:spTree>
@@ -10719,505 +11482,6 @@
 </p:sld>
 </file>
 
-<file path=ppt/slides/slide9.xml><?xml version="1.0" encoding="utf-8"?>
-<p:sld xmlns:a="http://schemas.openxmlformats.org/drawingml/2006/main" xmlns:r="http://schemas.openxmlformats.org/officeDocument/2006/relationships" xmlns:p="http://schemas.openxmlformats.org/presentationml/2006/main" showMasterSp="0">
-  <p:cSld>
-    <p:spTree>
-      <p:nvGrpSpPr>
-        <p:cNvPr id="1" name=""/>
-        <p:cNvGrpSpPr/>
-        <p:nvPr/>
-      </p:nvGrpSpPr>
-      <p:grpSpPr>
-        <a:xfrm>
-          <a:off x="0" y="0"/>
-          <a:ext cx="0" cy="0"/>
-          <a:chOff x="0" y="0"/>
-          <a:chExt cx="0" cy="0"/>
-        </a:xfrm>
-      </p:grpSpPr>
-      <p:sp>
-        <p:nvSpPr>
-          <p:cNvPr id="2" name="Title 1">
-            <a:extLst>
-              <a:ext uri="{FF2B5EF4-FFF2-40B4-BE49-F238E27FC236}">
-                <a16:creationId xmlns:a16="http://schemas.microsoft.com/office/drawing/2014/main" id="{A8976B50-B660-35A7-1C60-E6D6CDA1AB11}"/>
-              </a:ext>
-            </a:extLst>
-          </p:cNvPr>
-          <p:cNvSpPr>
-            <a:spLocks noGrp="1"/>
-          </p:cNvSpPr>
-          <p:nvPr>
-            <p:ph type="title"/>
-          </p:nvPr>
-        </p:nvSpPr>
-        <p:spPr>
-          <a:xfrm>
-            <a:off x="441580" y="254501"/>
-            <a:ext cx="10568289" cy="1446550"/>
-          </a:xfrm>
-        </p:spPr>
-        <p:txBody>
-          <a:bodyPr/>
-          <a:lstStyle/>
-          <a:p>
-            <a:r>
-              <a:rPr lang="en-US" dirty="0"/>
-              <a:t>Experiments </a:t>
-            </a:r>
-            <a:r>
-              <a:rPr lang="en-US" dirty="0" err="1"/>
-              <a:t>Contd</a:t>
-            </a:r>
-            <a:r>
-              <a:rPr lang="en-US" dirty="0"/>
-              <a:t>…</a:t>
-            </a:r>
-          </a:p>
-        </p:txBody>
-      </p:sp>
-      <p:graphicFrame>
-        <p:nvGraphicFramePr>
-          <p:cNvPr id="4" name="Table 4">
-            <a:extLst>
-              <a:ext uri="{FF2B5EF4-FFF2-40B4-BE49-F238E27FC236}">
-                <a16:creationId xmlns:a16="http://schemas.microsoft.com/office/drawing/2014/main" id="{5755DB75-1BA5-3DEC-41D9-C60AEA29E169}"/>
-              </a:ext>
-            </a:extLst>
-          </p:cNvPr>
-          <p:cNvGraphicFramePr>
-            <a:graphicFrameLocks noGrp="1"/>
-          </p:cNvGraphicFramePr>
-          <p:nvPr>
-            <p:ph idx="1"/>
-            <p:extLst>
-              <p:ext uri="{D42A27DB-BD31-4B8C-83A1-F6EECF244321}">
-                <p14:modId xmlns:p14="http://schemas.microsoft.com/office/powerpoint/2010/main" val="3308965454"/>
-              </p:ext>
-            </p:extLst>
-          </p:nvPr>
-        </p:nvGraphicFramePr>
-        <p:xfrm>
-          <a:off x="441580" y="977776"/>
-          <a:ext cx="10976063" cy="1925320"/>
-        </p:xfrm>
-        <a:graphic>
-          <a:graphicData uri="http://schemas.openxmlformats.org/drawingml/2006/table">
-            <a:tbl>
-              <a:tblPr firstRow="1" bandRow="1">
-                <a:tableStyleId>{7DF18680-E054-41AD-8BC1-D1AEF772440D}</a:tableStyleId>
-              </a:tblPr>
-              <a:tblGrid>
-                <a:gridCol w="857374">
-                  <a:extLst>
-                    <a:ext uri="{9D8B030D-6E8A-4147-A177-3AD203B41FA5}">
-                      <a16:colId xmlns:a16="http://schemas.microsoft.com/office/drawing/2014/main" val="3133613118"/>
-                    </a:ext>
-                  </a:extLst>
-                </a:gridCol>
-                <a:gridCol w="2278644">
-                  <a:extLst>
-                    <a:ext uri="{9D8B030D-6E8A-4147-A177-3AD203B41FA5}">
-                      <a16:colId xmlns:a16="http://schemas.microsoft.com/office/drawing/2014/main" val="3841614346"/>
-                    </a:ext>
-                  </a:extLst>
-                </a:gridCol>
-                <a:gridCol w="1568009">
-                  <a:extLst>
-                    <a:ext uri="{9D8B030D-6E8A-4147-A177-3AD203B41FA5}">
-                      <a16:colId xmlns:a16="http://schemas.microsoft.com/office/drawing/2014/main" val="1600152621"/>
-                    </a:ext>
-                  </a:extLst>
-                </a:gridCol>
-                <a:gridCol w="1730920">
-                  <a:extLst>
-                    <a:ext uri="{9D8B030D-6E8A-4147-A177-3AD203B41FA5}">
-                      <a16:colId xmlns:a16="http://schemas.microsoft.com/office/drawing/2014/main" val="969051646"/>
-                    </a:ext>
-                  </a:extLst>
-                </a:gridCol>
-                <a:gridCol w="1405098">
-                  <a:extLst>
-                    <a:ext uri="{9D8B030D-6E8A-4147-A177-3AD203B41FA5}">
-                      <a16:colId xmlns:a16="http://schemas.microsoft.com/office/drawing/2014/main" val="2864839101"/>
-                    </a:ext>
-                  </a:extLst>
-                </a:gridCol>
-                <a:gridCol w="1568009">
-                  <a:extLst>
-                    <a:ext uri="{9D8B030D-6E8A-4147-A177-3AD203B41FA5}">
-                      <a16:colId xmlns:a16="http://schemas.microsoft.com/office/drawing/2014/main" val="1927313780"/>
-                    </a:ext>
-                  </a:extLst>
-                </a:gridCol>
-                <a:gridCol w="1568009">
-                  <a:extLst>
-                    <a:ext uri="{9D8B030D-6E8A-4147-A177-3AD203B41FA5}">
-                      <a16:colId xmlns:a16="http://schemas.microsoft.com/office/drawing/2014/main" val="2011091926"/>
-                    </a:ext>
-                  </a:extLst>
-                </a:gridCol>
-              </a:tblGrid>
-              <a:tr h="370840">
-                <a:tc>
-                  <a:txBody>
-                    <a:bodyPr/>
-                    <a:lstStyle/>
-                    <a:p>
-                      <a:r>
-                        <a:rPr lang="en-US" dirty="0"/>
-                        <a:t>Exp No</a:t>
-                      </a:r>
-                    </a:p>
-                  </a:txBody>
-                  <a:tcPr/>
-                </a:tc>
-                <a:tc>
-                  <a:txBody>
-                    <a:bodyPr/>
-                    <a:lstStyle/>
-                    <a:p>
-                      <a:r>
-                        <a:rPr lang="en-US" dirty="0"/>
-                        <a:t>Model Name</a:t>
-                      </a:r>
-                    </a:p>
-                  </a:txBody>
-                  <a:tcPr/>
-                </a:tc>
-                <a:tc>
-                  <a:txBody>
-                    <a:bodyPr/>
-                    <a:lstStyle/>
-                    <a:p>
-                      <a:r>
-                        <a:rPr lang="en-US" dirty="0"/>
-                        <a:t>Design Type</a:t>
-                      </a:r>
-                    </a:p>
-                  </a:txBody>
-                  <a:tcPr/>
-                </a:tc>
-                <a:tc>
-                  <a:txBody>
-                    <a:bodyPr/>
-                    <a:lstStyle/>
-                    <a:p>
-                      <a:r>
-                        <a:rPr lang="en-US" dirty="0" err="1"/>
-                        <a:t>Optim</a:t>
-                      </a:r>
-                      <a:r>
-                        <a:rPr lang="en-US" dirty="0"/>
-                        <a:t> </a:t>
-                      </a:r>
-                      <a:r>
-                        <a:rPr lang="en-US" dirty="0" err="1"/>
-                        <a:t>Func</a:t>
-                      </a:r>
-                      <a:endParaRPr lang="en-US" dirty="0"/>
-                    </a:p>
-                  </a:txBody>
-                  <a:tcPr/>
-                </a:tc>
-                <a:tc>
-                  <a:txBody>
-                    <a:bodyPr/>
-                    <a:lstStyle/>
-                    <a:p>
-                      <a:r>
-                        <a:rPr lang="en-US" dirty="0"/>
-                        <a:t>Train Data r value</a:t>
-                      </a:r>
-                    </a:p>
-                  </a:txBody>
-                  <a:tcPr/>
-                </a:tc>
-                <a:tc>
-                  <a:txBody>
-                    <a:bodyPr/>
-                    <a:lstStyle/>
-                    <a:p>
-                      <a:r>
-                        <a:rPr lang="en-US" dirty="0"/>
-                        <a:t>Val Data r value</a:t>
-                      </a:r>
-                    </a:p>
-                  </a:txBody>
-                  <a:tcPr/>
-                </a:tc>
-                <a:tc>
-                  <a:txBody>
-                    <a:bodyPr/>
-                    <a:lstStyle/>
-                    <a:p>
-                      <a:r>
-                        <a:rPr lang="en-US" dirty="0"/>
-                        <a:t>Test Data r value</a:t>
-                      </a:r>
-                    </a:p>
-                  </a:txBody>
-                  <a:tcPr/>
-                </a:tc>
-                <a:extLst>
-                  <a:ext uri="{0D108BD9-81ED-4DB2-BD59-A6C34878D82A}">
-                    <a16:rowId xmlns:a16="http://schemas.microsoft.com/office/drawing/2014/main" val="1401507077"/>
-                  </a:ext>
-                </a:extLst>
-              </a:tr>
-              <a:tr h="370840">
-                <a:tc>
-                  <a:txBody>
-                    <a:bodyPr/>
-                    <a:lstStyle/>
-                    <a:p>
-                      <a:r>
-                        <a:rPr lang="en-US" dirty="0"/>
-                        <a:t>7</a:t>
-                      </a:r>
-                    </a:p>
-                  </a:txBody>
-                  <a:tcPr/>
-                </a:tc>
-                <a:tc>
-                  <a:txBody>
-                    <a:bodyPr/>
-                    <a:lstStyle/>
-                    <a:p>
-                      <a:r>
-                        <a:rPr lang="en-US" dirty="0"/>
-                        <a:t>Siamese </a:t>
-                      </a:r>
-                      <a:r>
-                        <a:rPr lang="en-US" dirty="0" err="1"/>
-                        <a:t>BiLSTM</a:t>
-                      </a:r>
-                      <a:endParaRPr lang="en-US" dirty="0"/>
-                    </a:p>
-                  </a:txBody>
-                  <a:tcPr/>
-                </a:tc>
-                <a:tc>
-                  <a:txBody>
-                    <a:bodyPr/>
-                    <a:lstStyle/>
-                    <a:p>
-                      <a:r>
-                        <a:rPr lang="en-US" dirty="0"/>
-                        <a:t>Design3</a:t>
-                      </a:r>
-                    </a:p>
-                  </a:txBody>
-                  <a:tcPr/>
-                </a:tc>
-                <a:tc>
-                  <a:txBody>
-                    <a:bodyPr/>
-                    <a:lstStyle/>
-                    <a:p>
-                      <a:r>
-                        <a:rPr lang="en-US" dirty="0" err="1"/>
-                        <a:t>PearsonLoss</a:t>
-                      </a:r>
-                      <a:endParaRPr lang="en-US" dirty="0"/>
-                    </a:p>
-                  </a:txBody>
-                  <a:tcPr/>
-                </a:tc>
-                <a:tc>
-                  <a:txBody>
-                    <a:bodyPr/>
-                    <a:lstStyle/>
-                    <a:p>
-                      <a:r>
-                        <a:rPr lang="en-US" dirty="0"/>
-                        <a:t>0.18</a:t>
-                      </a:r>
-                    </a:p>
-                  </a:txBody>
-                  <a:tcPr/>
-                </a:tc>
-                <a:tc>
-                  <a:txBody>
-                    <a:bodyPr/>
-                    <a:lstStyle/>
-                    <a:p>
-                      <a:r>
-                        <a:rPr lang="en-US" dirty="0"/>
-                        <a:t>0.09</a:t>
-                      </a:r>
-                    </a:p>
-                  </a:txBody>
-                  <a:tcPr/>
-                </a:tc>
-                <a:tc>
-                  <a:txBody>
-                    <a:bodyPr/>
-                    <a:lstStyle/>
-                    <a:p>
-                      <a:r>
-                        <a:rPr lang="en-US" dirty="0"/>
-                        <a:t>0.13</a:t>
-                      </a:r>
-                    </a:p>
-                  </a:txBody>
-                  <a:tcPr/>
-                </a:tc>
-                <a:extLst>
-                  <a:ext uri="{0D108BD9-81ED-4DB2-BD59-A6C34878D82A}">
-                    <a16:rowId xmlns:a16="http://schemas.microsoft.com/office/drawing/2014/main" val="3969947293"/>
-                  </a:ext>
-                </a:extLst>
-              </a:tr>
-              <a:tr h="370840">
-                <a:tc>
-                  <a:txBody>
-                    <a:bodyPr/>
-                    <a:lstStyle/>
-                    <a:p>
-                      <a:r>
-                        <a:rPr lang="en-US" dirty="0"/>
-                        <a:t>8</a:t>
-                      </a:r>
-                    </a:p>
-                  </a:txBody>
-                  <a:tcPr/>
-                </a:tc>
-                <a:tc>
-                  <a:txBody>
-                    <a:bodyPr/>
-                    <a:lstStyle/>
-                    <a:p>
-                      <a:pPr marL="0" marR="0" lvl="0" indent="0" algn="l" defTabSz="914400" rtl="0" eaLnBrk="1" fontAlgn="auto" latinLnBrk="0" hangingPunct="1">
-                        <a:lnSpc>
-                          <a:spcPct val="100000"/>
-                        </a:lnSpc>
-                        <a:spcBef>
-                          <a:spcPts val="0"/>
-                        </a:spcBef>
-                        <a:spcAft>
-                          <a:spcPts val="0"/>
-                        </a:spcAft>
-                        <a:buClrTx/>
-                        <a:buSzTx/>
-                        <a:buFontTx/>
-                        <a:buNone/>
-                        <a:tabLst/>
-                        <a:defRPr/>
-                      </a:pPr>
-                      <a:r>
-                        <a:rPr lang="en-US" dirty="0"/>
-                        <a:t>Cross Lingual Siamese </a:t>
-                      </a:r>
-                      <a:r>
-                        <a:rPr lang="en-US" dirty="0" err="1"/>
-                        <a:t>BiLSTM</a:t>
-                      </a:r>
-                      <a:r>
-                        <a:rPr lang="en-US" dirty="0"/>
-                        <a:t> for </a:t>
-                      </a:r>
-                      <a:r>
-                        <a:rPr lang="en-US" dirty="0" err="1"/>
-                        <a:t>en</a:t>
-                      </a:r>
-                      <a:r>
-                        <a:rPr lang="en-US" dirty="0"/>
-                        <a:t>-es</a:t>
-                      </a:r>
-                    </a:p>
-                  </a:txBody>
-                  <a:tcPr/>
-                </a:tc>
-                <a:tc>
-                  <a:txBody>
-                    <a:bodyPr/>
-                    <a:lstStyle/>
-                    <a:p>
-                      <a:r>
-                        <a:rPr lang="en-US" dirty="0"/>
-                        <a:t>Design3</a:t>
-                      </a:r>
-                    </a:p>
-                  </a:txBody>
-                  <a:tcPr/>
-                </a:tc>
-                <a:tc>
-                  <a:txBody>
-                    <a:bodyPr/>
-                    <a:lstStyle/>
-                    <a:p>
-                      <a:r>
-                        <a:rPr lang="en-US" dirty="0"/>
-                        <a:t>MSE Loss</a:t>
-                      </a:r>
-                    </a:p>
-                  </a:txBody>
-                  <a:tcPr/>
-                </a:tc>
-                <a:tc>
-                  <a:txBody>
-                    <a:bodyPr/>
-                    <a:lstStyle/>
-                    <a:p>
-                      <a:r>
-                        <a:rPr lang="en-US" dirty="0"/>
-                        <a:t>0.153</a:t>
-                      </a:r>
-                    </a:p>
-                  </a:txBody>
-                  <a:tcPr/>
-                </a:tc>
-                <a:tc>
-                  <a:txBody>
-                    <a:bodyPr/>
-                    <a:lstStyle/>
-                    <a:p>
-                      <a:r>
-                        <a:rPr lang="en-US" dirty="0"/>
-                        <a:t>0.08</a:t>
-                      </a:r>
-                    </a:p>
-                  </a:txBody>
-                  <a:tcPr/>
-                </a:tc>
-                <a:tc>
-                  <a:txBody>
-                    <a:bodyPr/>
-                    <a:lstStyle/>
-                    <a:p>
-                      <a:r>
-                        <a:rPr lang="en-US" dirty="0"/>
-                        <a:t>0.103</a:t>
-                      </a:r>
-                    </a:p>
-                  </a:txBody>
-                  <a:tcPr/>
-                </a:tc>
-                <a:extLst>
-                  <a:ext uri="{0D108BD9-81ED-4DB2-BD59-A6C34878D82A}">
-                    <a16:rowId xmlns:a16="http://schemas.microsoft.com/office/drawing/2014/main" val="2040851283"/>
-                  </a:ext>
-                </a:extLst>
-              </a:tr>
-            </a:tbl>
-          </a:graphicData>
-        </a:graphic>
-      </p:graphicFrame>
-    </p:spTree>
-    <p:extLst>
-      <p:ext uri="{BB962C8B-B14F-4D97-AF65-F5344CB8AC3E}">
-        <p14:creationId xmlns:p14="http://schemas.microsoft.com/office/powerpoint/2010/main" val="3841735592"/>
-      </p:ext>
-    </p:extLst>
-  </p:cSld>
-  <p:clrMapOvr>
-    <a:masterClrMapping/>
-  </p:clrMapOvr>
-</p:sld>
-</file>
-
 <file path=ppt/theme/theme1.xml><?xml version="1.0" encoding="utf-8"?>
 <a:theme xmlns:a="http://schemas.openxmlformats.org/drawingml/2006/main" name="MadridVTI">
   <a:themeElements>

</xml_diff>